<commit_message>
Add task navigation to lab guidance charts
Signed-off-by: Nigel Jones <nigel.l.jones+git@gmail.com>
</commit_message>
<xml_diff>
--- a/data-governance-lab/DataAndGovernanceLab.pptx
+++ b/data-governance-lab/DataAndGovernanceLab.pptx
@@ -191,7 +191,7 @@
   <pc:docChgLst>
     <pc:chgData name="Nigel L Jones" userId="1512a2c5-99cf-401f-90da-0968559aa4c1" providerId="ADAL" clId="{52167A17-4B3C-0C4B-A355-FED5F0DA7317}"/>
     <pc:docChg chg="undo redo custSel addSld delSld modSld sldOrd delSection modSection">
-      <pc:chgData name="Nigel L Jones" userId="1512a2c5-99cf-401f-90da-0968559aa4c1" providerId="ADAL" clId="{52167A17-4B3C-0C4B-A355-FED5F0DA7317}" dt="2022-08-22T09:23:58.259" v="2824" actId="20577"/>
+      <pc:chgData name="Nigel L Jones" userId="1512a2c5-99cf-401f-90da-0968559aa4c1" providerId="ADAL" clId="{52167A17-4B3C-0C4B-A355-FED5F0DA7317}" dt="2022-08-24T11:33:35.135" v="2914" actId="113"/>
       <pc:docMkLst>
         <pc:docMk/>
       </pc:docMkLst>
@@ -812,7 +812,7 @@
         </pc:spChg>
       </pc:sldChg>
       <pc:sldChg chg="modSp new mod">
-        <pc:chgData name="Nigel L Jones" userId="1512a2c5-99cf-401f-90da-0968559aa4c1" providerId="ADAL" clId="{52167A17-4B3C-0C4B-A355-FED5F0DA7317}" dt="2022-08-22T09:09:26.394" v="430"/>
+        <pc:chgData name="Nigel L Jones" userId="1512a2c5-99cf-401f-90da-0968559aa4c1" providerId="ADAL" clId="{52167A17-4B3C-0C4B-A355-FED5F0DA7317}" dt="2022-08-24T11:29:44.448" v="2850" actId="20577"/>
         <pc:sldMkLst>
           <pc:docMk/>
           <pc:sldMk cId="3691094387" sldId="390"/>
@@ -826,7 +826,7 @@
           </ac:spMkLst>
         </pc:spChg>
         <pc:spChg chg="mod">
-          <ac:chgData name="Nigel L Jones" userId="1512a2c5-99cf-401f-90da-0968559aa4c1" providerId="ADAL" clId="{52167A17-4B3C-0C4B-A355-FED5F0DA7317}" dt="2022-08-22T09:08:06.197" v="328" actId="20577"/>
+          <ac:chgData name="Nigel L Jones" userId="1512a2c5-99cf-401f-90da-0968559aa4c1" providerId="ADAL" clId="{52167A17-4B3C-0C4B-A355-FED5F0DA7317}" dt="2022-08-24T11:29:44.448" v="2850" actId="20577"/>
           <ac:spMkLst>
             <pc:docMk/>
             <pc:sldMk cId="3691094387" sldId="390"/>
@@ -850,13 +850,13 @@
         </pc:sldMkLst>
       </pc:sldChg>
       <pc:sldChg chg="modSp add mod">
-        <pc:chgData name="Nigel L Jones" userId="1512a2c5-99cf-401f-90da-0968559aa4c1" providerId="ADAL" clId="{52167A17-4B3C-0C4B-A355-FED5F0DA7317}" dt="2022-08-22T09:10:30.981" v="669" actId="20577"/>
+        <pc:chgData name="Nigel L Jones" userId="1512a2c5-99cf-401f-90da-0968559aa4c1" providerId="ADAL" clId="{52167A17-4B3C-0C4B-A355-FED5F0DA7317}" dt="2022-08-24T11:32:29.903" v="2900" actId="113"/>
         <pc:sldMkLst>
           <pc:docMk/>
           <pc:sldMk cId="4108947352" sldId="392"/>
         </pc:sldMkLst>
         <pc:spChg chg="mod">
-          <ac:chgData name="Nigel L Jones" userId="1512a2c5-99cf-401f-90da-0968559aa4c1" providerId="ADAL" clId="{52167A17-4B3C-0C4B-A355-FED5F0DA7317}" dt="2022-08-22T09:09:41.170" v="441" actId="20577"/>
+          <ac:chgData name="Nigel L Jones" userId="1512a2c5-99cf-401f-90da-0968559aa4c1" providerId="ADAL" clId="{52167A17-4B3C-0C4B-A355-FED5F0DA7317}" dt="2022-08-24T11:32:29.903" v="2900" actId="113"/>
           <ac:spMkLst>
             <pc:docMk/>
             <pc:sldMk cId="4108947352" sldId="392"/>
@@ -873,13 +873,13 @@
         </pc:spChg>
       </pc:sldChg>
       <pc:sldChg chg="modSp add mod">
-        <pc:chgData name="Nigel L Jones" userId="1512a2c5-99cf-401f-90da-0968559aa4c1" providerId="ADAL" clId="{52167A17-4B3C-0C4B-A355-FED5F0DA7317}" dt="2022-08-22T09:13:24.666" v="1013" actId="20577"/>
+        <pc:chgData name="Nigel L Jones" userId="1512a2c5-99cf-401f-90da-0968559aa4c1" providerId="ADAL" clId="{52167A17-4B3C-0C4B-A355-FED5F0DA7317}" dt="2022-08-24T11:32:37.906" v="2902" actId="113"/>
         <pc:sldMkLst>
           <pc:docMk/>
           <pc:sldMk cId="3289550124" sldId="393"/>
         </pc:sldMkLst>
         <pc:spChg chg="mod">
-          <ac:chgData name="Nigel L Jones" userId="1512a2c5-99cf-401f-90da-0968559aa4c1" providerId="ADAL" clId="{52167A17-4B3C-0C4B-A355-FED5F0DA7317}" dt="2022-08-22T09:11:21.516" v="690" actId="20577"/>
+          <ac:chgData name="Nigel L Jones" userId="1512a2c5-99cf-401f-90da-0968559aa4c1" providerId="ADAL" clId="{52167A17-4B3C-0C4B-A355-FED5F0DA7317}" dt="2022-08-24T11:32:37.906" v="2902" actId="113"/>
           <ac:spMkLst>
             <pc:docMk/>
             <pc:sldMk cId="3289550124" sldId="393"/>
@@ -896,13 +896,13 @@
         </pc:spChg>
       </pc:sldChg>
       <pc:sldChg chg="modSp add mod">
-        <pc:chgData name="Nigel L Jones" userId="1512a2c5-99cf-401f-90da-0968559aa4c1" providerId="ADAL" clId="{52167A17-4B3C-0C4B-A355-FED5F0DA7317}" dt="2022-08-22T09:15:12.935" v="1251" actId="6549"/>
+        <pc:chgData name="Nigel L Jones" userId="1512a2c5-99cf-401f-90da-0968559aa4c1" providerId="ADAL" clId="{52167A17-4B3C-0C4B-A355-FED5F0DA7317}" dt="2022-08-24T11:32:56.412" v="2907" actId="113"/>
         <pc:sldMkLst>
           <pc:docMk/>
           <pc:sldMk cId="4069238537" sldId="394"/>
         </pc:sldMkLst>
         <pc:spChg chg="mod">
-          <ac:chgData name="Nigel L Jones" userId="1512a2c5-99cf-401f-90da-0968559aa4c1" providerId="ADAL" clId="{52167A17-4B3C-0C4B-A355-FED5F0DA7317}" dt="2022-08-22T09:13:42.103" v="1040" actId="20577"/>
+          <ac:chgData name="Nigel L Jones" userId="1512a2c5-99cf-401f-90da-0968559aa4c1" providerId="ADAL" clId="{52167A17-4B3C-0C4B-A355-FED5F0DA7317}" dt="2022-08-24T11:32:56.412" v="2907" actId="113"/>
           <ac:spMkLst>
             <pc:docMk/>
             <pc:sldMk cId="4069238537" sldId="394"/>
@@ -925,14 +925,14 @@
           <pc:sldMk cId="48377689" sldId="395"/>
         </pc:sldMkLst>
       </pc:sldChg>
-      <pc:sldChg chg="modSp add mod">
-        <pc:chgData name="Nigel L Jones" userId="1512a2c5-99cf-401f-90da-0968559aa4c1" providerId="ADAL" clId="{52167A17-4B3C-0C4B-A355-FED5F0DA7317}" dt="2022-08-22T09:16:49.704" v="1494" actId="20577"/>
+      <pc:sldChg chg="addSp delSp modSp add mod">
+        <pc:chgData name="Nigel L Jones" userId="1512a2c5-99cf-401f-90da-0968559aa4c1" providerId="ADAL" clId="{52167A17-4B3C-0C4B-A355-FED5F0DA7317}" dt="2022-08-24T11:32:08.942" v="2897" actId="113"/>
         <pc:sldMkLst>
           <pc:docMk/>
           <pc:sldMk cId="1396749739" sldId="396"/>
         </pc:sldMkLst>
         <pc:spChg chg="mod">
-          <ac:chgData name="Nigel L Jones" userId="1512a2c5-99cf-401f-90da-0968559aa4c1" providerId="ADAL" clId="{52167A17-4B3C-0C4B-A355-FED5F0DA7317}" dt="2022-08-22T09:15:41.469" v="1279" actId="20577"/>
+          <ac:chgData name="Nigel L Jones" userId="1512a2c5-99cf-401f-90da-0968559aa4c1" providerId="ADAL" clId="{52167A17-4B3C-0C4B-A355-FED5F0DA7317}" dt="2022-08-24T11:32:08.942" v="2897" actId="113"/>
           <ac:spMkLst>
             <pc:docMk/>
             <pc:sldMk cId="1396749739" sldId="396"/>
@@ -947,15 +947,23 @@
             <ac:spMk id="4" creationId="{1254813B-7D84-6DBA-D36E-D97BD5B9D835}"/>
           </ac:spMkLst>
         </pc:spChg>
+        <pc:spChg chg="add del mod">
+          <ac:chgData name="Nigel L Jones" userId="1512a2c5-99cf-401f-90da-0968559aa4c1" providerId="ADAL" clId="{52167A17-4B3C-0C4B-A355-FED5F0DA7317}" dt="2022-08-24T11:31:09.842" v="2875" actId="767"/>
+          <ac:spMkLst>
+            <pc:docMk/>
+            <pc:sldMk cId="1396749739" sldId="396"/>
+            <ac:spMk id="7" creationId="{9BD5138A-7E04-EE16-5357-F999E82B89DB}"/>
+          </ac:spMkLst>
+        </pc:spChg>
       </pc:sldChg>
       <pc:sldChg chg="modSp add mod">
-        <pc:chgData name="Nigel L Jones" userId="1512a2c5-99cf-401f-90da-0968559aa4c1" providerId="ADAL" clId="{52167A17-4B3C-0C4B-A355-FED5F0DA7317}" dt="2022-08-22T09:18:22.953" v="1792" actId="20577"/>
+        <pc:chgData name="Nigel L Jones" userId="1512a2c5-99cf-401f-90da-0968559aa4c1" providerId="ADAL" clId="{52167A17-4B3C-0C4B-A355-FED5F0DA7317}" dt="2022-08-24T11:33:35.135" v="2914" actId="113"/>
         <pc:sldMkLst>
           <pc:docMk/>
           <pc:sldMk cId="1631231316" sldId="397"/>
         </pc:sldMkLst>
         <pc:spChg chg="mod">
-          <ac:chgData name="Nigel L Jones" userId="1512a2c5-99cf-401f-90da-0968559aa4c1" providerId="ADAL" clId="{52167A17-4B3C-0C4B-A355-FED5F0DA7317}" dt="2022-08-22T09:17:15.771" v="1540" actId="20577"/>
+          <ac:chgData name="Nigel L Jones" userId="1512a2c5-99cf-401f-90da-0968559aa4c1" providerId="ADAL" clId="{52167A17-4B3C-0C4B-A355-FED5F0DA7317}" dt="2022-08-24T11:33:35.135" v="2914" actId="113"/>
           <ac:spMkLst>
             <pc:docMk/>
             <pc:sldMk cId="1631231316" sldId="397"/>
@@ -972,13 +980,13 @@
         </pc:spChg>
       </pc:sldChg>
       <pc:sldChg chg="modSp add mod">
-        <pc:chgData name="Nigel L Jones" userId="1512a2c5-99cf-401f-90da-0968559aa4c1" providerId="ADAL" clId="{52167A17-4B3C-0C4B-A355-FED5F0DA7317}" dt="2022-08-22T09:19:35.525" v="1966" actId="20577"/>
+        <pc:chgData name="Nigel L Jones" userId="1512a2c5-99cf-401f-90da-0968559aa4c1" providerId="ADAL" clId="{52167A17-4B3C-0C4B-A355-FED5F0DA7317}" dt="2022-08-24T11:33:21.572" v="2911" actId="113"/>
         <pc:sldMkLst>
           <pc:docMk/>
           <pc:sldMk cId="541345078" sldId="398"/>
         </pc:sldMkLst>
         <pc:spChg chg="mod">
-          <ac:chgData name="Nigel L Jones" userId="1512a2c5-99cf-401f-90da-0968559aa4c1" providerId="ADAL" clId="{52167A17-4B3C-0C4B-A355-FED5F0DA7317}" dt="2022-08-22T09:18:38.359" v="1828" actId="20577"/>
+          <ac:chgData name="Nigel L Jones" userId="1512a2c5-99cf-401f-90da-0968559aa4c1" providerId="ADAL" clId="{52167A17-4B3C-0C4B-A355-FED5F0DA7317}" dt="2022-08-24T11:33:21.572" v="2911" actId="113"/>
           <ac:spMkLst>
             <pc:docMk/>
             <pc:sldMk cId="541345078" sldId="398"/>
@@ -1002,13 +1010,13 @@
         </pc:sldMkLst>
       </pc:sldChg>
       <pc:sldChg chg="modSp add mod">
-        <pc:chgData name="Nigel L Jones" userId="1512a2c5-99cf-401f-90da-0968559aa4c1" providerId="ADAL" clId="{52167A17-4B3C-0C4B-A355-FED5F0DA7317}" dt="2022-08-22T09:21:13.463" v="2333" actId="20577"/>
+        <pc:chgData name="Nigel L Jones" userId="1512a2c5-99cf-401f-90da-0968559aa4c1" providerId="ADAL" clId="{52167A17-4B3C-0C4B-A355-FED5F0DA7317}" dt="2022-08-24T11:28:22.268" v="2842" actId="20577"/>
         <pc:sldMkLst>
           <pc:docMk/>
           <pc:sldMk cId="1807981701" sldId="400"/>
         </pc:sldMkLst>
         <pc:spChg chg="mod">
-          <ac:chgData name="Nigel L Jones" userId="1512a2c5-99cf-401f-90da-0968559aa4c1" providerId="ADAL" clId="{52167A17-4B3C-0C4B-A355-FED5F0DA7317}" dt="2022-08-22T09:20:12.138" v="1989" actId="20577"/>
+          <ac:chgData name="Nigel L Jones" userId="1512a2c5-99cf-401f-90da-0968559aa4c1" providerId="ADAL" clId="{52167A17-4B3C-0C4B-A355-FED5F0DA7317}" dt="2022-08-24T11:28:22.268" v="2842" actId="20577"/>
           <ac:spMkLst>
             <pc:docMk/>
             <pc:sldMk cId="1807981701" sldId="400"/>
@@ -13872,7 +13880,7 @@
           <a:p>
             <a:r>
               <a:rPr lang="en-US" dirty="0"/>
-              <a:t>Protect your data</a:t>
+              <a:t>OPTIONAL - Protect your data</a:t>
             </a:r>
           </a:p>
         </p:txBody>
@@ -14265,9 +14273,90 @@
           <a:lstStyle/>
           <a:p>
             <a:r>
-              <a:rPr lang="en-US" dirty="0"/>
-              <a:t>Task 1: Create a catalog</a:t>
-            </a:r>
+              <a:rPr lang="en-US" b="1" dirty="0"/>
+              <a:t>&gt; Task 1: Create a catalog</a:t>
+            </a:r>
+          </a:p>
+          <a:p>
+            <a:r>
+              <a:rPr lang="en-US" dirty="0">
+                <a:solidFill>
+                  <a:schemeClr val="tx1">
+                    <a:lumMod val="50000"/>
+                    <a:lumOff val="50000"/>
+                  </a:schemeClr>
+                </a:solidFill>
+              </a:rPr>
+              <a:t>Task 2: Create a category</a:t>
+            </a:r>
+          </a:p>
+          <a:p>
+            <a:r>
+              <a:rPr lang="en-US" dirty="0">
+                <a:solidFill>
+                  <a:schemeClr val="tx1">
+                    <a:lumMod val="50000"/>
+                    <a:lumOff val="50000"/>
+                  </a:schemeClr>
+                </a:solidFill>
+              </a:rPr>
+              <a:t>Task 3: Add business terms</a:t>
+            </a:r>
+          </a:p>
+          <a:p>
+            <a:r>
+              <a:rPr lang="en-US" dirty="0">
+                <a:solidFill>
+                  <a:schemeClr val="tx1">
+                    <a:lumMod val="50000"/>
+                    <a:lumOff val="50000"/>
+                  </a:schemeClr>
+                </a:solidFill>
+              </a:rPr>
+              <a:t>Task 4: Import Data to a project</a:t>
+            </a:r>
+          </a:p>
+          <a:p>
+            <a:r>
+              <a:rPr lang="en-US" dirty="0">
+                <a:solidFill>
+                  <a:schemeClr val="tx1">
+                    <a:lumMod val="50000"/>
+                    <a:lumOff val="50000"/>
+                  </a:schemeClr>
+                </a:solidFill>
+              </a:rPr>
+              <a:t>Task 5: Enrich the imported data</a:t>
+            </a:r>
+          </a:p>
+          <a:p>
+            <a:r>
+              <a:rPr lang="en-US" dirty="0">
+                <a:solidFill>
+                  <a:schemeClr val="tx1">
+                    <a:lumMod val="50000"/>
+                    <a:lumOff val="50000"/>
+                  </a:schemeClr>
+                </a:solidFill>
+              </a:rPr>
+              <a:t>Task 6: View the results of the metadata enrichment</a:t>
+            </a:r>
+          </a:p>
+          <a:p>
+            <a:r>
+              <a:rPr lang="en-US" dirty="0">
+                <a:solidFill>
+                  <a:schemeClr val="tx1">
+                    <a:lumMod val="50000"/>
+                    <a:lumOff val="50000"/>
+                  </a:schemeClr>
+                </a:solidFill>
+              </a:rPr>
+              <a:t>Task 7: Publish Data to a catalog</a:t>
+            </a:r>
+          </a:p>
+          <a:p>
+            <a:endParaRPr lang="en-US" dirty="0"/>
           </a:p>
         </p:txBody>
       </p:sp>
@@ -14438,8 +14527,86 @@
           <a:lstStyle/>
           <a:p>
             <a:r>
-              <a:rPr lang="en-US" dirty="0"/>
-              <a:t>Task 2: Create a category</a:t>
+              <a:rPr lang="en-US" dirty="0">
+                <a:solidFill>
+                  <a:schemeClr val="tx1">
+                    <a:lumMod val="50000"/>
+                    <a:lumOff val="50000"/>
+                  </a:schemeClr>
+                </a:solidFill>
+              </a:rPr>
+              <a:t>Task 1: Create a catalog</a:t>
+            </a:r>
+          </a:p>
+          <a:p>
+            <a:r>
+              <a:rPr lang="en-US" b="1" dirty="0"/>
+              <a:t>&gt; Task 2: Create a category</a:t>
+            </a:r>
+          </a:p>
+          <a:p>
+            <a:r>
+              <a:rPr lang="en-US" dirty="0">
+                <a:solidFill>
+                  <a:schemeClr val="tx1">
+                    <a:lumMod val="50000"/>
+                    <a:lumOff val="50000"/>
+                  </a:schemeClr>
+                </a:solidFill>
+              </a:rPr>
+              <a:t>Task 3: Add business terms</a:t>
+            </a:r>
+          </a:p>
+          <a:p>
+            <a:r>
+              <a:rPr lang="en-US" dirty="0">
+                <a:solidFill>
+                  <a:schemeClr val="tx1">
+                    <a:lumMod val="50000"/>
+                    <a:lumOff val="50000"/>
+                  </a:schemeClr>
+                </a:solidFill>
+              </a:rPr>
+              <a:t>Task 4: Import Data to a project</a:t>
+            </a:r>
+          </a:p>
+          <a:p>
+            <a:r>
+              <a:rPr lang="en-US" dirty="0">
+                <a:solidFill>
+                  <a:schemeClr val="tx1">
+                    <a:lumMod val="50000"/>
+                    <a:lumOff val="50000"/>
+                  </a:schemeClr>
+                </a:solidFill>
+              </a:rPr>
+              <a:t>Task 5: Enrich the imported data</a:t>
+            </a:r>
+          </a:p>
+          <a:p>
+            <a:r>
+              <a:rPr lang="en-US" dirty="0">
+                <a:solidFill>
+                  <a:schemeClr val="tx1">
+                    <a:lumMod val="50000"/>
+                    <a:lumOff val="50000"/>
+                  </a:schemeClr>
+                </a:solidFill>
+              </a:rPr>
+              <a:t>Task 6: View the results of the metadata enrichment</a:t>
+            </a:r>
+          </a:p>
+          <a:p>
+            <a:r>
+              <a:rPr lang="en-US" dirty="0">
+                <a:solidFill>
+                  <a:schemeClr val="tx1">
+                    <a:lumMod val="50000"/>
+                    <a:lumOff val="50000"/>
+                  </a:schemeClr>
+                </a:solidFill>
+              </a:rPr>
+              <a:t>Task 7: Publish Data to a catalog</a:t>
             </a:r>
           </a:p>
         </p:txBody>
@@ -14617,8 +14784,86 @@
           <a:lstStyle/>
           <a:p>
             <a:r>
-              <a:rPr lang="en-US" dirty="0"/>
-              <a:t>Task 3: Add business terms</a:t>
+              <a:rPr lang="en-US" dirty="0">
+                <a:solidFill>
+                  <a:schemeClr val="tx1">
+                    <a:lumMod val="50000"/>
+                    <a:lumOff val="50000"/>
+                  </a:schemeClr>
+                </a:solidFill>
+              </a:rPr>
+              <a:t>Task 1: Create a catalog</a:t>
+            </a:r>
+          </a:p>
+          <a:p>
+            <a:r>
+              <a:rPr lang="en-US" dirty="0">
+                <a:solidFill>
+                  <a:schemeClr val="tx1">
+                    <a:lumMod val="50000"/>
+                    <a:lumOff val="50000"/>
+                  </a:schemeClr>
+                </a:solidFill>
+              </a:rPr>
+              <a:t>Task 2: Create a category</a:t>
+            </a:r>
+          </a:p>
+          <a:p>
+            <a:r>
+              <a:rPr lang="en-US" b="1" dirty="0"/>
+              <a:t>&gt; Task 3: Add business terms</a:t>
+            </a:r>
+          </a:p>
+          <a:p>
+            <a:r>
+              <a:rPr lang="en-US" dirty="0">
+                <a:solidFill>
+                  <a:schemeClr val="tx1">
+                    <a:lumMod val="50000"/>
+                    <a:lumOff val="50000"/>
+                  </a:schemeClr>
+                </a:solidFill>
+              </a:rPr>
+              <a:t>Task 4: Import Data to a project</a:t>
+            </a:r>
+          </a:p>
+          <a:p>
+            <a:r>
+              <a:rPr lang="en-US" dirty="0">
+                <a:solidFill>
+                  <a:schemeClr val="tx1">
+                    <a:lumMod val="50000"/>
+                    <a:lumOff val="50000"/>
+                  </a:schemeClr>
+                </a:solidFill>
+              </a:rPr>
+              <a:t>Task 5: Enrich the imported data</a:t>
+            </a:r>
+          </a:p>
+          <a:p>
+            <a:r>
+              <a:rPr lang="en-US" dirty="0">
+                <a:solidFill>
+                  <a:schemeClr val="tx1">
+                    <a:lumMod val="50000"/>
+                    <a:lumOff val="50000"/>
+                  </a:schemeClr>
+                </a:solidFill>
+              </a:rPr>
+              <a:t>Task 6: View the results of the metadata enrichment</a:t>
+            </a:r>
+          </a:p>
+          <a:p>
+            <a:r>
+              <a:rPr lang="en-US" dirty="0">
+                <a:solidFill>
+                  <a:schemeClr val="tx1">
+                    <a:lumMod val="50000"/>
+                    <a:lumOff val="50000"/>
+                  </a:schemeClr>
+                </a:solidFill>
+              </a:rPr>
+              <a:t>Task 7: Publish Data to a catalog</a:t>
             </a:r>
           </a:p>
         </p:txBody>
@@ -14813,8 +15058,86 @@
           <a:lstStyle/>
           <a:p>
             <a:r>
-              <a:rPr lang="en-US" dirty="0"/>
-              <a:t>Task 4: Import Data to a project</a:t>
+              <a:rPr lang="en-US" dirty="0">
+                <a:solidFill>
+                  <a:schemeClr val="tx1">
+                    <a:lumMod val="50000"/>
+                    <a:lumOff val="50000"/>
+                  </a:schemeClr>
+                </a:solidFill>
+              </a:rPr>
+              <a:t>Task 1: Create a catalog</a:t>
+            </a:r>
+          </a:p>
+          <a:p>
+            <a:r>
+              <a:rPr lang="en-US" dirty="0">
+                <a:solidFill>
+                  <a:schemeClr val="tx1">
+                    <a:lumMod val="50000"/>
+                    <a:lumOff val="50000"/>
+                  </a:schemeClr>
+                </a:solidFill>
+              </a:rPr>
+              <a:t>Task 2: Create a category</a:t>
+            </a:r>
+          </a:p>
+          <a:p>
+            <a:r>
+              <a:rPr lang="en-US" dirty="0">
+                <a:solidFill>
+                  <a:schemeClr val="tx1">
+                    <a:lumMod val="50000"/>
+                    <a:lumOff val="50000"/>
+                  </a:schemeClr>
+                </a:solidFill>
+              </a:rPr>
+              <a:t>Task 3: Add business terms</a:t>
+            </a:r>
+          </a:p>
+          <a:p>
+            <a:r>
+              <a:rPr lang="en-US" b="1" dirty="0"/>
+              <a:t>&gt; Task 4: Import Data to a project</a:t>
+            </a:r>
+          </a:p>
+          <a:p>
+            <a:r>
+              <a:rPr lang="en-US" dirty="0">
+                <a:solidFill>
+                  <a:schemeClr val="tx1">
+                    <a:lumMod val="50000"/>
+                    <a:lumOff val="50000"/>
+                  </a:schemeClr>
+                </a:solidFill>
+              </a:rPr>
+              <a:t>Task 5: Enrich the imported data</a:t>
+            </a:r>
+          </a:p>
+          <a:p>
+            <a:r>
+              <a:rPr lang="en-US" dirty="0">
+                <a:solidFill>
+                  <a:schemeClr val="tx1">
+                    <a:lumMod val="50000"/>
+                    <a:lumOff val="50000"/>
+                  </a:schemeClr>
+                </a:solidFill>
+              </a:rPr>
+              <a:t>Task 6: View the results of the metadata enrichment</a:t>
+            </a:r>
+          </a:p>
+          <a:p>
+            <a:r>
+              <a:rPr lang="en-US" dirty="0">
+                <a:solidFill>
+                  <a:schemeClr val="tx1">
+                    <a:lumMod val="50000"/>
+                    <a:lumOff val="50000"/>
+                  </a:schemeClr>
+                </a:solidFill>
+              </a:rPr>
+              <a:t>Task 7: Publish Data to a catalog</a:t>
             </a:r>
           </a:p>
         </p:txBody>
@@ -15012,8 +15335,86 @@
           <a:lstStyle/>
           <a:p>
             <a:r>
-              <a:rPr lang="en-US" dirty="0"/>
-              <a:t>Task 5: Enrich the imported data</a:t>
+              <a:rPr lang="en-US" dirty="0">
+                <a:solidFill>
+                  <a:schemeClr val="tx1">
+                    <a:lumMod val="50000"/>
+                    <a:lumOff val="50000"/>
+                  </a:schemeClr>
+                </a:solidFill>
+              </a:rPr>
+              <a:t>Task 1: Create a catalog</a:t>
+            </a:r>
+          </a:p>
+          <a:p>
+            <a:r>
+              <a:rPr lang="en-US" dirty="0">
+                <a:solidFill>
+                  <a:schemeClr val="tx1">
+                    <a:lumMod val="50000"/>
+                    <a:lumOff val="50000"/>
+                  </a:schemeClr>
+                </a:solidFill>
+              </a:rPr>
+              <a:t>Task 2: Create a category</a:t>
+            </a:r>
+          </a:p>
+          <a:p>
+            <a:r>
+              <a:rPr lang="en-US" dirty="0">
+                <a:solidFill>
+                  <a:schemeClr val="tx1">
+                    <a:lumMod val="50000"/>
+                    <a:lumOff val="50000"/>
+                  </a:schemeClr>
+                </a:solidFill>
+              </a:rPr>
+              <a:t>Task 3: Add business terms</a:t>
+            </a:r>
+          </a:p>
+          <a:p>
+            <a:r>
+              <a:rPr lang="en-US" dirty="0">
+                <a:solidFill>
+                  <a:schemeClr val="tx1">
+                    <a:lumMod val="50000"/>
+                    <a:lumOff val="50000"/>
+                  </a:schemeClr>
+                </a:solidFill>
+              </a:rPr>
+              <a:t>Task 4: Import Data to a project</a:t>
+            </a:r>
+          </a:p>
+          <a:p>
+            <a:r>
+              <a:rPr lang="en-US" b="1" dirty="0"/>
+              <a:t>&gt; Task 5: Enrich the imported data</a:t>
+            </a:r>
+          </a:p>
+          <a:p>
+            <a:r>
+              <a:rPr lang="en-US" dirty="0">
+                <a:solidFill>
+                  <a:schemeClr val="tx1">
+                    <a:lumMod val="50000"/>
+                    <a:lumOff val="50000"/>
+                  </a:schemeClr>
+                </a:solidFill>
+              </a:rPr>
+              <a:t>Task 6: View the results of the metadata enrichment</a:t>
+            </a:r>
+          </a:p>
+          <a:p>
+            <a:r>
+              <a:rPr lang="en-US" dirty="0">
+                <a:solidFill>
+                  <a:schemeClr val="tx1">
+                    <a:lumMod val="50000"/>
+                    <a:lumOff val="50000"/>
+                  </a:schemeClr>
+                </a:solidFill>
+              </a:rPr>
+              <a:t>Task 7: Publish Data to a catalog</a:t>
             </a:r>
           </a:p>
         </p:txBody>
@@ -15211,8 +15612,86 @@
           <a:lstStyle/>
           <a:p>
             <a:r>
-              <a:rPr lang="en-US" dirty="0"/>
-              <a:t>Task 6: View the results of the metadata enrichment</a:t>
+              <a:rPr lang="en-US" dirty="0">
+                <a:solidFill>
+                  <a:schemeClr val="tx1">
+                    <a:lumMod val="50000"/>
+                    <a:lumOff val="50000"/>
+                  </a:schemeClr>
+                </a:solidFill>
+              </a:rPr>
+              <a:t>Task 1: Create a catalog</a:t>
+            </a:r>
+          </a:p>
+          <a:p>
+            <a:r>
+              <a:rPr lang="en-US" dirty="0">
+                <a:solidFill>
+                  <a:schemeClr val="tx1">
+                    <a:lumMod val="50000"/>
+                    <a:lumOff val="50000"/>
+                  </a:schemeClr>
+                </a:solidFill>
+              </a:rPr>
+              <a:t>Task 2: Create a category</a:t>
+            </a:r>
+          </a:p>
+          <a:p>
+            <a:r>
+              <a:rPr lang="en-US" dirty="0">
+                <a:solidFill>
+                  <a:schemeClr val="tx1">
+                    <a:lumMod val="50000"/>
+                    <a:lumOff val="50000"/>
+                  </a:schemeClr>
+                </a:solidFill>
+              </a:rPr>
+              <a:t>Task 3: Add business terms</a:t>
+            </a:r>
+          </a:p>
+          <a:p>
+            <a:r>
+              <a:rPr lang="en-US" dirty="0">
+                <a:solidFill>
+                  <a:schemeClr val="tx1">
+                    <a:lumMod val="50000"/>
+                    <a:lumOff val="50000"/>
+                  </a:schemeClr>
+                </a:solidFill>
+              </a:rPr>
+              <a:t>Task 4: Import Data to a project</a:t>
+            </a:r>
+          </a:p>
+          <a:p>
+            <a:r>
+              <a:rPr lang="en-US" dirty="0">
+                <a:solidFill>
+                  <a:schemeClr val="tx1">
+                    <a:lumMod val="50000"/>
+                    <a:lumOff val="50000"/>
+                  </a:schemeClr>
+                </a:solidFill>
+              </a:rPr>
+              <a:t>Task 5: Enrich the imported data</a:t>
+            </a:r>
+          </a:p>
+          <a:p>
+            <a:r>
+              <a:rPr lang="en-US" b="1" dirty="0"/>
+              <a:t>&gt; Task 6: View the results of the metadata enrichment</a:t>
+            </a:r>
+          </a:p>
+          <a:p>
+            <a:r>
+              <a:rPr lang="en-US" dirty="0">
+                <a:solidFill>
+                  <a:schemeClr val="tx1">
+                    <a:lumMod val="50000"/>
+                    <a:lumOff val="50000"/>
+                  </a:schemeClr>
+                </a:solidFill>
+              </a:rPr>
+              <a:t>Task 7: Publish Data to a catalog</a:t>
             </a:r>
           </a:p>
         </p:txBody>
@@ -15394,8 +15873,86 @@
           <a:lstStyle/>
           <a:p>
             <a:r>
-              <a:rPr lang="en-US" dirty="0"/>
-              <a:t>Task 7: Publish Data to a catalog</a:t>
+              <a:rPr lang="en-US" b="1" dirty="0">
+                <a:solidFill>
+                  <a:schemeClr val="tx1">
+                    <a:lumMod val="50000"/>
+                    <a:lumOff val="50000"/>
+                  </a:schemeClr>
+                </a:solidFill>
+              </a:rPr>
+              <a:t>Task 1: Create a catalog</a:t>
+            </a:r>
+          </a:p>
+          <a:p>
+            <a:r>
+              <a:rPr lang="en-US" dirty="0">
+                <a:solidFill>
+                  <a:schemeClr val="tx1">
+                    <a:lumMod val="50000"/>
+                    <a:lumOff val="50000"/>
+                  </a:schemeClr>
+                </a:solidFill>
+              </a:rPr>
+              <a:t>Task 2: Create a category</a:t>
+            </a:r>
+          </a:p>
+          <a:p>
+            <a:r>
+              <a:rPr lang="en-US" dirty="0">
+                <a:solidFill>
+                  <a:schemeClr val="tx1">
+                    <a:lumMod val="50000"/>
+                    <a:lumOff val="50000"/>
+                  </a:schemeClr>
+                </a:solidFill>
+              </a:rPr>
+              <a:t>Task 3: Add business terms</a:t>
+            </a:r>
+          </a:p>
+          <a:p>
+            <a:r>
+              <a:rPr lang="en-US" dirty="0">
+                <a:solidFill>
+                  <a:schemeClr val="tx1">
+                    <a:lumMod val="50000"/>
+                    <a:lumOff val="50000"/>
+                  </a:schemeClr>
+                </a:solidFill>
+              </a:rPr>
+              <a:t>Task 4: Import Data to a project</a:t>
+            </a:r>
+          </a:p>
+          <a:p>
+            <a:r>
+              <a:rPr lang="en-US" dirty="0">
+                <a:solidFill>
+                  <a:schemeClr val="tx1">
+                    <a:lumMod val="50000"/>
+                    <a:lumOff val="50000"/>
+                  </a:schemeClr>
+                </a:solidFill>
+              </a:rPr>
+              <a:t>Task 5: Enrich the imported data</a:t>
+            </a:r>
+          </a:p>
+          <a:p>
+            <a:r>
+              <a:rPr lang="en-US" dirty="0">
+                <a:solidFill>
+                  <a:schemeClr val="tx1">
+                    <a:lumMod val="50000"/>
+                    <a:lumOff val="50000"/>
+                  </a:schemeClr>
+                </a:solidFill>
+              </a:rPr>
+              <a:t>Task 6: View the results of the metadata enrichment</a:t>
+            </a:r>
+          </a:p>
+          <a:p>
+            <a:r>
+              <a:rPr lang="en-US" b="1" dirty="0"/>
+              <a:t>&gt; Task 7: Publish Data to a catalog</a:t>
             </a:r>
           </a:p>
         </p:txBody>

</xml_diff>

<commit_message>
Add prep step to wkc lab guidance
Signed-off-by: Nigel Jones <nigel.l.jones+git@gmail.com>
</commit_message>
<xml_diff>
--- a/data-governance-lab/DataAndGovernanceLab.pptx
+++ b/data-governance-lab/DataAndGovernanceLab.pptx
@@ -5,22 +5,23 @@
     <p:sldMasterId id="2147483891" r:id="rId1"/>
   </p:sldMasterIdLst>
   <p:notesMasterIdLst>
-    <p:notesMasterId r:id="rId12"/>
+    <p:notesMasterId r:id="rId13"/>
   </p:notesMasterIdLst>
   <p:handoutMasterIdLst>
-    <p:handoutMasterId r:id="rId13"/>
+    <p:handoutMasterId r:id="rId14"/>
   </p:handoutMasterIdLst>
   <p:sldIdLst>
     <p:sldId id="388" r:id="rId2"/>
     <p:sldId id="389" r:id="rId3"/>
-    <p:sldId id="390" r:id="rId4"/>
-    <p:sldId id="392" r:id="rId5"/>
-    <p:sldId id="393" r:id="rId6"/>
-    <p:sldId id="394" r:id="rId7"/>
-    <p:sldId id="396" r:id="rId8"/>
-    <p:sldId id="397" r:id="rId9"/>
-    <p:sldId id="398" r:id="rId10"/>
-    <p:sldId id="400" r:id="rId11"/>
+    <p:sldId id="401" r:id="rId4"/>
+    <p:sldId id="390" r:id="rId5"/>
+    <p:sldId id="392" r:id="rId6"/>
+    <p:sldId id="393" r:id="rId7"/>
+    <p:sldId id="394" r:id="rId8"/>
+    <p:sldId id="396" r:id="rId9"/>
+    <p:sldId id="397" r:id="rId10"/>
+    <p:sldId id="398" r:id="rId11"/>
+    <p:sldId id="400" r:id="rId12"/>
   </p:sldIdLst>
   <p:sldSz cx="9144000" cy="5143500" type="screen16x9"/>
   <p:notesSz cx="6858000" cy="9144000"/>
@@ -126,6 +127,7 @@
           <p14:sldIdLst>
             <p14:sldId id="388"/>
             <p14:sldId id="389"/>
+            <p14:sldId id="401"/>
             <p14:sldId id="390"/>
             <p14:sldId id="392"/>
             <p14:sldId id="393"/>
@@ -181,7 +183,7 @@
 <file path=ppt/revisionInfo.xml><?xml version="1.0" encoding="utf-8"?>
 <p1510:revInfo xmlns:a="http://schemas.openxmlformats.org/drawingml/2006/main" xmlns:r="http://schemas.openxmlformats.org/officeDocument/2006/relationships" xmlns:p1510="http://schemas.microsoft.com/office/powerpoint/2015/10/main">
   <p1510:revLst>
-    <p1510:client id="{52167A17-4B3C-0C4B-A355-FED5F0DA7317}" v="2" dt="2022-08-22T09:09:32.183"/>
+    <p1510:client id="{52167A17-4B3C-0C4B-A355-FED5F0DA7317}" v="3" dt="2022-08-24T13:31:59.962"/>
   </p1510:revLst>
 </p1510:revInfo>
 </file>
@@ -191,7 +193,7 @@
   <pc:docChgLst>
     <pc:chgData name="Nigel L Jones" userId="1512a2c5-99cf-401f-90da-0968559aa4c1" providerId="ADAL" clId="{52167A17-4B3C-0C4B-A355-FED5F0DA7317}"/>
     <pc:docChg chg="undo redo custSel addSld delSld modSld sldOrd delSection modSection">
-      <pc:chgData name="Nigel L Jones" userId="1512a2c5-99cf-401f-90da-0968559aa4c1" providerId="ADAL" clId="{52167A17-4B3C-0C4B-A355-FED5F0DA7317}" dt="2022-08-24T11:33:35.135" v="2914" actId="113"/>
+      <pc:chgData name="Nigel L Jones" userId="1512a2c5-99cf-401f-90da-0968559aa4c1" providerId="ADAL" clId="{52167A17-4B3C-0C4B-A355-FED5F0DA7317}" dt="2022-08-24T13:59:40.529" v="3303" actId="20577"/>
       <pc:docMkLst>
         <pc:docMk/>
       </pc:docMkLst>
@@ -812,7 +814,7 @@
         </pc:spChg>
       </pc:sldChg>
       <pc:sldChg chg="modSp new mod">
-        <pc:chgData name="Nigel L Jones" userId="1512a2c5-99cf-401f-90da-0968559aa4c1" providerId="ADAL" clId="{52167A17-4B3C-0C4B-A355-FED5F0DA7317}" dt="2022-08-24T11:29:44.448" v="2850" actId="20577"/>
+        <pc:chgData name="Nigel L Jones" userId="1512a2c5-99cf-401f-90da-0968559aa4c1" providerId="ADAL" clId="{52167A17-4B3C-0C4B-A355-FED5F0DA7317}" dt="2022-08-24T13:35:00.934" v="3206" actId="20577"/>
         <pc:sldMkLst>
           <pc:docMk/>
           <pc:sldMk cId="3691094387" sldId="390"/>
@@ -826,7 +828,7 @@
           </ac:spMkLst>
         </pc:spChg>
         <pc:spChg chg="mod">
-          <ac:chgData name="Nigel L Jones" userId="1512a2c5-99cf-401f-90da-0968559aa4c1" providerId="ADAL" clId="{52167A17-4B3C-0C4B-A355-FED5F0DA7317}" dt="2022-08-24T11:29:44.448" v="2850" actId="20577"/>
+          <ac:chgData name="Nigel L Jones" userId="1512a2c5-99cf-401f-90da-0968559aa4c1" providerId="ADAL" clId="{52167A17-4B3C-0C4B-A355-FED5F0DA7317}" dt="2022-08-24T13:35:00.934" v="3206" actId="20577"/>
           <ac:spMkLst>
             <pc:docMk/>
             <pc:sldMk cId="3691094387" sldId="390"/>
@@ -850,13 +852,13 @@
         </pc:sldMkLst>
       </pc:sldChg>
       <pc:sldChg chg="modSp add mod">
-        <pc:chgData name="Nigel L Jones" userId="1512a2c5-99cf-401f-90da-0968559aa4c1" providerId="ADAL" clId="{52167A17-4B3C-0C4B-A355-FED5F0DA7317}" dt="2022-08-24T11:32:29.903" v="2900" actId="113"/>
+        <pc:chgData name="Nigel L Jones" userId="1512a2c5-99cf-401f-90da-0968559aa4c1" providerId="ADAL" clId="{52167A17-4B3C-0C4B-A355-FED5F0DA7317}" dt="2022-08-24T13:35:05.938" v="3207"/>
         <pc:sldMkLst>
           <pc:docMk/>
           <pc:sldMk cId="4108947352" sldId="392"/>
         </pc:sldMkLst>
         <pc:spChg chg="mod">
-          <ac:chgData name="Nigel L Jones" userId="1512a2c5-99cf-401f-90da-0968559aa4c1" providerId="ADAL" clId="{52167A17-4B3C-0C4B-A355-FED5F0DA7317}" dt="2022-08-24T11:32:29.903" v="2900" actId="113"/>
+          <ac:chgData name="Nigel L Jones" userId="1512a2c5-99cf-401f-90da-0968559aa4c1" providerId="ADAL" clId="{52167A17-4B3C-0C4B-A355-FED5F0DA7317}" dt="2022-08-24T13:35:05.938" v="3207"/>
           <ac:spMkLst>
             <pc:docMk/>
             <pc:sldMk cId="4108947352" sldId="392"/>
@@ -873,13 +875,13 @@
         </pc:spChg>
       </pc:sldChg>
       <pc:sldChg chg="modSp add mod">
-        <pc:chgData name="Nigel L Jones" userId="1512a2c5-99cf-401f-90da-0968559aa4c1" providerId="ADAL" clId="{52167A17-4B3C-0C4B-A355-FED5F0DA7317}" dt="2022-08-24T11:32:37.906" v="2902" actId="113"/>
+        <pc:chgData name="Nigel L Jones" userId="1512a2c5-99cf-401f-90da-0968559aa4c1" providerId="ADAL" clId="{52167A17-4B3C-0C4B-A355-FED5F0DA7317}" dt="2022-08-24T13:35:08.280" v="3208"/>
         <pc:sldMkLst>
           <pc:docMk/>
           <pc:sldMk cId="3289550124" sldId="393"/>
         </pc:sldMkLst>
         <pc:spChg chg="mod">
-          <ac:chgData name="Nigel L Jones" userId="1512a2c5-99cf-401f-90da-0968559aa4c1" providerId="ADAL" clId="{52167A17-4B3C-0C4B-A355-FED5F0DA7317}" dt="2022-08-24T11:32:37.906" v="2902" actId="113"/>
+          <ac:chgData name="Nigel L Jones" userId="1512a2c5-99cf-401f-90da-0968559aa4c1" providerId="ADAL" clId="{52167A17-4B3C-0C4B-A355-FED5F0DA7317}" dt="2022-08-24T13:35:08.280" v="3208"/>
           <ac:spMkLst>
             <pc:docMk/>
             <pc:sldMk cId="3289550124" sldId="393"/>
@@ -896,13 +898,13 @@
         </pc:spChg>
       </pc:sldChg>
       <pc:sldChg chg="modSp add mod">
-        <pc:chgData name="Nigel L Jones" userId="1512a2c5-99cf-401f-90da-0968559aa4c1" providerId="ADAL" clId="{52167A17-4B3C-0C4B-A355-FED5F0DA7317}" dt="2022-08-24T11:32:56.412" v="2907" actId="113"/>
+        <pc:chgData name="Nigel L Jones" userId="1512a2c5-99cf-401f-90da-0968559aa4c1" providerId="ADAL" clId="{52167A17-4B3C-0C4B-A355-FED5F0DA7317}" dt="2022-08-24T13:35:10.929" v="3209"/>
         <pc:sldMkLst>
           <pc:docMk/>
           <pc:sldMk cId="4069238537" sldId="394"/>
         </pc:sldMkLst>
         <pc:spChg chg="mod">
-          <ac:chgData name="Nigel L Jones" userId="1512a2c5-99cf-401f-90da-0968559aa4c1" providerId="ADAL" clId="{52167A17-4B3C-0C4B-A355-FED5F0DA7317}" dt="2022-08-24T11:32:56.412" v="2907" actId="113"/>
+          <ac:chgData name="Nigel L Jones" userId="1512a2c5-99cf-401f-90da-0968559aa4c1" providerId="ADAL" clId="{52167A17-4B3C-0C4B-A355-FED5F0DA7317}" dt="2022-08-24T13:35:10.929" v="3209"/>
           <ac:spMkLst>
             <pc:docMk/>
             <pc:sldMk cId="4069238537" sldId="394"/>
@@ -926,13 +928,13 @@
         </pc:sldMkLst>
       </pc:sldChg>
       <pc:sldChg chg="addSp delSp modSp add mod">
-        <pc:chgData name="Nigel L Jones" userId="1512a2c5-99cf-401f-90da-0968559aa4c1" providerId="ADAL" clId="{52167A17-4B3C-0C4B-A355-FED5F0DA7317}" dt="2022-08-24T11:32:08.942" v="2897" actId="113"/>
+        <pc:chgData name="Nigel L Jones" userId="1512a2c5-99cf-401f-90da-0968559aa4c1" providerId="ADAL" clId="{52167A17-4B3C-0C4B-A355-FED5F0DA7317}" dt="2022-08-24T13:35:14.309" v="3210"/>
         <pc:sldMkLst>
           <pc:docMk/>
           <pc:sldMk cId="1396749739" sldId="396"/>
         </pc:sldMkLst>
         <pc:spChg chg="mod">
-          <ac:chgData name="Nigel L Jones" userId="1512a2c5-99cf-401f-90da-0968559aa4c1" providerId="ADAL" clId="{52167A17-4B3C-0C4B-A355-FED5F0DA7317}" dt="2022-08-24T11:32:08.942" v="2897" actId="113"/>
+          <ac:chgData name="Nigel L Jones" userId="1512a2c5-99cf-401f-90da-0968559aa4c1" providerId="ADAL" clId="{52167A17-4B3C-0C4B-A355-FED5F0DA7317}" dt="2022-08-24T13:35:14.309" v="3210"/>
           <ac:spMkLst>
             <pc:docMk/>
             <pc:sldMk cId="1396749739" sldId="396"/>
@@ -957,13 +959,13 @@
         </pc:spChg>
       </pc:sldChg>
       <pc:sldChg chg="modSp add mod">
-        <pc:chgData name="Nigel L Jones" userId="1512a2c5-99cf-401f-90da-0968559aa4c1" providerId="ADAL" clId="{52167A17-4B3C-0C4B-A355-FED5F0DA7317}" dt="2022-08-24T11:33:35.135" v="2914" actId="113"/>
+        <pc:chgData name="Nigel L Jones" userId="1512a2c5-99cf-401f-90da-0968559aa4c1" providerId="ADAL" clId="{52167A17-4B3C-0C4B-A355-FED5F0DA7317}" dt="2022-08-24T13:35:17.492" v="3211"/>
         <pc:sldMkLst>
           <pc:docMk/>
           <pc:sldMk cId="1631231316" sldId="397"/>
         </pc:sldMkLst>
         <pc:spChg chg="mod">
-          <ac:chgData name="Nigel L Jones" userId="1512a2c5-99cf-401f-90da-0968559aa4c1" providerId="ADAL" clId="{52167A17-4B3C-0C4B-A355-FED5F0DA7317}" dt="2022-08-24T11:33:35.135" v="2914" actId="113"/>
+          <ac:chgData name="Nigel L Jones" userId="1512a2c5-99cf-401f-90da-0968559aa4c1" providerId="ADAL" clId="{52167A17-4B3C-0C4B-A355-FED5F0DA7317}" dt="2022-08-24T13:35:17.492" v="3211"/>
           <ac:spMkLst>
             <pc:docMk/>
             <pc:sldMk cId="1631231316" sldId="397"/>
@@ -980,13 +982,13 @@
         </pc:spChg>
       </pc:sldChg>
       <pc:sldChg chg="modSp add mod">
-        <pc:chgData name="Nigel L Jones" userId="1512a2c5-99cf-401f-90da-0968559aa4c1" providerId="ADAL" clId="{52167A17-4B3C-0C4B-A355-FED5F0DA7317}" dt="2022-08-24T11:33:21.572" v="2911" actId="113"/>
+        <pc:chgData name="Nigel L Jones" userId="1512a2c5-99cf-401f-90da-0968559aa4c1" providerId="ADAL" clId="{52167A17-4B3C-0C4B-A355-FED5F0DA7317}" dt="2022-08-24T13:35:20.352" v="3212"/>
         <pc:sldMkLst>
           <pc:docMk/>
           <pc:sldMk cId="541345078" sldId="398"/>
         </pc:sldMkLst>
         <pc:spChg chg="mod">
-          <ac:chgData name="Nigel L Jones" userId="1512a2c5-99cf-401f-90da-0968559aa4c1" providerId="ADAL" clId="{52167A17-4B3C-0C4B-A355-FED5F0DA7317}" dt="2022-08-24T11:33:21.572" v="2911" actId="113"/>
+          <ac:chgData name="Nigel L Jones" userId="1512a2c5-99cf-401f-90da-0968559aa4c1" providerId="ADAL" clId="{52167A17-4B3C-0C4B-A355-FED5F0DA7317}" dt="2022-08-24T13:35:20.352" v="3212"/>
           <ac:spMkLst>
             <pc:docMk/>
             <pc:sldMk cId="541345078" sldId="398"/>
@@ -1028,6 +1030,29 @@
           <ac:spMkLst>
             <pc:docMk/>
             <pc:sldMk cId="1807981701" sldId="400"/>
+            <ac:spMk id="4" creationId="{1254813B-7D84-6DBA-D36E-D97BD5B9D835}"/>
+          </ac:spMkLst>
+        </pc:spChg>
+      </pc:sldChg>
+      <pc:sldChg chg="modSp add mod">
+        <pc:chgData name="Nigel L Jones" userId="1512a2c5-99cf-401f-90da-0968559aa4c1" providerId="ADAL" clId="{52167A17-4B3C-0C4B-A355-FED5F0DA7317}" dt="2022-08-24T13:59:40.529" v="3303" actId="20577"/>
+        <pc:sldMkLst>
+          <pc:docMk/>
+          <pc:sldMk cId="4223275327" sldId="401"/>
+        </pc:sldMkLst>
+        <pc:spChg chg="mod">
+          <ac:chgData name="Nigel L Jones" userId="1512a2c5-99cf-401f-90da-0968559aa4c1" providerId="ADAL" clId="{52167A17-4B3C-0C4B-A355-FED5F0DA7317}" dt="2022-08-24T13:34:54.742" v="3195" actId="20577"/>
+          <ac:spMkLst>
+            <pc:docMk/>
+            <pc:sldMk cId="4223275327" sldId="401"/>
+            <ac:spMk id="3" creationId="{AA1848F7-2B9E-BB2D-8B99-107DF3F1D4A4}"/>
+          </ac:spMkLst>
+        </pc:spChg>
+        <pc:spChg chg="mod">
+          <ac:chgData name="Nigel L Jones" userId="1512a2c5-99cf-401f-90da-0968559aa4c1" providerId="ADAL" clId="{52167A17-4B3C-0C4B-A355-FED5F0DA7317}" dt="2022-08-24T13:59:40.529" v="3303" actId="20577"/>
+          <ac:spMkLst>
+            <pc:docMk/>
+            <pc:sldMk cId="4223275327" sldId="401"/>
             <ac:spMk id="4" creationId="{1254813B-7D84-6DBA-D36E-D97BD5B9D835}"/>
           </ac:spMkLst>
         </pc:spChg>
@@ -13879,8 +13904,99 @@
           <a:lstStyle/>
           <a:p>
             <a:r>
-              <a:rPr lang="en-US" dirty="0"/>
-              <a:t>OPTIONAL - Protect your data</a:t>
+              <a:rPr lang="en-US" dirty="0">
+                <a:solidFill>
+                  <a:schemeClr val="tx1">
+                    <a:lumMod val="50000"/>
+                    <a:lumOff val="50000"/>
+                  </a:schemeClr>
+                </a:solidFill>
+              </a:rPr>
+              <a:t>Task 0: Preparation</a:t>
+            </a:r>
+          </a:p>
+          <a:p>
+            <a:r>
+              <a:rPr lang="en-US" b="1" dirty="0">
+                <a:solidFill>
+                  <a:schemeClr val="tx1">
+                    <a:lumMod val="50000"/>
+                    <a:lumOff val="50000"/>
+                  </a:schemeClr>
+                </a:solidFill>
+              </a:rPr>
+              <a:t>Task 1: Create a catalog</a:t>
+            </a:r>
+          </a:p>
+          <a:p>
+            <a:r>
+              <a:rPr lang="en-US" dirty="0">
+                <a:solidFill>
+                  <a:schemeClr val="tx1">
+                    <a:lumMod val="50000"/>
+                    <a:lumOff val="50000"/>
+                  </a:schemeClr>
+                </a:solidFill>
+              </a:rPr>
+              <a:t>Task 2: Create a category</a:t>
+            </a:r>
+          </a:p>
+          <a:p>
+            <a:r>
+              <a:rPr lang="en-US" dirty="0">
+                <a:solidFill>
+                  <a:schemeClr val="tx1">
+                    <a:lumMod val="50000"/>
+                    <a:lumOff val="50000"/>
+                  </a:schemeClr>
+                </a:solidFill>
+              </a:rPr>
+              <a:t>Task 3: Add business terms</a:t>
+            </a:r>
+          </a:p>
+          <a:p>
+            <a:r>
+              <a:rPr lang="en-US" dirty="0">
+                <a:solidFill>
+                  <a:schemeClr val="tx1">
+                    <a:lumMod val="50000"/>
+                    <a:lumOff val="50000"/>
+                  </a:schemeClr>
+                </a:solidFill>
+              </a:rPr>
+              <a:t>Task 4: Import Data to a project</a:t>
+            </a:r>
+          </a:p>
+          <a:p>
+            <a:r>
+              <a:rPr lang="en-US" dirty="0">
+                <a:solidFill>
+                  <a:schemeClr val="tx1">
+                    <a:lumMod val="50000"/>
+                    <a:lumOff val="50000"/>
+                  </a:schemeClr>
+                </a:solidFill>
+              </a:rPr>
+              <a:t>Task 5: Enrich the imported data</a:t>
+            </a:r>
+          </a:p>
+          <a:p>
+            <a:r>
+              <a:rPr lang="en-US" dirty="0">
+                <a:solidFill>
+                  <a:schemeClr val="tx1">
+                    <a:lumMod val="50000"/>
+                    <a:lumOff val="50000"/>
+                  </a:schemeClr>
+                </a:solidFill>
+              </a:rPr>
+              <a:t>Task 6: View the results of the metadata enrichment</a:t>
+            </a:r>
+          </a:p>
+          <a:p>
+            <a:r>
+              <a:rPr lang="en-US" b="1" dirty="0"/>
+              <a:t>&gt; Task 7: Publish Data to a catalog</a:t>
             </a:r>
           </a:p>
         </p:txBody>
@@ -13908,23 +14024,7 @@
           <a:p>
             <a:r>
               <a:rPr lang="en-US" dirty="0"/>
-              <a:t>If you have completed the previous steps, you can continue on in the tutorials.</a:t>
-            </a:r>
-            <a:br>
-              <a:rPr lang="en-US" dirty="0"/>
-            </a:br>
-            <a:br>
-              <a:rPr lang="en-US" dirty="0"/>
-            </a:br>
-            <a:r>
-              <a:rPr lang="en-US" dirty="0"/>
-              <a:t>The next section walks through how to apply data protection rules to the assets to control what users can see – perhaps being denied access, or being subject to data masking</a:t>
-            </a:r>
-          </a:p>
-          <a:p>
-            <a:r>
-              <a:rPr lang="en-US" dirty="0"/>
-              <a:t>You can work through additional exercises in your own time. </a:t>
+              <a:t>Enriched data can now be published to a catalog so that others users including data scientists and analysts can use the trusted data</a:t>
             </a:r>
           </a:p>
         </p:txBody>
@@ -13983,6 +14083,195 @@
               <a:rPr lang="en-US" smtClean="0"/>
               <a:pPr/>
               <a:t>10</a:t>
+            </a:fld>
+            <a:endParaRPr lang="en-US" dirty="0"/>
+          </a:p>
+        </p:txBody>
+      </p:sp>
+    </p:spTree>
+    <p:extLst>
+      <p:ext uri="{BB962C8B-B14F-4D97-AF65-F5344CB8AC3E}">
+        <p14:creationId xmlns:p14="http://schemas.microsoft.com/office/powerpoint/2010/main" val="541345078"/>
+      </p:ext>
+    </p:extLst>
+  </p:cSld>
+  <p:clrMapOvr>
+    <a:masterClrMapping/>
+  </p:clrMapOvr>
+</p:sld>
+</file>
+
+<file path=ppt/slides/slide11.xml><?xml version="1.0" encoding="utf-8"?>
+<p:sld xmlns:a="http://schemas.openxmlformats.org/drawingml/2006/main" xmlns:r="http://schemas.openxmlformats.org/officeDocument/2006/relationships" xmlns:p="http://schemas.openxmlformats.org/presentationml/2006/main">
+  <p:cSld>
+    <p:spTree>
+      <p:nvGrpSpPr>
+        <p:cNvPr id="1" name=""/>
+        <p:cNvGrpSpPr/>
+        <p:nvPr/>
+      </p:nvGrpSpPr>
+      <p:grpSpPr>
+        <a:xfrm>
+          <a:off x="0" y="0"/>
+          <a:ext cx="0" cy="0"/>
+          <a:chOff x="0" y="0"/>
+          <a:chExt cx="0" cy="0"/>
+        </a:xfrm>
+      </p:grpSpPr>
+      <p:sp>
+        <p:nvSpPr>
+          <p:cNvPr id="2" name="Title 1">
+            <a:extLst>
+              <a:ext uri="{FF2B5EF4-FFF2-40B4-BE49-F238E27FC236}">
+                <a16:creationId xmlns:a16="http://schemas.microsoft.com/office/drawing/2014/main" id="{2FF32D47-094C-3408-4AC0-690B51218BE3}"/>
+              </a:ext>
+            </a:extLst>
+          </p:cNvPr>
+          <p:cNvSpPr>
+            <a:spLocks noGrp="1"/>
+          </p:cNvSpPr>
+          <p:nvPr>
+            <p:ph type="title"/>
+          </p:nvPr>
+        </p:nvSpPr>
+        <p:spPr/>
+        <p:txBody>
+          <a:bodyPr/>
+          <a:lstStyle/>
+          <a:p>
+            <a:r>
+              <a:rPr lang="en-US" dirty="0"/>
+              <a:t>Data governance &amp; privacy tutorial</a:t>
+            </a:r>
+          </a:p>
+        </p:txBody>
+      </p:sp>
+      <p:sp>
+        <p:nvSpPr>
+          <p:cNvPr id="3" name="Text Placeholder 2">
+            <a:extLst>
+              <a:ext uri="{FF2B5EF4-FFF2-40B4-BE49-F238E27FC236}">
+                <a16:creationId xmlns:a16="http://schemas.microsoft.com/office/drawing/2014/main" id="{AA1848F7-2B9E-BB2D-8B99-107DF3F1D4A4}"/>
+              </a:ext>
+            </a:extLst>
+          </p:cNvPr>
+          <p:cNvSpPr>
+            <a:spLocks noGrp="1"/>
+          </p:cNvSpPr>
+          <p:nvPr>
+            <p:ph type="body" sz="quarter" idx="13"/>
+          </p:nvPr>
+        </p:nvSpPr>
+        <p:spPr/>
+        <p:txBody>
+          <a:bodyPr/>
+          <a:lstStyle/>
+          <a:p>
+            <a:r>
+              <a:rPr lang="en-US" dirty="0"/>
+              <a:t>OPTIONAL - Protect your data</a:t>
+            </a:r>
+          </a:p>
+        </p:txBody>
+      </p:sp>
+      <p:sp>
+        <p:nvSpPr>
+          <p:cNvPr id="4" name="Text Placeholder 3">
+            <a:extLst>
+              <a:ext uri="{FF2B5EF4-FFF2-40B4-BE49-F238E27FC236}">
+                <a16:creationId xmlns:a16="http://schemas.microsoft.com/office/drawing/2014/main" id="{1254813B-7D84-6DBA-D36E-D97BD5B9D835}"/>
+              </a:ext>
+            </a:extLst>
+          </p:cNvPr>
+          <p:cNvSpPr>
+            <a:spLocks noGrp="1"/>
+          </p:cNvSpPr>
+          <p:nvPr>
+            <p:ph type="body" sz="quarter" idx="12"/>
+          </p:nvPr>
+        </p:nvSpPr>
+        <p:spPr/>
+        <p:txBody>
+          <a:bodyPr/>
+          <a:lstStyle/>
+          <a:p>
+            <a:r>
+              <a:rPr lang="en-US" dirty="0"/>
+              <a:t>If you have completed the previous steps, you can continue on in the tutorials.</a:t>
+            </a:r>
+            <a:br>
+              <a:rPr lang="en-US" dirty="0"/>
+            </a:br>
+            <a:br>
+              <a:rPr lang="en-US" dirty="0"/>
+            </a:br>
+            <a:r>
+              <a:rPr lang="en-US" dirty="0"/>
+              <a:t>The next section walks through how to apply data protection rules to the assets to control what users can see – perhaps being denied access, or being subject to data masking</a:t>
+            </a:r>
+          </a:p>
+          <a:p>
+            <a:r>
+              <a:rPr lang="en-US" dirty="0"/>
+              <a:t>You can work through additional exercises in your own time. </a:t>
+            </a:r>
+          </a:p>
+        </p:txBody>
+      </p:sp>
+      <p:sp>
+        <p:nvSpPr>
+          <p:cNvPr id="5" name="Footer Placeholder 4">
+            <a:extLst>
+              <a:ext uri="{FF2B5EF4-FFF2-40B4-BE49-F238E27FC236}">
+                <a16:creationId xmlns:a16="http://schemas.microsoft.com/office/drawing/2014/main" id="{BD58EEF9-97D2-C3C4-E1C1-F399FF5621FE}"/>
+              </a:ext>
+            </a:extLst>
+          </p:cNvPr>
+          <p:cNvSpPr>
+            <a:spLocks noGrp="1"/>
+          </p:cNvSpPr>
+          <p:nvPr>
+            <p:ph type="ftr" sz="quarter" idx="10"/>
+          </p:nvPr>
+        </p:nvSpPr>
+        <p:spPr/>
+        <p:txBody>
+          <a:bodyPr/>
+          <a:lstStyle/>
+          <a:p>
+            <a:r>
+              <a:rPr lang="en-US"/>
+              <a:t>Group Name / DOC ID / Month XX, 2022 / © 2022 IBM Corporation</a:t>
+            </a:r>
+            <a:endParaRPr lang="en-US" dirty="0"/>
+          </a:p>
+        </p:txBody>
+      </p:sp>
+      <p:sp>
+        <p:nvSpPr>
+          <p:cNvPr id="6" name="Slide Number Placeholder 5">
+            <a:extLst>
+              <a:ext uri="{FF2B5EF4-FFF2-40B4-BE49-F238E27FC236}">
+                <a16:creationId xmlns:a16="http://schemas.microsoft.com/office/drawing/2014/main" id="{146F3831-8E2E-B533-24FE-25AC3BC042DC}"/>
+              </a:ext>
+            </a:extLst>
+          </p:cNvPr>
+          <p:cNvSpPr>
+            <a:spLocks noGrp="1"/>
+          </p:cNvSpPr>
+          <p:nvPr>
+            <p:ph type="sldNum" sz="quarter" idx="11"/>
+          </p:nvPr>
+        </p:nvSpPr>
+        <p:spPr/>
+        <p:txBody>
+          <a:bodyPr/>
+          <a:lstStyle/>
+          <a:p>
+            <a:fld id="{59395FB3-9C97-154F-86B2-7E381B951268}" type="slidenum">
+              <a:rPr lang="en-US" smtClean="0"/>
+              <a:pPr/>
+              <a:t>11</a:t>
             </a:fld>
             <a:endParaRPr lang="en-US" dirty="0"/>
           </a:p>
@@ -14274,7 +14563,20 @@
           <a:p>
             <a:r>
               <a:rPr lang="en-US" b="1" dirty="0"/>
-              <a:t>&gt; Task 1: Create a catalog</a:t>
+              <a:t>&gt; Task 0: Preparation</a:t>
+            </a:r>
+          </a:p>
+          <a:p>
+            <a:r>
+              <a:rPr lang="en-US" dirty="0">
+                <a:solidFill>
+                  <a:schemeClr val="tx1">
+                    <a:lumMod val="50000"/>
+                    <a:lumOff val="50000"/>
+                  </a:schemeClr>
+                </a:solidFill>
+              </a:rPr>
+              <a:t>Task 1: Create a catalog</a:t>
             </a:r>
           </a:p>
           <a:p>
@@ -14383,8 +14685,53 @@
           <a:p>
             <a:r>
               <a:rPr lang="en-US" dirty="0"/>
-              <a:t>This step creates a catalog in Watson Knowledge Catalog where data will be published to</a:t>
-            </a:r>
+              <a:t>In this task we:</a:t>
+            </a:r>
+          </a:p>
+          <a:p>
+            <a:pPr marL="285750" indent="-285750">
+              <a:buFont typeface="Arial" panose="020B0604020202020204" pitchFamily="34" charset="0"/>
+              <a:buChar char="•"/>
+            </a:pPr>
+            <a:r>
+              <a:rPr lang="en-US" dirty="0"/>
+              <a:t>Ensure you are signed up for Cloud Pak for Data as a Service &amp; logged in</a:t>
+            </a:r>
+          </a:p>
+          <a:p>
+            <a:pPr marL="285750" indent="-285750">
+              <a:buFont typeface="Arial" panose="020B0604020202020204" pitchFamily="34" charset="0"/>
+              <a:buChar char="•"/>
+            </a:pPr>
+            <a:r>
+              <a:rPr lang="en-US" dirty="0"/>
+              <a:t>Provision the services needed for the lab</a:t>
+            </a:r>
+          </a:p>
+          <a:p>
+            <a:pPr marL="285750" indent="-285750">
+              <a:buFont typeface="Arial" panose="020B0604020202020204" pitchFamily="34" charset="0"/>
+              <a:buChar char="•"/>
+            </a:pPr>
+            <a:r>
+              <a:rPr lang="en-US" dirty="0"/>
+              <a:t>Create a project from a tutorial template</a:t>
+            </a:r>
+          </a:p>
+          <a:p>
+            <a:pPr marL="285750" indent="-285750">
+              <a:buFont typeface="Arial" panose="020B0604020202020204" pitchFamily="34" charset="0"/>
+              <a:buChar char="•"/>
+            </a:pPr>
+            <a:r>
+              <a:rPr lang="en-US" dirty="0"/>
+              <a:t>Import </a:t>
+            </a:r>
+            <a:r>
+              <a:rPr lang="en-US"/>
+              <a:t>Banking terms </a:t>
+            </a:r>
+            <a:endParaRPr lang="en-US" dirty="0"/>
           </a:p>
         </p:txBody>
       </p:sp>
@@ -14450,7 +14797,7 @@
     </p:spTree>
     <p:extLst>
       <p:ext uri="{BB962C8B-B14F-4D97-AF65-F5344CB8AC3E}">
-        <p14:creationId xmlns:p14="http://schemas.microsoft.com/office/powerpoint/2010/main" val="3691094387"/>
+        <p14:creationId xmlns:p14="http://schemas.microsoft.com/office/powerpoint/2010/main" val="4223275327"/>
       </p:ext>
     </p:extLst>
   </p:cSld>
@@ -14535,13 +14882,13 @@
                   </a:schemeClr>
                 </a:solidFill>
               </a:rPr>
-              <a:t>Task 1: Create a catalog</a:t>
+              <a:t>Task 0: Preparation</a:t>
             </a:r>
           </a:p>
           <a:p>
             <a:r>
               <a:rPr lang="en-US" b="1" dirty="0"/>
-              <a:t>&gt; Task 2: Create a category</a:t>
+              <a:t>&gt; Task 1: Create a catalog</a:t>
             </a:r>
           </a:p>
           <a:p>
@@ -14554,7 +14901,7 @@
                   </a:schemeClr>
                 </a:solidFill>
               </a:rPr>
-              <a:t>Task 3: Add business terms</a:t>
+              <a:t>Task 2: Create a category</a:t>
             </a:r>
           </a:p>
           <a:p>
@@ -14567,7 +14914,7 @@
                   </a:schemeClr>
                 </a:solidFill>
               </a:rPr>
-              <a:t>Task 4: Import Data to a project</a:t>
+              <a:t>Task 3: Add business terms</a:t>
             </a:r>
           </a:p>
           <a:p>
@@ -14580,7 +14927,7 @@
                   </a:schemeClr>
                 </a:solidFill>
               </a:rPr>
-              <a:t>Task 5: Enrich the imported data</a:t>
+              <a:t>Task 4: Import Data to a project</a:t>
             </a:r>
           </a:p>
           <a:p>
@@ -14593,7 +14940,7 @@
                   </a:schemeClr>
                 </a:solidFill>
               </a:rPr>
-              <a:t>Task 6: View the results of the metadata enrichment</a:t>
+              <a:t>Task 5: Enrich the imported data</a:t>
             </a:r>
           </a:p>
           <a:p>
@@ -14606,8 +14953,24 @@
                   </a:schemeClr>
                 </a:solidFill>
               </a:rPr>
+              <a:t>Task 6: View the results of the metadata enrichment</a:t>
+            </a:r>
+          </a:p>
+          <a:p>
+            <a:r>
+              <a:rPr lang="en-US" dirty="0">
+                <a:solidFill>
+                  <a:schemeClr val="tx1">
+                    <a:lumMod val="50000"/>
+                    <a:lumOff val="50000"/>
+                  </a:schemeClr>
+                </a:solidFill>
+              </a:rPr>
               <a:t>Task 7: Publish Data to a catalog</a:t>
             </a:r>
+          </a:p>
+          <a:p>
+            <a:endParaRPr lang="en-US" dirty="0"/>
           </a:p>
         </p:txBody>
       </p:sp>
@@ -14634,13 +14997,7 @@
           <a:p>
             <a:r>
               <a:rPr lang="en-US" dirty="0"/>
-              <a:t>We create a category to contain business terms associated with Banking</a:t>
-            </a:r>
-          </a:p>
-          <a:p>
-            <a:r>
-              <a:rPr lang="en-US" dirty="0"/>
-              <a:t>In a real environment a banking environment will use many categories which act as folders to organize the terms</a:t>
+              <a:t>This step creates a catalog in Watson Knowledge Catalog where data will be published to</a:t>
             </a:r>
           </a:p>
         </p:txBody>
@@ -14707,7 +15064,7 @@
     </p:spTree>
     <p:extLst>
       <p:ext uri="{BB962C8B-B14F-4D97-AF65-F5344CB8AC3E}">
-        <p14:creationId xmlns:p14="http://schemas.microsoft.com/office/powerpoint/2010/main" val="4108947352"/>
+        <p14:creationId xmlns:p14="http://schemas.microsoft.com/office/powerpoint/2010/main" val="3691094387"/>
       </p:ext>
     </p:extLst>
   </p:cSld>
@@ -14792,7 +15149,7 @@
                   </a:schemeClr>
                 </a:solidFill>
               </a:rPr>
-              <a:t>Task 1: Create a catalog</a:t>
+              <a:t>Task 0: Preparation</a:t>
             </a:r>
           </a:p>
           <a:p>
@@ -14805,13 +15162,26 @@
                   </a:schemeClr>
                 </a:solidFill>
               </a:rPr>
-              <a:t>Task 2: Create a category</a:t>
+              <a:t>Task 1: Create a catalog</a:t>
             </a:r>
           </a:p>
           <a:p>
             <a:r>
               <a:rPr lang="en-US" b="1" dirty="0"/>
-              <a:t>&gt; Task 3: Add business terms</a:t>
+              <a:t>&gt; Task 2: Create a category</a:t>
+            </a:r>
+          </a:p>
+          <a:p>
+            <a:r>
+              <a:rPr lang="en-US" dirty="0">
+                <a:solidFill>
+                  <a:schemeClr val="tx1">
+                    <a:lumMod val="50000"/>
+                    <a:lumOff val="50000"/>
+                  </a:schemeClr>
+                </a:solidFill>
+              </a:rPr>
+              <a:t>Task 3: Add business terms</a:t>
             </a:r>
           </a:p>
           <a:p>
@@ -14889,32 +15259,15 @@
           <a:bodyPr/>
           <a:lstStyle/>
           <a:p>
-            <a:br>
+            <a:r>
               <a:rPr lang="en-US" dirty="0"/>
-            </a:br>
+              <a:t>We create a category to contain business terms associated with Banking</a:t>
+            </a:r>
+          </a:p>
+          <a:p>
             <a:r>
               <a:rPr lang="en-US" dirty="0"/>
-              <a:t>We add banking related business terms (definitions of concepts in banking) from a .csv file into the category we just created.</a:t>
-            </a:r>
-            <a:br>
-              <a:rPr lang="en-US" dirty="0"/>
-            </a:br>
-            <a:br>
-              <a:rPr lang="en-US" dirty="0"/>
-            </a:br>
-            <a:r>
-              <a:rPr lang="en-US" dirty="0"/>
-              <a:t>Terms are initially created as draft so that they can be reviewed.</a:t>
-            </a:r>
-            <a:br>
-              <a:rPr lang="en-US" dirty="0"/>
-            </a:br>
-            <a:br>
-              <a:rPr lang="en-US" dirty="0"/>
-            </a:br>
-            <a:r>
-              <a:rPr lang="en-US" dirty="0"/>
-              <a:t>We then publish the business terms to make them available to users</a:t>
+              <a:t>In a real environment a banking environment will use many categories which act as folders to organize the terms</a:t>
             </a:r>
           </a:p>
         </p:txBody>
@@ -14981,7 +15334,7 @@
     </p:spTree>
     <p:extLst>
       <p:ext uri="{BB962C8B-B14F-4D97-AF65-F5344CB8AC3E}">
-        <p14:creationId xmlns:p14="http://schemas.microsoft.com/office/powerpoint/2010/main" val="3289550124"/>
+        <p14:creationId xmlns:p14="http://schemas.microsoft.com/office/powerpoint/2010/main" val="4108947352"/>
       </p:ext>
     </p:extLst>
   </p:cSld>
@@ -15066,7 +15419,7 @@
                   </a:schemeClr>
                 </a:solidFill>
               </a:rPr>
-              <a:t>Task 1: Create a catalog</a:t>
+              <a:t>Task 0: Preparation</a:t>
             </a:r>
           </a:p>
           <a:p>
@@ -15079,7 +15432,7 @@
                   </a:schemeClr>
                 </a:solidFill>
               </a:rPr>
-              <a:t>Task 2: Create a category</a:t>
+              <a:t>Task 1: Create a catalog</a:t>
             </a:r>
           </a:p>
           <a:p>
@@ -15092,13 +15445,26 @@
                   </a:schemeClr>
                 </a:solidFill>
               </a:rPr>
-              <a:t>Task 3: Add business terms</a:t>
+              <a:t>Task 2: Create a category</a:t>
             </a:r>
           </a:p>
           <a:p>
             <a:r>
               <a:rPr lang="en-US" b="1" dirty="0"/>
-              <a:t>&gt; Task 4: Import Data to a project</a:t>
+              <a:t>&gt; Task 3: Add business terms</a:t>
+            </a:r>
+          </a:p>
+          <a:p>
+            <a:r>
+              <a:rPr lang="en-US" dirty="0">
+                <a:solidFill>
+                  <a:schemeClr val="tx1">
+                    <a:lumMod val="50000"/>
+                    <a:lumOff val="50000"/>
+                  </a:schemeClr>
+                </a:solidFill>
+              </a:rPr>
+              <a:t>Task 4: Import Data to a project</a:t>
             </a:r>
           </a:p>
           <a:p>
@@ -15163,25 +15529,12 @@
           <a:bodyPr/>
           <a:lstStyle/>
           <a:p>
-            <a:r>
+            <a:br>
               <a:rPr lang="en-US" dirty="0"/>
-              <a:t>We import technical metadata (</a:t>
-            </a:r>
-            <a:r>
-              <a:rPr lang="en-US" dirty="0" err="1"/>
-              <a:t>ie</a:t>
-            </a:r>
+            </a:br>
             <a:r>
               <a:rPr lang="en-US" dirty="0"/>
-              <a:t> names of tables, columns </a:t>
-            </a:r>
-            <a:r>
-              <a:rPr lang="en-US" dirty="0" err="1"/>
-              <a:t>etc</a:t>
-            </a:r>
-            <a:r>
-              <a:rPr lang="en-US" dirty="0"/>
-              <a:t>) relating to mortgage data into a new project</a:t>
+              <a:t>We add banking related business terms (definitions of concepts in banking) from a .csv file into the category we just created.</a:t>
             </a:r>
             <a:br>
               <a:rPr lang="en-US" dirty="0"/>
@@ -15191,7 +15544,17 @@
             </a:br>
             <a:r>
               <a:rPr lang="en-US" dirty="0"/>
-              <a:t>Assets are then created in a project </a:t>
+              <a:t>Terms are initially created as draft so that they can be reviewed.</a:t>
+            </a:r>
+            <a:br>
+              <a:rPr lang="en-US" dirty="0"/>
+            </a:br>
+            <a:br>
+              <a:rPr lang="en-US" dirty="0"/>
+            </a:br>
+            <a:r>
+              <a:rPr lang="en-US" dirty="0"/>
+              <a:t>We then publish the business terms to make them available to users</a:t>
             </a:r>
           </a:p>
         </p:txBody>
@@ -15258,7 +15621,7 @@
     </p:spTree>
     <p:extLst>
       <p:ext uri="{BB962C8B-B14F-4D97-AF65-F5344CB8AC3E}">
-        <p14:creationId xmlns:p14="http://schemas.microsoft.com/office/powerpoint/2010/main" val="4069238537"/>
+        <p14:creationId xmlns:p14="http://schemas.microsoft.com/office/powerpoint/2010/main" val="3289550124"/>
       </p:ext>
     </p:extLst>
   </p:cSld>
@@ -15343,7 +15706,7 @@
                   </a:schemeClr>
                 </a:solidFill>
               </a:rPr>
-              <a:t>Task 1: Create a catalog</a:t>
+              <a:t>Task 0: Preparation</a:t>
             </a:r>
           </a:p>
           <a:p>
@@ -15356,7 +15719,7 @@
                   </a:schemeClr>
                 </a:solidFill>
               </a:rPr>
-              <a:t>Task 2: Create a category</a:t>
+              <a:t>Task 1: Create a catalog</a:t>
             </a:r>
           </a:p>
           <a:p>
@@ -15369,7 +15732,7 @@
                   </a:schemeClr>
                 </a:solidFill>
               </a:rPr>
-              <a:t>Task 3: Add business terms</a:t>
+              <a:t>Task 2: Create a category</a:t>
             </a:r>
           </a:p>
           <a:p>
@@ -15382,13 +15745,26 @@
                   </a:schemeClr>
                 </a:solidFill>
               </a:rPr>
-              <a:t>Task 4: Import Data to a project</a:t>
+              <a:t>Task 3: Add business terms</a:t>
             </a:r>
           </a:p>
           <a:p>
             <a:r>
               <a:rPr lang="en-US" b="1" dirty="0"/>
-              <a:t>&gt; Task 5: Enrich the imported data</a:t>
+              <a:t>&gt; Task 4: Import Data to a project</a:t>
+            </a:r>
+          </a:p>
+          <a:p>
+            <a:r>
+              <a:rPr lang="en-US" dirty="0">
+                <a:solidFill>
+                  <a:schemeClr val="tx1">
+                    <a:lumMod val="50000"/>
+                    <a:lumOff val="50000"/>
+                  </a:schemeClr>
+                </a:solidFill>
+              </a:rPr>
+              <a:t>Task 5: Enrich the imported data</a:t>
             </a:r>
           </a:p>
           <a:p>
@@ -15442,13 +15818,7 @@
           <a:p>
             <a:r>
               <a:rPr lang="en-US" dirty="0"/>
-              <a:t>We run some algorithms which discover more metadata relating to the banking assets:</a:t>
-            </a:r>
-          </a:p>
-          <a:p>
-            <a:r>
-              <a:rPr lang="en-US" dirty="0"/>
-              <a:t> - Profile information </a:t>
+              <a:t>We import technical metadata (</a:t>
             </a:r>
             <a:r>
               <a:rPr lang="en-US" dirty="0" err="1"/>
@@ -15456,19 +15826,25 @@
             </a:r>
             <a:r>
               <a:rPr lang="en-US" dirty="0"/>
-              <a:t> data distribution</a:t>
-            </a:r>
-          </a:p>
-          <a:p>
+              <a:t> names of tables, columns </a:t>
+            </a:r>
+            <a:r>
+              <a:rPr lang="en-US" dirty="0" err="1"/>
+              <a:t>etc</a:t>
+            </a:r>
             <a:r>
               <a:rPr lang="en-US" dirty="0"/>
-              <a:t> - Quality assessment</a:t>
-            </a:r>
-          </a:p>
-          <a:p>
-            <a:r>
+              <a:t>) relating to mortgage data into a new project</a:t>
+            </a:r>
+            <a:br>
               <a:rPr lang="en-US" dirty="0"/>
-              <a:t> - Linking business terms to the assets</a:t>
+            </a:br>
+            <a:br>
+              <a:rPr lang="en-US" dirty="0"/>
+            </a:br>
+            <a:r>
+              <a:rPr lang="en-US" dirty="0"/>
+              <a:t>Assets are then created in a project </a:t>
             </a:r>
           </a:p>
         </p:txBody>
@@ -15535,7 +15911,7 @@
     </p:spTree>
     <p:extLst>
       <p:ext uri="{BB962C8B-B14F-4D97-AF65-F5344CB8AC3E}">
-        <p14:creationId xmlns:p14="http://schemas.microsoft.com/office/powerpoint/2010/main" val="1396749739"/>
+        <p14:creationId xmlns:p14="http://schemas.microsoft.com/office/powerpoint/2010/main" val="4069238537"/>
       </p:ext>
     </p:extLst>
   </p:cSld>
@@ -15620,7 +15996,7 @@
                   </a:schemeClr>
                 </a:solidFill>
               </a:rPr>
-              <a:t>Task 1: Create a catalog</a:t>
+              <a:t>Task 0: Preparation</a:t>
             </a:r>
           </a:p>
           <a:p>
@@ -15633,7 +16009,7 @@
                   </a:schemeClr>
                 </a:solidFill>
               </a:rPr>
-              <a:t>Task 2: Create a category</a:t>
+              <a:t>Task 1: Create a catalog</a:t>
             </a:r>
           </a:p>
           <a:p>
@@ -15646,7 +16022,7 @@
                   </a:schemeClr>
                 </a:solidFill>
               </a:rPr>
-              <a:t>Task 3: Add business terms</a:t>
+              <a:t>Task 2: Create a category</a:t>
             </a:r>
           </a:p>
           <a:p>
@@ -15659,7 +16035,7 @@
                   </a:schemeClr>
                 </a:solidFill>
               </a:rPr>
-              <a:t>Task 4: Import Data to a project</a:t>
+              <a:t>Task 3: Add business terms</a:t>
             </a:r>
           </a:p>
           <a:p>
@@ -15672,13 +16048,26 @@
                   </a:schemeClr>
                 </a:solidFill>
               </a:rPr>
-              <a:t>Task 5: Enrich the imported data</a:t>
+              <a:t>Task 4: Import Data to a project</a:t>
             </a:r>
           </a:p>
           <a:p>
             <a:r>
               <a:rPr lang="en-US" b="1" dirty="0"/>
-              <a:t>&gt; Task 6: View the results of the metadata enrichment</a:t>
+              <a:t>&gt; Task 5: Enrich the imported data</a:t>
+            </a:r>
+          </a:p>
+          <a:p>
+            <a:r>
+              <a:rPr lang="en-US" dirty="0">
+                <a:solidFill>
+                  <a:schemeClr val="tx1">
+                    <a:lumMod val="50000"/>
+                    <a:lumOff val="50000"/>
+                  </a:schemeClr>
+                </a:solidFill>
+              </a:rPr>
+              <a:t>Task 6: View the results of the metadata enrichment</a:t>
             </a:r>
           </a:p>
           <a:p>
@@ -15719,17 +16108,33 @@
           <a:p>
             <a:r>
               <a:rPr lang="en-US" dirty="0"/>
-              <a:t>This step takes you through looking at the results of the previous step to see what additional metadata has been discovered.</a:t>
-            </a:r>
-            <a:br>
+              <a:t>We run some algorithms which discover more metadata relating to the banking assets:</a:t>
+            </a:r>
+          </a:p>
+          <a:p>
+            <a:r>
               <a:rPr lang="en-US" dirty="0"/>
-            </a:br>
-            <a:br>
+              <a:t> - Profile information </a:t>
+            </a:r>
+            <a:r>
+              <a:rPr lang="en-US" dirty="0" err="1"/>
+              <a:t>ie</a:t>
+            </a:r>
+            <a:r>
               <a:rPr lang="en-US" dirty="0"/>
-            </a:br>
+              <a:t> data distribution</a:t>
+            </a:r>
+          </a:p>
+          <a:p>
             <a:r>
               <a:rPr lang="en-US" dirty="0"/>
-              <a:t>It also shows how some suggestions may be recommended, but must be accepted – depending on confidence</a:t>
+              <a:t> - Quality assessment</a:t>
+            </a:r>
+          </a:p>
+          <a:p>
+            <a:r>
+              <a:rPr lang="en-US" dirty="0"/>
+              <a:t> - Linking business terms to the assets</a:t>
             </a:r>
           </a:p>
         </p:txBody>
@@ -15796,7 +16201,7 @@
     </p:spTree>
     <p:extLst>
       <p:ext uri="{BB962C8B-B14F-4D97-AF65-F5344CB8AC3E}">
-        <p14:creationId xmlns:p14="http://schemas.microsoft.com/office/powerpoint/2010/main" val="1631231316"/>
+        <p14:creationId xmlns:p14="http://schemas.microsoft.com/office/powerpoint/2010/main" val="1396749739"/>
       </p:ext>
     </p:extLst>
   </p:cSld>
@@ -15873,7 +16278,7 @@
           <a:lstStyle/>
           <a:p>
             <a:r>
-              <a:rPr lang="en-US" b="1" dirty="0">
+              <a:rPr lang="en-US" dirty="0">
                 <a:solidFill>
                   <a:schemeClr val="tx1">
                     <a:lumMod val="50000"/>
@@ -15881,7 +16286,7 @@
                   </a:schemeClr>
                 </a:solidFill>
               </a:rPr>
-              <a:t>Task 1: Create a catalog</a:t>
+              <a:t>Task 0: Preparation</a:t>
             </a:r>
           </a:p>
           <a:p>
@@ -15894,7 +16299,7 @@
                   </a:schemeClr>
                 </a:solidFill>
               </a:rPr>
-              <a:t>Task 2: Create a category</a:t>
+              <a:t>Task 1: Create a catalog</a:t>
             </a:r>
           </a:p>
           <a:p>
@@ -15907,7 +16312,7 @@
                   </a:schemeClr>
                 </a:solidFill>
               </a:rPr>
-              <a:t>Task 3: Add business terms</a:t>
+              <a:t>Task 2: Create a category</a:t>
             </a:r>
           </a:p>
           <a:p>
@@ -15920,7 +16325,7 @@
                   </a:schemeClr>
                 </a:solidFill>
               </a:rPr>
-              <a:t>Task 4: Import Data to a project</a:t>
+              <a:t>Task 3: Add business terms</a:t>
             </a:r>
           </a:p>
           <a:p>
@@ -15933,7 +16338,7 @@
                   </a:schemeClr>
                 </a:solidFill>
               </a:rPr>
-              <a:t>Task 5: Enrich the imported data</a:t>
+              <a:t>Task 4: Import Data to a project</a:t>
             </a:r>
           </a:p>
           <a:p>
@@ -15946,13 +16351,26 @@
                   </a:schemeClr>
                 </a:solidFill>
               </a:rPr>
-              <a:t>Task 6: View the results of the metadata enrichment</a:t>
+              <a:t>Task 5: Enrich the imported data</a:t>
             </a:r>
           </a:p>
           <a:p>
             <a:r>
               <a:rPr lang="en-US" b="1" dirty="0"/>
-              <a:t>&gt; Task 7: Publish Data to a catalog</a:t>
+              <a:t>&gt; Task 6: View the results of the metadata enrichment</a:t>
+            </a:r>
+          </a:p>
+          <a:p>
+            <a:r>
+              <a:rPr lang="en-US" dirty="0">
+                <a:solidFill>
+                  <a:schemeClr val="tx1">
+                    <a:lumMod val="50000"/>
+                    <a:lumOff val="50000"/>
+                  </a:schemeClr>
+                </a:solidFill>
+              </a:rPr>
+              <a:t>Task 7: Publish Data to a catalog</a:t>
             </a:r>
           </a:p>
         </p:txBody>
@@ -15980,7 +16398,17 @@
           <a:p>
             <a:r>
               <a:rPr lang="en-US" dirty="0"/>
-              <a:t>Enriched data can now be published to a catalog so that others users including data scientists and analysts can use the trusted data</a:t>
+              <a:t>This step takes you through looking at the results of the previous step to see what additional metadata has been discovered.</a:t>
+            </a:r>
+            <a:br>
+              <a:rPr lang="en-US" dirty="0"/>
+            </a:br>
+            <a:br>
+              <a:rPr lang="en-US" dirty="0"/>
+            </a:br>
+            <a:r>
+              <a:rPr lang="en-US" dirty="0"/>
+              <a:t>It also shows how some suggestions may be recommended, but must be accepted – depending on confidence</a:t>
             </a:r>
           </a:p>
         </p:txBody>
@@ -16047,7 +16475,7 @@
     </p:spTree>
     <p:extLst>
       <p:ext uri="{BB962C8B-B14F-4D97-AF65-F5344CB8AC3E}">
-        <p14:creationId xmlns:p14="http://schemas.microsoft.com/office/powerpoint/2010/main" val="541345078"/>
+        <p14:creationId xmlns:p14="http://schemas.microsoft.com/office/powerpoint/2010/main" val="1631231316"/>
       </p:ext>
     </p:extLst>
   </p:cSld>

</xml_diff>

<commit_message>
Fix footer, missin punctuation and add ibm close to wdp lab guide
Signed-off-by: Nigel Jones <nigel.l.jones+git@gmail.com>
</commit_message>
<xml_diff>
--- a/data-governance-lab/DataAndGovernanceLab.pptx
+++ b/data-governance-lab/DataAndGovernanceLab.pptx
@@ -5,10 +5,10 @@
     <p:sldMasterId id="2147483891" r:id="rId1"/>
   </p:sldMasterIdLst>
   <p:notesMasterIdLst>
-    <p:notesMasterId r:id="rId13"/>
+    <p:notesMasterId r:id="rId14"/>
   </p:notesMasterIdLst>
   <p:handoutMasterIdLst>
-    <p:handoutMasterId r:id="rId14"/>
+    <p:handoutMasterId r:id="rId15"/>
   </p:handoutMasterIdLst>
   <p:sldIdLst>
     <p:sldId id="388" r:id="rId2"/>
@@ -22,6 +22,7 @@
     <p:sldId id="397" r:id="rId10"/>
     <p:sldId id="398" r:id="rId11"/>
     <p:sldId id="400" r:id="rId12"/>
+    <p:sldId id="402" r:id="rId13"/>
   </p:sldIdLst>
   <p:sldSz cx="9144000" cy="5143500" type="screen16x9"/>
   <p:notesSz cx="6858000" cy="9144000"/>
@@ -136,6 +137,7 @@
             <p14:sldId id="397"/>
             <p14:sldId id="398"/>
             <p14:sldId id="400"/>
+            <p14:sldId id="402"/>
           </p14:sldIdLst>
         </p14:section>
       </p14:sectionLst>
@@ -192,8 +194,8 @@
 <pc:chgInfo xmlns:a="http://schemas.openxmlformats.org/drawingml/2006/main" xmlns:r="http://schemas.openxmlformats.org/officeDocument/2006/relationships" xmlns:ac="http://schemas.microsoft.com/office/drawing/2013/main/command" xmlns:pc="http://schemas.microsoft.com/office/powerpoint/2013/main/command">
   <pc:docChgLst>
     <pc:chgData name="Nigel L Jones" userId="1512a2c5-99cf-401f-90da-0968559aa4c1" providerId="ADAL" clId="{52167A17-4B3C-0C4B-A355-FED5F0DA7317}"/>
-    <pc:docChg chg="undo redo custSel addSld delSld modSld sldOrd delSection modSection">
-      <pc:chgData name="Nigel L Jones" userId="1512a2c5-99cf-401f-90da-0968559aa4c1" providerId="ADAL" clId="{52167A17-4B3C-0C4B-A355-FED5F0DA7317}" dt="2022-08-24T13:59:40.529" v="3303" actId="20577"/>
+    <pc:docChg chg="undo redo custSel addSld delSld modSld sldOrd modMainMaster delSection modSection">
+      <pc:chgData name="Nigel L Jones" userId="1512a2c5-99cf-401f-90da-0968559aa4c1" providerId="ADAL" clId="{52167A17-4B3C-0C4B-A355-FED5F0DA7317}" dt="2022-08-24T14:12:52.984" v="3379" actId="20577"/>
       <pc:docMkLst>
         <pc:docMk/>
       </pc:docMkLst>
@@ -767,7 +769,7 @@
         </pc:spChg>
       </pc:sldChg>
       <pc:sldChg chg="addSp delSp modSp new mod modClrScheme chgLayout">
-        <pc:chgData name="Nigel L Jones" userId="1512a2c5-99cf-401f-90da-0968559aa4c1" providerId="ADAL" clId="{52167A17-4B3C-0C4B-A355-FED5F0DA7317}" dt="2022-08-22T09:23:58.259" v="2824" actId="20577"/>
+        <pc:chgData name="Nigel L Jones" userId="1512a2c5-99cf-401f-90da-0968559aa4c1" providerId="ADAL" clId="{52167A17-4B3C-0C4B-A355-FED5F0DA7317}" dt="2022-08-24T14:12:03.585" v="3355" actId="20577"/>
         <pc:sldMkLst>
           <pc:docMk/>
           <pc:sldMk cId="918393191" sldId="389"/>
@@ -781,7 +783,7 @@
           </ac:spMkLst>
         </pc:spChg>
         <pc:spChg chg="mod ord">
-          <ac:chgData name="Nigel L Jones" userId="1512a2c5-99cf-401f-90da-0968559aa4c1" providerId="ADAL" clId="{52167A17-4B3C-0C4B-A355-FED5F0DA7317}" dt="2022-08-22T09:05:51.318" v="206" actId="700"/>
+          <ac:chgData name="Nigel L Jones" userId="1512a2c5-99cf-401f-90da-0968559aa4c1" providerId="ADAL" clId="{52167A17-4B3C-0C4B-A355-FED5F0DA7317}" dt="2022-08-24T14:10:33.403" v="3342"/>
           <ac:spMkLst>
             <pc:docMk/>
             <pc:sldMk cId="918393191" sldId="389"/>
@@ -797,7 +799,7 @@
           </ac:spMkLst>
         </pc:spChg>
         <pc:spChg chg="add del mod ord">
-          <ac:chgData name="Nigel L Jones" userId="1512a2c5-99cf-401f-90da-0968559aa4c1" providerId="ADAL" clId="{52167A17-4B3C-0C4B-A355-FED5F0DA7317}" dt="2022-08-22T09:23:58.259" v="2824" actId="20577"/>
+          <ac:chgData name="Nigel L Jones" userId="1512a2c5-99cf-401f-90da-0968559aa4c1" providerId="ADAL" clId="{52167A17-4B3C-0C4B-A355-FED5F0DA7317}" dt="2022-08-24T14:12:03.585" v="3355" actId="20577"/>
           <ac:spMkLst>
             <pc:docMk/>
             <pc:sldMk cId="918393191" sldId="389"/>
@@ -814,7 +816,7 @@
         </pc:spChg>
       </pc:sldChg>
       <pc:sldChg chg="modSp new mod">
-        <pc:chgData name="Nigel L Jones" userId="1512a2c5-99cf-401f-90da-0968559aa4c1" providerId="ADAL" clId="{52167A17-4B3C-0C4B-A355-FED5F0DA7317}" dt="2022-08-24T13:35:00.934" v="3206" actId="20577"/>
+        <pc:chgData name="Nigel L Jones" userId="1512a2c5-99cf-401f-90da-0968559aa4c1" providerId="ADAL" clId="{52167A17-4B3C-0C4B-A355-FED5F0DA7317}" dt="2022-08-24T14:12:21.024" v="3363" actId="20577"/>
         <pc:sldMkLst>
           <pc:docMk/>
           <pc:sldMk cId="3691094387" sldId="390"/>
@@ -836,11 +838,19 @@
           </ac:spMkLst>
         </pc:spChg>
         <pc:spChg chg="mod">
-          <ac:chgData name="Nigel L Jones" userId="1512a2c5-99cf-401f-90da-0968559aa4c1" providerId="ADAL" clId="{52167A17-4B3C-0C4B-A355-FED5F0DA7317}" dt="2022-08-22T09:08:54.941" v="428" actId="20577"/>
+          <ac:chgData name="Nigel L Jones" userId="1512a2c5-99cf-401f-90da-0968559aa4c1" providerId="ADAL" clId="{52167A17-4B3C-0C4B-A355-FED5F0DA7317}" dt="2022-08-24T14:12:21.024" v="3363" actId="20577"/>
           <ac:spMkLst>
             <pc:docMk/>
             <pc:sldMk cId="3691094387" sldId="390"/>
             <ac:spMk id="4" creationId="{1254813B-7D84-6DBA-D36E-D97BD5B9D835}"/>
+          </ac:spMkLst>
+        </pc:spChg>
+        <pc:spChg chg="mod">
+          <ac:chgData name="Nigel L Jones" userId="1512a2c5-99cf-401f-90da-0968559aa4c1" providerId="ADAL" clId="{52167A17-4B3C-0C4B-A355-FED5F0DA7317}" dt="2022-08-24T14:10:39.148" v="3344"/>
+          <ac:spMkLst>
+            <pc:docMk/>
+            <pc:sldMk cId="3691094387" sldId="390"/>
+            <ac:spMk id="5" creationId="{BD58EEF9-97D2-C3C4-E1C1-F399FF5621FE}"/>
           </ac:spMkLst>
         </pc:spChg>
       </pc:sldChg>
@@ -852,7 +862,7 @@
         </pc:sldMkLst>
       </pc:sldChg>
       <pc:sldChg chg="modSp add mod">
-        <pc:chgData name="Nigel L Jones" userId="1512a2c5-99cf-401f-90da-0968559aa4c1" providerId="ADAL" clId="{52167A17-4B3C-0C4B-A355-FED5F0DA7317}" dt="2022-08-24T13:35:05.938" v="3207"/>
+        <pc:chgData name="Nigel L Jones" userId="1512a2c5-99cf-401f-90da-0968559aa4c1" providerId="ADAL" clId="{52167A17-4B3C-0C4B-A355-FED5F0DA7317}" dt="2022-08-24T14:12:24.280" v="3365" actId="20577"/>
         <pc:sldMkLst>
           <pc:docMk/>
           <pc:sldMk cId="4108947352" sldId="392"/>
@@ -866,16 +876,24 @@
           </ac:spMkLst>
         </pc:spChg>
         <pc:spChg chg="mod">
-          <ac:chgData name="Nigel L Jones" userId="1512a2c5-99cf-401f-90da-0968559aa4c1" providerId="ADAL" clId="{52167A17-4B3C-0C4B-A355-FED5F0DA7317}" dt="2022-08-22T09:10:30.981" v="669" actId="20577"/>
+          <ac:chgData name="Nigel L Jones" userId="1512a2c5-99cf-401f-90da-0968559aa4c1" providerId="ADAL" clId="{52167A17-4B3C-0C4B-A355-FED5F0DA7317}" dt="2022-08-24T14:12:24.280" v="3365" actId="20577"/>
           <ac:spMkLst>
             <pc:docMk/>
             <pc:sldMk cId="4108947352" sldId="392"/>
             <ac:spMk id="4" creationId="{1254813B-7D84-6DBA-D36E-D97BD5B9D835}"/>
           </ac:spMkLst>
         </pc:spChg>
+        <pc:spChg chg="mod">
+          <ac:chgData name="Nigel L Jones" userId="1512a2c5-99cf-401f-90da-0968559aa4c1" providerId="ADAL" clId="{52167A17-4B3C-0C4B-A355-FED5F0DA7317}" dt="2022-08-24T14:10:41.145" v="3345"/>
+          <ac:spMkLst>
+            <pc:docMk/>
+            <pc:sldMk cId="4108947352" sldId="392"/>
+            <ac:spMk id="5" creationId="{BD58EEF9-97D2-C3C4-E1C1-F399FF5621FE}"/>
+          </ac:spMkLst>
+        </pc:spChg>
       </pc:sldChg>
       <pc:sldChg chg="modSp add mod">
-        <pc:chgData name="Nigel L Jones" userId="1512a2c5-99cf-401f-90da-0968559aa4c1" providerId="ADAL" clId="{52167A17-4B3C-0C4B-A355-FED5F0DA7317}" dt="2022-08-24T13:35:08.280" v="3208"/>
+        <pc:chgData name="Nigel L Jones" userId="1512a2c5-99cf-401f-90da-0968559aa4c1" providerId="ADAL" clId="{52167A17-4B3C-0C4B-A355-FED5F0DA7317}" dt="2022-08-24T14:12:27.184" v="3366" actId="20577"/>
         <pc:sldMkLst>
           <pc:docMk/>
           <pc:sldMk cId="3289550124" sldId="393"/>
@@ -889,16 +907,24 @@
           </ac:spMkLst>
         </pc:spChg>
         <pc:spChg chg="mod">
-          <ac:chgData name="Nigel L Jones" userId="1512a2c5-99cf-401f-90da-0968559aa4c1" providerId="ADAL" clId="{52167A17-4B3C-0C4B-A355-FED5F0DA7317}" dt="2022-08-22T09:13:24.666" v="1013" actId="20577"/>
+          <ac:chgData name="Nigel L Jones" userId="1512a2c5-99cf-401f-90da-0968559aa4c1" providerId="ADAL" clId="{52167A17-4B3C-0C4B-A355-FED5F0DA7317}" dt="2022-08-24T14:12:27.184" v="3366" actId="20577"/>
           <ac:spMkLst>
             <pc:docMk/>
             <pc:sldMk cId="3289550124" sldId="393"/>
             <ac:spMk id="4" creationId="{1254813B-7D84-6DBA-D36E-D97BD5B9D835}"/>
           </ac:spMkLst>
         </pc:spChg>
+        <pc:spChg chg="mod">
+          <ac:chgData name="Nigel L Jones" userId="1512a2c5-99cf-401f-90da-0968559aa4c1" providerId="ADAL" clId="{52167A17-4B3C-0C4B-A355-FED5F0DA7317}" dt="2022-08-24T14:10:43.081" v="3346"/>
+          <ac:spMkLst>
+            <pc:docMk/>
+            <pc:sldMk cId="3289550124" sldId="393"/>
+            <ac:spMk id="5" creationId="{BD58EEF9-97D2-C3C4-E1C1-F399FF5621FE}"/>
+          </ac:spMkLst>
+        </pc:spChg>
       </pc:sldChg>
       <pc:sldChg chg="modSp add mod">
-        <pc:chgData name="Nigel L Jones" userId="1512a2c5-99cf-401f-90da-0968559aa4c1" providerId="ADAL" clId="{52167A17-4B3C-0C4B-A355-FED5F0DA7317}" dt="2022-08-24T13:35:10.929" v="3209"/>
+        <pc:chgData name="Nigel L Jones" userId="1512a2c5-99cf-401f-90da-0968559aa4c1" providerId="ADAL" clId="{52167A17-4B3C-0C4B-A355-FED5F0DA7317}" dt="2022-08-24T14:12:36.162" v="3373" actId="20577"/>
         <pc:sldMkLst>
           <pc:docMk/>
           <pc:sldMk cId="4069238537" sldId="394"/>
@@ -912,11 +938,19 @@
           </ac:spMkLst>
         </pc:spChg>
         <pc:spChg chg="mod">
-          <ac:chgData name="Nigel L Jones" userId="1512a2c5-99cf-401f-90da-0968559aa4c1" providerId="ADAL" clId="{52167A17-4B3C-0C4B-A355-FED5F0DA7317}" dt="2022-08-22T09:15:12.935" v="1251" actId="6549"/>
+          <ac:chgData name="Nigel L Jones" userId="1512a2c5-99cf-401f-90da-0968559aa4c1" providerId="ADAL" clId="{52167A17-4B3C-0C4B-A355-FED5F0DA7317}" dt="2022-08-24T14:12:36.162" v="3373" actId="20577"/>
           <ac:spMkLst>
             <pc:docMk/>
             <pc:sldMk cId="4069238537" sldId="394"/>
             <ac:spMk id="4" creationId="{1254813B-7D84-6DBA-D36E-D97BD5B9D835}"/>
+          </ac:spMkLst>
+        </pc:spChg>
+        <pc:spChg chg="mod">
+          <ac:chgData name="Nigel L Jones" userId="1512a2c5-99cf-401f-90da-0968559aa4c1" providerId="ADAL" clId="{52167A17-4B3C-0C4B-A355-FED5F0DA7317}" dt="2022-08-24T14:10:45.275" v="3347"/>
+          <ac:spMkLst>
+            <pc:docMk/>
+            <pc:sldMk cId="4069238537" sldId="394"/>
+            <ac:spMk id="5" creationId="{BD58EEF9-97D2-C3C4-E1C1-F399FF5621FE}"/>
           </ac:spMkLst>
         </pc:spChg>
       </pc:sldChg>
@@ -928,7 +962,7 @@
         </pc:sldMkLst>
       </pc:sldChg>
       <pc:sldChg chg="addSp delSp modSp add mod">
-        <pc:chgData name="Nigel L Jones" userId="1512a2c5-99cf-401f-90da-0968559aa4c1" providerId="ADAL" clId="{52167A17-4B3C-0C4B-A355-FED5F0DA7317}" dt="2022-08-24T13:35:14.309" v="3210"/>
+        <pc:chgData name="Nigel L Jones" userId="1512a2c5-99cf-401f-90da-0968559aa4c1" providerId="ADAL" clId="{52167A17-4B3C-0C4B-A355-FED5F0DA7317}" dt="2022-08-24T14:12:42.576" v="3376" actId="20577"/>
         <pc:sldMkLst>
           <pc:docMk/>
           <pc:sldMk cId="1396749739" sldId="396"/>
@@ -942,11 +976,19 @@
           </ac:spMkLst>
         </pc:spChg>
         <pc:spChg chg="mod">
-          <ac:chgData name="Nigel L Jones" userId="1512a2c5-99cf-401f-90da-0968559aa4c1" providerId="ADAL" clId="{52167A17-4B3C-0C4B-A355-FED5F0DA7317}" dt="2022-08-22T09:16:49.704" v="1494" actId="20577"/>
+          <ac:chgData name="Nigel L Jones" userId="1512a2c5-99cf-401f-90da-0968559aa4c1" providerId="ADAL" clId="{52167A17-4B3C-0C4B-A355-FED5F0DA7317}" dt="2022-08-24T14:12:42.576" v="3376" actId="20577"/>
           <ac:spMkLst>
             <pc:docMk/>
             <pc:sldMk cId="1396749739" sldId="396"/>
             <ac:spMk id="4" creationId="{1254813B-7D84-6DBA-D36E-D97BD5B9D835}"/>
+          </ac:spMkLst>
+        </pc:spChg>
+        <pc:spChg chg="mod">
+          <ac:chgData name="Nigel L Jones" userId="1512a2c5-99cf-401f-90da-0968559aa4c1" providerId="ADAL" clId="{52167A17-4B3C-0C4B-A355-FED5F0DA7317}" dt="2022-08-24T14:10:48.518" v="3348"/>
+          <ac:spMkLst>
+            <pc:docMk/>
+            <pc:sldMk cId="1396749739" sldId="396"/>
+            <ac:spMk id="5" creationId="{BD58EEF9-97D2-C3C4-E1C1-F399FF5621FE}"/>
           </ac:spMkLst>
         </pc:spChg>
         <pc:spChg chg="add del mod">
@@ -959,7 +1001,7 @@
         </pc:spChg>
       </pc:sldChg>
       <pc:sldChg chg="modSp add mod">
-        <pc:chgData name="Nigel L Jones" userId="1512a2c5-99cf-401f-90da-0968559aa4c1" providerId="ADAL" clId="{52167A17-4B3C-0C4B-A355-FED5F0DA7317}" dt="2022-08-24T13:35:17.492" v="3211"/>
+        <pc:chgData name="Nigel L Jones" userId="1512a2c5-99cf-401f-90da-0968559aa4c1" providerId="ADAL" clId="{52167A17-4B3C-0C4B-A355-FED5F0DA7317}" dt="2022-08-24T14:12:46.839" v="3377" actId="20577"/>
         <pc:sldMkLst>
           <pc:docMk/>
           <pc:sldMk cId="1631231316" sldId="397"/>
@@ -973,16 +1015,24 @@
           </ac:spMkLst>
         </pc:spChg>
         <pc:spChg chg="mod">
-          <ac:chgData name="Nigel L Jones" userId="1512a2c5-99cf-401f-90da-0968559aa4c1" providerId="ADAL" clId="{52167A17-4B3C-0C4B-A355-FED5F0DA7317}" dt="2022-08-22T09:18:22.953" v="1792" actId="20577"/>
+          <ac:chgData name="Nigel L Jones" userId="1512a2c5-99cf-401f-90da-0968559aa4c1" providerId="ADAL" clId="{52167A17-4B3C-0C4B-A355-FED5F0DA7317}" dt="2022-08-24T14:12:46.839" v="3377" actId="20577"/>
           <ac:spMkLst>
             <pc:docMk/>
             <pc:sldMk cId="1631231316" sldId="397"/>
             <ac:spMk id="4" creationId="{1254813B-7D84-6DBA-D36E-D97BD5B9D835}"/>
           </ac:spMkLst>
         </pc:spChg>
+        <pc:spChg chg="mod">
+          <ac:chgData name="Nigel L Jones" userId="1512a2c5-99cf-401f-90da-0968559aa4c1" providerId="ADAL" clId="{52167A17-4B3C-0C4B-A355-FED5F0DA7317}" dt="2022-08-24T14:10:50.575" v="3349"/>
+          <ac:spMkLst>
+            <pc:docMk/>
+            <pc:sldMk cId="1631231316" sldId="397"/>
+            <ac:spMk id="5" creationId="{BD58EEF9-97D2-C3C4-E1C1-F399FF5621FE}"/>
+          </ac:spMkLst>
+        </pc:spChg>
       </pc:sldChg>
       <pc:sldChg chg="modSp add mod">
-        <pc:chgData name="Nigel L Jones" userId="1512a2c5-99cf-401f-90da-0968559aa4c1" providerId="ADAL" clId="{52167A17-4B3C-0C4B-A355-FED5F0DA7317}" dt="2022-08-24T13:35:20.352" v="3212"/>
+        <pc:chgData name="Nigel L Jones" userId="1512a2c5-99cf-401f-90da-0968559aa4c1" providerId="ADAL" clId="{52167A17-4B3C-0C4B-A355-FED5F0DA7317}" dt="2022-08-24T14:12:50.264" v="3378" actId="20577"/>
         <pc:sldMkLst>
           <pc:docMk/>
           <pc:sldMk cId="541345078" sldId="398"/>
@@ -996,11 +1046,19 @@
           </ac:spMkLst>
         </pc:spChg>
         <pc:spChg chg="mod">
-          <ac:chgData name="Nigel L Jones" userId="1512a2c5-99cf-401f-90da-0968559aa4c1" providerId="ADAL" clId="{52167A17-4B3C-0C4B-A355-FED5F0DA7317}" dt="2022-08-22T09:19:35.525" v="1966" actId="20577"/>
+          <ac:chgData name="Nigel L Jones" userId="1512a2c5-99cf-401f-90da-0968559aa4c1" providerId="ADAL" clId="{52167A17-4B3C-0C4B-A355-FED5F0DA7317}" dt="2022-08-24T14:12:50.264" v="3378" actId="20577"/>
           <ac:spMkLst>
             <pc:docMk/>
             <pc:sldMk cId="541345078" sldId="398"/>
             <ac:spMk id="4" creationId="{1254813B-7D84-6DBA-D36E-D97BD5B9D835}"/>
+          </ac:spMkLst>
+        </pc:spChg>
+        <pc:spChg chg="mod">
+          <ac:chgData name="Nigel L Jones" userId="1512a2c5-99cf-401f-90da-0968559aa4c1" providerId="ADAL" clId="{52167A17-4B3C-0C4B-A355-FED5F0DA7317}" dt="2022-08-24T14:10:52.276" v="3350"/>
+          <ac:spMkLst>
+            <pc:docMk/>
+            <pc:sldMk cId="541345078" sldId="398"/>
+            <ac:spMk id="5" creationId="{BD58EEF9-97D2-C3C4-E1C1-F399FF5621FE}"/>
           </ac:spMkLst>
         </pc:spChg>
       </pc:sldChg>
@@ -1012,7 +1070,7 @@
         </pc:sldMkLst>
       </pc:sldChg>
       <pc:sldChg chg="modSp add mod">
-        <pc:chgData name="Nigel L Jones" userId="1512a2c5-99cf-401f-90da-0968559aa4c1" providerId="ADAL" clId="{52167A17-4B3C-0C4B-A355-FED5F0DA7317}" dt="2022-08-24T11:28:22.268" v="2842" actId="20577"/>
+        <pc:chgData name="Nigel L Jones" userId="1512a2c5-99cf-401f-90da-0968559aa4c1" providerId="ADAL" clId="{52167A17-4B3C-0C4B-A355-FED5F0DA7317}" dt="2022-08-24T14:12:52.984" v="3379" actId="20577"/>
         <pc:sldMkLst>
           <pc:docMk/>
           <pc:sldMk cId="1807981701" sldId="400"/>
@@ -1026,16 +1084,24 @@
           </ac:spMkLst>
         </pc:spChg>
         <pc:spChg chg="mod">
-          <ac:chgData name="Nigel L Jones" userId="1512a2c5-99cf-401f-90da-0968559aa4c1" providerId="ADAL" clId="{52167A17-4B3C-0C4B-A355-FED5F0DA7317}" dt="2022-08-22T09:21:13.463" v="2333" actId="20577"/>
+          <ac:chgData name="Nigel L Jones" userId="1512a2c5-99cf-401f-90da-0968559aa4c1" providerId="ADAL" clId="{52167A17-4B3C-0C4B-A355-FED5F0DA7317}" dt="2022-08-24T14:12:52.984" v="3379" actId="20577"/>
           <ac:spMkLst>
             <pc:docMk/>
             <pc:sldMk cId="1807981701" sldId="400"/>
             <ac:spMk id="4" creationId="{1254813B-7D84-6DBA-D36E-D97BD5B9D835}"/>
           </ac:spMkLst>
         </pc:spChg>
+        <pc:spChg chg="mod">
+          <ac:chgData name="Nigel L Jones" userId="1512a2c5-99cf-401f-90da-0968559aa4c1" providerId="ADAL" clId="{52167A17-4B3C-0C4B-A355-FED5F0DA7317}" dt="2022-08-24T14:10:54.219" v="3351"/>
+          <ac:spMkLst>
+            <pc:docMk/>
+            <pc:sldMk cId="1807981701" sldId="400"/>
+            <ac:spMk id="5" creationId="{BD58EEF9-97D2-C3C4-E1C1-F399FF5621FE}"/>
+          </ac:spMkLst>
+        </pc:spChg>
       </pc:sldChg>
       <pc:sldChg chg="modSp add mod">
-        <pc:chgData name="Nigel L Jones" userId="1512a2c5-99cf-401f-90da-0968559aa4c1" providerId="ADAL" clId="{52167A17-4B3C-0C4B-A355-FED5F0DA7317}" dt="2022-08-24T13:59:40.529" v="3303" actId="20577"/>
+        <pc:chgData name="Nigel L Jones" userId="1512a2c5-99cf-401f-90da-0968559aa4c1" providerId="ADAL" clId="{52167A17-4B3C-0C4B-A355-FED5F0DA7317}" dt="2022-08-24T14:12:09.763" v="3362" actId="20577"/>
         <pc:sldMkLst>
           <pc:docMk/>
           <pc:sldMk cId="4223275327" sldId="401"/>
@@ -1049,14 +1115,722 @@
           </ac:spMkLst>
         </pc:spChg>
         <pc:spChg chg="mod">
-          <ac:chgData name="Nigel L Jones" userId="1512a2c5-99cf-401f-90da-0968559aa4c1" providerId="ADAL" clId="{52167A17-4B3C-0C4B-A355-FED5F0DA7317}" dt="2022-08-24T13:59:40.529" v="3303" actId="20577"/>
+          <ac:chgData name="Nigel L Jones" userId="1512a2c5-99cf-401f-90da-0968559aa4c1" providerId="ADAL" clId="{52167A17-4B3C-0C4B-A355-FED5F0DA7317}" dt="2022-08-24T14:12:09.763" v="3362" actId="20577"/>
           <ac:spMkLst>
             <pc:docMk/>
             <pc:sldMk cId="4223275327" sldId="401"/>
             <ac:spMk id="4" creationId="{1254813B-7D84-6DBA-D36E-D97BD5B9D835}"/>
           </ac:spMkLst>
         </pc:spChg>
+        <pc:spChg chg="mod">
+          <ac:chgData name="Nigel L Jones" userId="1512a2c5-99cf-401f-90da-0968559aa4c1" providerId="ADAL" clId="{52167A17-4B3C-0C4B-A355-FED5F0DA7317}" dt="2022-08-24T14:10:37.126" v="3343"/>
+          <ac:spMkLst>
+            <pc:docMk/>
+            <pc:sldMk cId="4223275327" sldId="401"/>
+            <ac:spMk id="5" creationId="{BD58EEF9-97D2-C3C4-E1C1-F399FF5621FE}"/>
+          </ac:spMkLst>
+        </pc:spChg>
       </pc:sldChg>
+      <pc:sldChg chg="delSp modSp new mod modClrScheme chgLayout">
+        <pc:chgData name="Nigel L Jones" userId="1512a2c5-99cf-401f-90da-0968559aa4c1" providerId="ADAL" clId="{52167A17-4B3C-0C4B-A355-FED5F0DA7317}" dt="2022-08-24T14:11:26.235" v="3353" actId="700"/>
+        <pc:sldMkLst>
+          <pc:docMk/>
+          <pc:sldMk cId="1848827190" sldId="402"/>
+        </pc:sldMkLst>
+        <pc:spChg chg="del">
+          <ac:chgData name="Nigel L Jones" userId="1512a2c5-99cf-401f-90da-0968559aa4c1" providerId="ADAL" clId="{52167A17-4B3C-0C4B-A355-FED5F0DA7317}" dt="2022-08-24T14:11:26.235" v="3353" actId="700"/>
+          <ac:spMkLst>
+            <pc:docMk/>
+            <pc:sldMk cId="1848827190" sldId="402"/>
+            <ac:spMk id="2" creationId="{C69104DA-3B2C-8F2C-DBC0-E163BFCA5A31}"/>
+          </ac:spMkLst>
+        </pc:spChg>
+        <pc:spChg chg="del">
+          <ac:chgData name="Nigel L Jones" userId="1512a2c5-99cf-401f-90da-0968559aa4c1" providerId="ADAL" clId="{52167A17-4B3C-0C4B-A355-FED5F0DA7317}" dt="2022-08-24T14:11:26.235" v="3353" actId="700"/>
+          <ac:spMkLst>
+            <pc:docMk/>
+            <pc:sldMk cId="1848827190" sldId="402"/>
+            <ac:spMk id="3" creationId="{CAF8BB48-D673-612B-60F2-B9F022FD55A9}"/>
+          </ac:spMkLst>
+        </pc:spChg>
+        <pc:spChg chg="del">
+          <ac:chgData name="Nigel L Jones" userId="1512a2c5-99cf-401f-90da-0968559aa4c1" providerId="ADAL" clId="{52167A17-4B3C-0C4B-A355-FED5F0DA7317}" dt="2022-08-24T14:11:26.235" v="3353" actId="700"/>
+          <ac:spMkLst>
+            <pc:docMk/>
+            <pc:sldMk cId="1848827190" sldId="402"/>
+            <ac:spMk id="4" creationId="{E92339B7-C427-9913-8B52-79004DD32B93}"/>
+          </ac:spMkLst>
+        </pc:spChg>
+        <pc:spChg chg="mod ord">
+          <ac:chgData name="Nigel L Jones" userId="1512a2c5-99cf-401f-90da-0968559aa4c1" providerId="ADAL" clId="{52167A17-4B3C-0C4B-A355-FED5F0DA7317}" dt="2022-08-24T14:11:26.235" v="3353" actId="700"/>
+          <ac:spMkLst>
+            <pc:docMk/>
+            <pc:sldMk cId="1848827190" sldId="402"/>
+            <ac:spMk id="5" creationId="{AA3C5B66-CADC-97B8-0849-C3B13837072A}"/>
+          </ac:spMkLst>
+        </pc:spChg>
+        <pc:spChg chg="mod ord">
+          <ac:chgData name="Nigel L Jones" userId="1512a2c5-99cf-401f-90da-0968559aa4c1" providerId="ADAL" clId="{52167A17-4B3C-0C4B-A355-FED5F0DA7317}" dt="2022-08-24T14:11:26.235" v="3353" actId="700"/>
+          <ac:spMkLst>
+            <pc:docMk/>
+            <pc:sldMk cId="1848827190" sldId="402"/>
+            <ac:spMk id="6" creationId="{0F080193-E359-3B1B-2E4B-983807F744AC}"/>
+          </ac:spMkLst>
+        </pc:spChg>
+      </pc:sldChg>
+      <pc:sldMasterChg chg="modSldLayout">
+        <pc:chgData name="Nigel L Jones" userId="1512a2c5-99cf-401f-90da-0968559aa4c1" providerId="ADAL" clId="{52167A17-4B3C-0C4B-A355-FED5F0DA7317}" dt="2022-08-24T14:10:06.442" v="3341"/>
+        <pc:sldMasterMkLst>
+          <pc:docMk/>
+          <pc:sldMasterMk cId="240078074" sldId="2147483891"/>
+        </pc:sldMasterMkLst>
+        <pc:sldLayoutChg chg="modSp mod">
+          <pc:chgData name="Nigel L Jones" userId="1512a2c5-99cf-401f-90da-0968559aa4c1" providerId="ADAL" clId="{52167A17-4B3C-0C4B-A355-FED5F0DA7317}" dt="2022-08-24T14:08:30.873" v="3306"/>
+          <pc:sldLayoutMkLst>
+            <pc:docMk/>
+            <pc:sldMasterMk cId="240078074" sldId="2147483891"/>
+            <pc:sldLayoutMk cId="1794504740" sldId="2147483892"/>
+          </pc:sldLayoutMkLst>
+          <pc:spChg chg="mod">
+            <ac:chgData name="Nigel L Jones" userId="1512a2c5-99cf-401f-90da-0968559aa4c1" providerId="ADAL" clId="{52167A17-4B3C-0C4B-A355-FED5F0DA7317}" dt="2022-08-24T14:08:30.873" v="3306"/>
+            <ac:spMkLst>
+              <pc:docMk/>
+              <pc:sldMasterMk cId="240078074" sldId="2147483891"/>
+              <pc:sldLayoutMk cId="1794504740" sldId="2147483892"/>
+              <ac:spMk id="3" creationId="{00000000-0000-0000-0000-000000000000}"/>
+            </ac:spMkLst>
+          </pc:spChg>
+        </pc:sldLayoutChg>
+        <pc:sldLayoutChg chg="modSp mod">
+          <pc:chgData name="Nigel L Jones" userId="1512a2c5-99cf-401f-90da-0968559aa4c1" providerId="ADAL" clId="{52167A17-4B3C-0C4B-A355-FED5F0DA7317}" dt="2022-08-24T14:08:54.375" v="3314"/>
+          <pc:sldLayoutMkLst>
+            <pc:docMk/>
+            <pc:sldMasterMk cId="240078074" sldId="2147483891"/>
+            <pc:sldLayoutMk cId="670074212" sldId="2147483893"/>
+          </pc:sldLayoutMkLst>
+          <pc:spChg chg="mod">
+            <ac:chgData name="Nigel L Jones" userId="1512a2c5-99cf-401f-90da-0968559aa4c1" providerId="ADAL" clId="{52167A17-4B3C-0C4B-A355-FED5F0DA7317}" dt="2022-08-24T14:08:54.375" v="3314"/>
+            <ac:spMkLst>
+              <pc:docMk/>
+              <pc:sldMasterMk cId="240078074" sldId="2147483891"/>
+              <pc:sldLayoutMk cId="670074212" sldId="2147483893"/>
+              <ac:spMk id="3" creationId="{00000000-0000-0000-0000-000000000000}"/>
+            </ac:spMkLst>
+          </pc:spChg>
+        </pc:sldLayoutChg>
+        <pc:sldLayoutChg chg="modSp mod">
+          <pc:chgData name="Nigel L Jones" userId="1512a2c5-99cf-401f-90da-0968559aa4c1" providerId="ADAL" clId="{52167A17-4B3C-0C4B-A355-FED5F0DA7317}" dt="2022-08-24T14:08:56.406" v="3315"/>
+          <pc:sldLayoutMkLst>
+            <pc:docMk/>
+            <pc:sldMasterMk cId="240078074" sldId="2147483891"/>
+            <pc:sldLayoutMk cId="1585390675" sldId="2147483894"/>
+          </pc:sldLayoutMkLst>
+          <pc:spChg chg="mod">
+            <ac:chgData name="Nigel L Jones" userId="1512a2c5-99cf-401f-90da-0968559aa4c1" providerId="ADAL" clId="{52167A17-4B3C-0C4B-A355-FED5F0DA7317}" dt="2022-08-24T14:08:56.406" v="3315"/>
+            <ac:spMkLst>
+              <pc:docMk/>
+              <pc:sldMasterMk cId="240078074" sldId="2147483891"/>
+              <pc:sldLayoutMk cId="1585390675" sldId="2147483894"/>
+              <ac:spMk id="3" creationId="{00000000-0000-0000-0000-000000000000}"/>
+            </ac:spMkLst>
+          </pc:spChg>
+        </pc:sldLayoutChg>
+        <pc:sldLayoutChg chg="modSp mod">
+          <pc:chgData name="Nigel L Jones" userId="1512a2c5-99cf-401f-90da-0968559aa4c1" providerId="ADAL" clId="{52167A17-4B3C-0C4B-A355-FED5F0DA7317}" dt="2022-08-24T14:09:00.594" v="3316"/>
+          <pc:sldLayoutMkLst>
+            <pc:docMk/>
+            <pc:sldMasterMk cId="240078074" sldId="2147483891"/>
+            <pc:sldLayoutMk cId="1572605121" sldId="2147483895"/>
+          </pc:sldLayoutMkLst>
+          <pc:spChg chg="mod">
+            <ac:chgData name="Nigel L Jones" userId="1512a2c5-99cf-401f-90da-0968559aa4c1" providerId="ADAL" clId="{52167A17-4B3C-0C4B-A355-FED5F0DA7317}" dt="2022-08-24T14:09:00.594" v="3316"/>
+            <ac:spMkLst>
+              <pc:docMk/>
+              <pc:sldMasterMk cId="240078074" sldId="2147483891"/>
+              <pc:sldLayoutMk cId="1572605121" sldId="2147483895"/>
+              <ac:spMk id="3" creationId="{00000000-0000-0000-0000-000000000000}"/>
+            </ac:spMkLst>
+          </pc:spChg>
+        </pc:sldLayoutChg>
+        <pc:sldLayoutChg chg="modSp mod">
+          <pc:chgData name="Nigel L Jones" userId="1512a2c5-99cf-401f-90da-0968559aa4c1" providerId="ADAL" clId="{52167A17-4B3C-0C4B-A355-FED5F0DA7317}" dt="2022-08-24T14:09:02.838" v="3317"/>
+          <pc:sldLayoutMkLst>
+            <pc:docMk/>
+            <pc:sldMasterMk cId="240078074" sldId="2147483891"/>
+            <pc:sldLayoutMk cId="513154776" sldId="2147483896"/>
+          </pc:sldLayoutMkLst>
+          <pc:spChg chg="mod">
+            <ac:chgData name="Nigel L Jones" userId="1512a2c5-99cf-401f-90da-0968559aa4c1" providerId="ADAL" clId="{52167A17-4B3C-0C4B-A355-FED5F0DA7317}" dt="2022-08-24T14:09:02.838" v="3317"/>
+            <ac:spMkLst>
+              <pc:docMk/>
+              <pc:sldMasterMk cId="240078074" sldId="2147483891"/>
+              <pc:sldLayoutMk cId="513154776" sldId="2147483896"/>
+              <ac:spMk id="3" creationId="{00000000-0000-0000-0000-000000000000}"/>
+            </ac:spMkLst>
+          </pc:spChg>
+        </pc:sldLayoutChg>
+        <pc:sldLayoutChg chg="modSp mod">
+          <pc:chgData name="Nigel L Jones" userId="1512a2c5-99cf-401f-90da-0968559aa4c1" providerId="ADAL" clId="{52167A17-4B3C-0C4B-A355-FED5F0DA7317}" dt="2022-08-24T14:09:05.074" v="3318"/>
+          <pc:sldLayoutMkLst>
+            <pc:docMk/>
+            <pc:sldMasterMk cId="240078074" sldId="2147483891"/>
+            <pc:sldLayoutMk cId="451276356" sldId="2147483897"/>
+          </pc:sldLayoutMkLst>
+          <pc:spChg chg="mod">
+            <ac:chgData name="Nigel L Jones" userId="1512a2c5-99cf-401f-90da-0968559aa4c1" providerId="ADAL" clId="{52167A17-4B3C-0C4B-A355-FED5F0DA7317}" dt="2022-08-24T14:09:05.074" v="3318"/>
+            <ac:spMkLst>
+              <pc:docMk/>
+              <pc:sldMasterMk cId="240078074" sldId="2147483891"/>
+              <pc:sldLayoutMk cId="451276356" sldId="2147483897"/>
+              <ac:spMk id="3" creationId="{00000000-0000-0000-0000-000000000000}"/>
+            </ac:spMkLst>
+          </pc:spChg>
+        </pc:sldLayoutChg>
+        <pc:sldLayoutChg chg="modSp mod">
+          <pc:chgData name="Nigel L Jones" userId="1512a2c5-99cf-401f-90da-0968559aa4c1" providerId="ADAL" clId="{52167A17-4B3C-0C4B-A355-FED5F0DA7317}" dt="2022-08-24T14:09:06.992" v="3319"/>
+          <pc:sldLayoutMkLst>
+            <pc:docMk/>
+            <pc:sldMasterMk cId="240078074" sldId="2147483891"/>
+            <pc:sldLayoutMk cId="1523742873" sldId="2147483898"/>
+          </pc:sldLayoutMkLst>
+          <pc:spChg chg="mod">
+            <ac:chgData name="Nigel L Jones" userId="1512a2c5-99cf-401f-90da-0968559aa4c1" providerId="ADAL" clId="{52167A17-4B3C-0C4B-A355-FED5F0DA7317}" dt="2022-08-24T14:09:06.992" v="3319"/>
+            <ac:spMkLst>
+              <pc:docMk/>
+              <pc:sldMasterMk cId="240078074" sldId="2147483891"/>
+              <pc:sldLayoutMk cId="1523742873" sldId="2147483898"/>
+              <ac:spMk id="3" creationId="{00000000-0000-0000-0000-000000000000}"/>
+            </ac:spMkLst>
+          </pc:spChg>
+        </pc:sldLayoutChg>
+        <pc:sldLayoutChg chg="modSp mod">
+          <pc:chgData name="Nigel L Jones" userId="1512a2c5-99cf-401f-90da-0968559aa4c1" providerId="ADAL" clId="{52167A17-4B3C-0C4B-A355-FED5F0DA7317}" dt="2022-08-24T14:09:08.616" v="3320"/>
+          <pc:sldLayoutMkLst>
+            <pc:docMk/>
+            <pc:sldMasterMk cId="240078074" sldId="2147483891"/>
+            <pc:sldLayoutMk cId="458130128" sldId="2147483899"/>
+          </pc:sldLayoutMkLst>
+          <pc:spChg chg="mod">
+            <ac:chgData name="Nigel L Jones" userId="1512a2c5-99cf-401f-90da-0968559aa4c1" providerId="ADAL" clId="{52167A17-4B3C-0C4B-A355-FED5F0DA7317}" dt="2022-08-24T14:09:08.616" v="3320"/>
+            <ac:spMkLst>
+              <pc:docMk/>
+              <pc:sldMasterMk cId="240078074" sldId="2147483891"/>
+              <pc:sldLayoutMk cId="458130128" sldId="2147483899"/>
+              <ac:spMk id="3" creationId="{00000000-0000-0000-0000-000000000000}"/>
+            </ac:spMkLst>
+          </pc:spChg>
+        </pc:sldLayoutChg>
+        <pc:sldLayoutChg chg="modSp mod">
+          <pc:chgData name="Nigel L Jones" userId="1512a2c5-99cf-401f-90da-0968559aa4c1" providerId="ADAL" clId="{52167A17-4B3C-0C4B-A355-FED5F0DA7317}" dt="2022-08-24T14:09:10.456" v="3321"/>
+          <pc:sldLayoutMkLst>
+            <pc:docMk/>
+            <pc:sldMasterMk cId="240078074" sldId="2147483891"/>
+            <pc:sldLayoutMk cId="1543752191" sldId="2147483900"/>
+          </pc:sldLayoutMkLst>
+          <pc:spChg chg="mod">
+            <ac:chgData name="Nigel L Jones" userId="1512a2c5-99cf-401f-90da-0968559aa4c1" providerId="ADAL" clId="{52167A17-4B3C-0C4B-A355-FED5F0DA7317}" dt="2022-08-24T14:09:10.456" v="3321"/>
+            <ac:spMkLst>
+              <pc:docMk/>
+              <pc:sldMasterMk cId="240078074" sldId="2147483891"/>
+              <pc:sldLayoutMk cId="1543752191" sldId="2147483900"/>
+              <ac:spMk id="3" creationId="{00000000-0000-0000-0000-000000000000}"/>
+            </ac:spMkLst>
+          </pc:spChg>
+        </pc:sldLayoutChg>
+        <pc:sldLayoutChg chg="modSp mod">
+          <pc:chgData name="Nigel L Jones" userId="1512a2c5-99cf-401f-90da-0968559aa4c1" providerId="ADAL" clId="{52167A17-4B3C-0C4B-A355-FED5F0DA7317}" dt="2022-08-24T14:09:16.704" v="3322"/>
+          <pc:sldLayoutMkLst>
+            <pc:docMk/>
+            <pc:sldMasterMk cId="240078074" sldId="2147483891"/>
+            <pc:sldLayoutMk cId="1385785603" sldId="2147483901"/>
+          </pc:sldLayoutMkLst>
+          <pc:spChg chg="mod">
+            <ac:chgData name="Nigel L Jones" userId="1512a2c5-99cf-401f-90da-0968559aa4c1" providerId="ADAL" clId="{52167A17-4B3C-0C4B-A355-FED5F0DA7317}" dt="2022-08-24T14:09:16.704" v="3322"/>
+            <ac:spMkLst>
+              <pc:docMk/>
+              <pc:sldMasterMk cId="240078074" sldId="2147483891"/>
+              <pc:sldLayoutMk cId="1385785603" sldId="2147483901"/>
+              <ac:spMk id="3" creationId="{00000000-0000-0000-0000-000000000000}"/>
+            </ac:spMkLst>
+          </pc:spChg>
+        </pc:sldLayoutChg>
+        <pc:sldLayoutChg chg="modSp mod">
+          <pc:chgData name="Nigel L Jones" userId="1512a2c5-99cf-401f-90da-0968559aa4c1" providerId="ADAL" clId="{52167A17-4B3C-0C4B-A355-FED5F0DA7317}" dt="2022-08-24T14:08:23.395" v="3305" actId="20577"/>
+          <pc:sldLayoutMkLst>
+            <pc:docMk/>
+            <pc:sldMasterMk cId="240078074" sldId="2147483891"/>
+            <pc:sldLayoutMk cId="127268216" sldId="2147483902"/>
+          </pc:sldLayoutMkLst>
+          <pc:spChg chg="mod">
+            <ac:chgData name="Nigel L Jones" userId="1512a2c5-99cf-401f-90da-0968559aa4c1" providerId="ADAL" clId="{52167A17-4B3C-0C4B-A355-FED5F0DA7317}" dt="2022-08-24T14:08:23.395" v="3305" actId="20577"/>
+            <ac:spMkLst>
+              <pc:docMk/>
+              <pc:sldMasterMk cId="240078074" sldId="2147483891"/>
+              <pc:sldLayoutMk cId="127268216" sldId="2147483902"/>
+              <ac:spMk id="3" creationId="{00000000-0000-0000-0000-000000000000}"/>
+            </ac:spMkLst>
+          </pc:spChg>
+        </pc:sldLayoutChg>
+        <pc:sldLayoutChg chg="modSp mod">
+          <pc:chgData name="Nigel L Jones" userId="1512a2c5-99cf-401f-90da-0968559aa4c1" providerId="ADAL" clId="{52167A17-4B3C-0C4B-A355-FED5F0DA7317}" dt="2022-08-24T14:09:21.342" v="3323"/>
+          <pc:sldLayoutMkLst>
+            <pc:docMk/>
+            <pc:sldMasterMk cId="240078074" sldId="2147483891"/>
+            <pc:sldLayoutMk cId="1360574171" sldId="2147483903"/>
+          </pc:sldLayoutMkLst>
+          <pc:spChg chg="mod">
+            <ac:chgData name="Nigel L Jones" userId="1512a2c5-99cf-401f-90da-0968559aa4c1" providerId="ADAL" clId="{52167A17-4B3C-0C4B-A355-FED5F0DA7317}" dt="2022-08-24T14:09:21.342" v="3323"/>
+            <ac:spMkLst>
+              <pc:docMk/>
+              <pc:sldMasterMk cId="240078074" sldId="2147483891"/>
+              <pc:sldLayoutMk cId="1360574171" sldId="2147483903"/>
+              <ac:spMk id="3" creationId="{00000000-0000-0000-0000-000000000000}"/>
+            </ac:spMkLst>
+          </pc:spChg>
+        </pc:sldLayoutChg>
+        <pc:sldLayoutChg chg="modSp mod">
+          <pc:chgData name="Nigel L Jones" userId="1512a2c5-99cf-401f-90da-0968559aa4c1" providerId="ADAL" clId="{52167A17-4B3C-0C4B-A355-FED5F0DA7317}" dt="2022-08-24T14:09:23.156" v="3324"/>
+          <pc:sldLayoutMkLst>
+            <pc:docMk/>
+            <pc:sldMasterMk cId="240078074" sldId="2147483891"/>
+            <pc:sldLayoutMk cId="124687280" sldId="2147483904"/>
+          </pc:sldLayoutMkLst>
+          <pc:spChg chg="mod">
+            <ac:chgData name="Nigel L Jones" userId="1512a2c5-99cf-401f-90da-0968559aa4c1" providerId="ADAL" clId="{52167A17-4B3C-0C4B-A355-FED5F0DA7317}" dt="2022-08-24T14:09:23.156" v="3324"/>
+            <ac:spMkLst>
+              <pc:docMk/>
+              <pc:sldMasterMk cId="240078074" sldId="2147483891"/>
+              <pc:sldLayoutMk cId="124687280" sldId="2147483904"/>
+              <ac:spMk id="3" creationId="{00000000-0000-0000-0000-000000000000}"/>
+            </ac:spMkLst>
+          </pc:spChg>
+        </pc:sldLayoutChg>
+        <pc:sldLayoutChg chg="modSp mod">
+          <pc:chgData name="Nigel L Jones" userId="1512a2c5-99cf-401f-90da-0968559aa4c1" providerId="ADAL" clId="{52167A17-4B3C-0C4B-A355-FED5F0DA7317}" dt="2022-08-24T14:09:25.265" v="3325"/>
+          <pc:sldLayoutMkLst>
+            <pc:docMk/>
+            <pc:sldMasterMk cId="240078074" sldId="2147483891"/>
+            <pc:sldLayoutMk cId="44641137" sldId="2147483905"/>
+          </pc:sldLayoutMkLst>
+          <pc:spChg chg="mod">
+            <ac:chgData name="Nigel L Jones" userId="1512a2c5-99cf-401f-90da-0968559aa4c1" providerId="ADAL" clId="{52167A17-4B3C-0C4B-A355-FED5F0DA7317}" dt="2022-08-24T14:09:25.265" v="3325"/>
+            <ac:spMkLst>
+              <pc:docMk/>
+              <pc:sldMasterMk cId="240078074" sldId="2147483891"/>
+              <pc:sldLayoutMk cId="44641137" sldId="2147483905"/>
+              <ac:spMk id="3" creationId="{00000000-0000-0000-0000-000000000000}"/>
+            </ac:spMkLst>
+          </pc:spChg>
+        </pc:sldLayoutChg>
+        <pc:sldLayoutChg chg="modSp mod">
+          <pc:chgData name="Nigel L Jones" userId="1512a2c5-99cf-401f-90da-0968559aa4c1" providerId="ADAL" clId="{52167A17-4B3C-0C4B-A355-FED5F0DA7317}" dt="2022-08-24T14:09:27.073" v="3326"/>
+          <pc:sldLayoutMkLst>
+            <pc:docMk/>
+            <pc:sldMasterMk cId="240078074" sldId="2147483891"/>
+            <pc:sldLayoutMk cId="904468701" sldId="2147483906"/>
+          </pc:sldLayoutMkLst>
+          <pc:spChg chg="mod">
+            <ac:chgData name="Nigel L Jones" userId="1512a2c5-99cf-401f-90da-0968559aa4c1" providerId="ADAL" clId="{52167A17-4B3C-0C4B-A355-FED5F0DA7317}" dt="2022-08-24T14:09:27.073" v="3326"/>
+            <ac:spMkLst>
+              <pc:docMk/>
+              <pc:sldMasterMk cId="240078074" sldId="2147483891"/>
+              <pc:sldLayoutMk cId="904468701" sldId="2147483906"/>
+              <ac:spMk id="3" creationId="{00000000-0000-0000-0000-000000000000}"/>
+            </ac:spMkLst>
+          </pc:spChg>
+        </pc:sldLayoutChg>
+        <pc:sldLayoutChg chg="modSp mod">
+          <pc:chgData name="Nigel L Jones" userId="1512a2c5-99cf-401f-90da-0968559aa4c1" providerId="ADAL" clId="{52167A17-4B3C-0C4B-A355-FED5F0DA7317}" dt="2022-08-24T14:09:28.818" v="3327"/>
+          <pc:sldLayoutMkLst>
+            <pc:docMk/>
+            <pc:sldMasterMk cId="240078074" sldId="2147483891"/>
+            <pc:sldLayoutMk cId="803723185" sldId="2147483907"/>
+          </pc:sldLayoutMkLst>
+          <pc:spChg chg="mod">
+            <ac:chgData name="Nigel L Jones" userId="1512a2c5-99cf-401f-90da-0968559aa4c1" providerId="ADAL" clId="{52167A17-4B3C-0C4B-A355-FED5F0DA7317}" dt="2022-08-24T14:09:28.818" v="3327"/>
+            <ac:spMkLst>
+              <pc:docMk/>
+              <pc:sldMasterMk cId="240078074" sldId="2147483891"/>
+              <pc:sldLayoutMk cId="803723185" sldId="2147483907"/>
+              <ac:spMk id="3" creationId="{00000000-0000-0000-0000-000000000000}"/>
+            </ac:spMkLst>
+          </pc:spChg>
+        </pc:sldLayoutChg>
+        <pc:sldLayoutChg chg="modSp mod">
+          <pc:chgData name="Nigel L Jones" userId="1512a2c5-99cf-401f-90da-0968559aa4c1" providerId="ADAL" clId="{52167A17-4B3C-0C4B-A355-FED5F0DA7317}" dt="2022-08-24T14:09:31.156" v="3328"/>
+          <pc:sldLayoutMkLst>
+            <pc:docMk/>
+            <pc:sldMasterMk cId="240078074" sldId="2147483891"/>
+            <pc:sldLayoutMk cId="73617475" sldId="2147483908"/>
+          </pc:sldLayoutMkLst>
+          <pc:spChg chg="mod">
+            <ac:chgData name="Nigel L Jones" userId="1512a2c5-99cf-401f-90da-0968559aa4c1" providerId="ADAL" clId="{52167A17-4B3C-0C4B-A355-FED5F0DA7317}" dt="2022-08-24T14:09:31.156" v="3328"/>
+            <ac:spMkLst>
+              <pc:docMk/>
+              <pc:sldMasterMk cId="240078074" sldId="2147483891"/>
+              <pc:sldLayoutMk cId="73617475" sldId="2147483908"/>
+              <ac:spMk id="3" creationId="{00000000-0000-0000-0000-000000000000}"/>
+            </ac:spMkLst>
+          </pc:spChg>
+        </pc:sldLayoutChg>
+        <pc:sldLayoutChg chg="modSp mod">
+          <pc:chgData name="Nigel L Jones" userId="1512a2c5-99cf-401f-90da-0968559aa4c1" providerId="ADAL" clId="{52167A17-4B3C-0C4B-A355-FED5F0DA7317}" dt="2022-08-24T14:09:36.546" v="3329"/>
+          <pc:sldLayoutMkLst>
+            <pc:docMk/>
+            <pc:sldMasterMk cId="240078074" sldId="2147483891"/>
+            <pc:sldLayoutMk cId="1782808362" sldId="2147483909"/>
+          </pc:sldLayoutMkLst>
+          <pc:spChg chg="mod">
+            <ac:chgData name="Nigel L Jones" userId="1512a2c5-99cf-401f-90da-0968559aa4c1" providerId="ADAL" clId="{52167A17-4B3C-0C4B-A355-FED5F0DA7317}" dt="2022-08-24T14:09:36.546" v="3329"/>
+            <ac:spMkLst>
+              <pc:docMk/>
+              <pc:sldMasterMk cId="240078074" sldId="2147483891"/>
+              <pc:sldLayoutMk cId="1782808362" sldId="2147483909"/>
+              <ac:spMk id="3" creationId="{00000000-0000-0000-0000-000000000000}"/>
+            </ac:spMkLst>
+          </pc:spChg>
+        </pc:sldLayoutChg>
+        <pc:sldLayoutChg chg="modSp mod">
+          <pc:chgData name="Nigel L Jones" userId="1512a2c5-99cf-401f-90da-0968559aa4c1" providerId="ADAL" clId="{52167A17-4B3C-0C4B-A355-FED5F0DA7317}" dt="2022-08-24T14:09:38.923" v="3330"/>
+          <pc:sldLayoutMkLst>
+            <pc:docMk/>
+            <pc:sldMasterMk cId="240078074" sldId="2147483891"/>
+            <pc:sldLayoutMk cId="1332773942" sldId="2147483910"/>
+          </pc:sldLayoutMkLst>
+          <pc:spChg chg="mod">
+            <ac:chgData name="Nigel L Jones" userId="1512a2c5-99cf-401f-90da-0968559aa4c1" providerId="ADAL" clId="{52167A17-4B3C-0C4B-A355-FED5F0DA7317}" dt="2022-08-24T14:09:38.923" v="3330"/>
+            <ac:spMkLst>
+              <pc:docMk/>
+              <pc:sldMasterMk cId="240078074" sldId="2147483891"/>
+              <pc:sldLayoutMk cId="1332773942" sldId="2147483910"/>
+              <ac:spMk id="3" creationId="{00000000-0000-0000-0000-000000000000}"/>
+            </ac:spMkLst>
+          </pc:spChg>
+        </pc:sldLayoutChg>
+        <pc:sldLayoutChg chg="modSp mod">
+          <pc:chgData name="Nigel L Jones" userId="1512a2c5-99cf-401f-90da-0968559aa4c1" providerId="ADAL" clId="{52167A17-4B3C-0C4B-A355-FED5F0DA7317}" dt="2022-08-24T14:09:41.187" v="3331"/>
+          <pc:sldLayoutMkLst>
+            <pc:docMk/>
+            <pc:sldMasterMk cId="240078074" sldId="2147483891"/>
+            <pc:sldLayoutMk cId="913815566" sldId="2147483911"/>
+          </pc:sldLayoutMkLst>
+          <pc:spChg chg="mod">
+            <ac:chgData name="Nigel L Jones" userId="1512a2c5-99cf-401f-90da-0968559aa4c1" providerId="ADAL" clId="{52167A17-4B3C-0C4B-A355-FED5F0DA7317}" dt="2022-08-24T14:09:41.187" v="3331"/>
+            <ac:spMkLst>
+              <pc:docMk/>
+              <pc:sldMasterMk cId="240078074" sldId="2147483891"/>
+              <pc:sldLayoutMk cId="913815566" sldId="2147483911"/>
+              <ac:spMk id="3" creationId="{00000000-0000-0000-0000-000000000000}"/>
+            </ac:spMkLst>
+          </pc:spChg>
+        </pc:sldLayoutChg>
+        <pc:sldLayoutChg chg="modSp mod">
+          <pc:chgData name="Nigel L Jones" userId="1512a2c5-99cf-401f-90da-0968559aa4c1" providerId="ADAL" clId="{52167A17-4B3C-0C4B-A355-FED5F0DA7317}" dt="2022-08-24T14:09:43.525" v="3332"/>
+          <pc:sldLayoutMkLst>
+            <pc:docMk/>
+            <pc:sldMasterMk cId="240078074" sldId="2147483891"/>
+            <pc:sldLayoutMk cId="692425068" sldId="2147483912"/>
+          </pc:sldLayoutMkLst>
+          <pc:spChg chg="mod">
+            <ac:chgData name="Nigel L Jones" userId="1512a2c5-99cf-401f-90da-0968559aa4c1" providerId="ADAL" clId="{52167A17-4B3C-0C4B-A355-FED5F0DA7317}" dt="2022-08-24T14:09:43.525" v="3332"/>
+            <ac:spMkLst>
+              <pc:docMk/>
+              <pc:sldMasterMk cId="240078074" sldId="2147483891"/>
+              <pc:sldLayoutMk cId="692425068" sldId="2147483912"/>
+              <ac:spMk id="3" creationId="{00000000-0000-0000-0000-000000000000}"/>
+            </ac:spMkLst>
+          </pc:spChg>
+        </pc:sldLayoutChg>
+        <pc:sldLayoutChg chg="modSp mod">
+          <pc:chgData name="Nigel L Jones" userId="1512a2c5-99cf-401f-90da-0968559aa4c1" providerId="ADAL" clId="{52167A17-4B3C-0C4B-A355-FED5F0DA7317}" dt="2022-08-24T14:09:45.709" v="3333"/>
+          <pc:sldLayoutMkLst>
+            <pc:docMk/>
+            <pc:sldMasterMk cId="240078074" sldId="2147483891"/>
+            <pc:sldLayoutMk cId="1931879465" sldId="2147483913"/>
+          </pc:sldLayoutMkLst>
+          <pc:spChg chg="mod">
+            <ac:chgData name="Nigel L Jones" userId="1512a2c5-99cf-401f-90da-0968559aa4c1" providerId="ADAL" clId="{52167A17-4B3C-0C4B-A355-FED5F0DA7317}" dt="2022-08-24T14:09:45.709" v="3333"/>
+            <ac:spMkLst>
+              <pc:docMk/>
+              <pc:sldMasterMk cId="240078074" sldId="2147483891"/>
+              <pc:sldLayoutMk cId="1931879465" sldId="2147483913"/>
+              <ac:spMk id="3" creationId="{00000000-0000-0000-0000-000000000000}"/>
+            </ac:spMkLst>
+          </pc:spChg>
+        </pc:sldLayoutChg>
+        <pc:sldLayoutChg chg="modSp mod">
+          <pc:chgData name="Nigel L Jones" userId="1512a2c5-99cf-401f-90da-0968559aa4c1" providerId="ADAL" clId="{52167A17-4B3C-0C4B-A355-FED5F0DA7317}" dt="2022-08-24T14:09:47.606" v="3334"/>
+          <pc:sldLayoutMkLst>
+            <pc:docMk/>
+            <pc:sldMasterMk cId="240078074" sldId="2147483891"/>
+            <pc:sldLayoutMk cId="1686426088" sldId="2147483914"/>
+          </pc:sldLayoutMkLst>
+          <pc:spChg chg="mod">
+            <ac:chgData name="Nigel L Jones" userId="1512a2c5-99cf-401f-90da-0968559aa4c1" providerId="ADAL" clId="{52167A17-4B3C-0C4B-A355-FED5F0DA7317}" dt="2022-08-24T14:09:47.606" v="3334"/>
+            <ac:spMkLst>
+              <pc:docMk/>
+              <pc:sldMasterMk cId="240078074" sldId="2147483891"/>
+              <pc:sldLayoutMk cId="1686426088" sldId="2147483914"/>
+              <ac:spMk id="3" creationId="{00000000-0000-0000-0000-000000000000}"/>
+            </ac:spMkLst>
+          </pc:spChg>
+        </pc:sldLayoutChg>
+        <pc:sldLayoutChg chg="modSp mod">
+          <pc:chgData name="Nigel L Jones" userId="1512a2c5-99cf-401f-90da-0968559aa4c1" providerId="ADAL" clId="{52167A17-4B3C-0C4B-A355-FED5F0DA7317}" dt="2022-08-24T14:09:49.871" v="3335"/>
+          <pc:sldLayoutMkLst>
+            <pc:docMk/>
+            <pc:sldMasterMk cId="240078074" sldId="2147483891"/>
+            <pc:sldLayoutMk cId="1036059133" sldId="2147483915"/>
+          </pc:sldLayoutMkLst>
+          <pc:spChg chg="mod">
+            <ac:chgData name="Nigel L Jones" userId="1512a2c5-99cf-401f-90da-0968559aa4c1" providerId="ADAL" clId="{52167A17-4B3C-0C4B-A355-FED5F0DA7317}" dt="2022-08-24T14:09:49.871" v="3335"/>
+            <ac:spMkLst>
+              <pc:docMk/>
+              <pc:sldMasterMk cId="240078074" sldId="2147483891"/>
+              <pc:sldLayoutMk cId="1036059133" sldId="2147483915"/>
+              <ac:spMk id="3" creationId="{00000000-0000-0000-0000-000000000000}"/>
+            </ac:spMkLst>
+          </pc:spChg>
+        </pc:sldLayoutChg>
+        <pc:sldLayoutChg chg="modSp mod">
+          <pc:chgData name="Nigel L Jones" userId="1512a2c5-99cf-401f-90da-0968559aa4c1" providerId="ADAL" clId="{52167A17-4B3C-0C4B-A355-FED5F0DA7317}" dt="2022-08-24T14:09:51.842" v="3336"/>
+          <pc:sldLayoutMkLst>
+            <pc:docMk/>
+            <pc:sldMasterMk cId="240078074" sldId="2147483891"/>
+            <pc:sldLayoutMk cId="1589881995" sldId="2147483916"/>
+          </pc:sldLayoutMkLst>
+          <pc:spChg chg="mod">
+            <ac:chgData name="Nigel L Jones" userId="1512a2c5-99cf-401f-90da-0968559aa4c1" providerId="ADAL" clId="{52167A17-4B3C-0C4B-A355-FED5F0DA7317}" dt="2022-08-24T14:09:51.842" v="3336"/>
+            <ac:spMkLst>
+              <pc:docMk/>
+              <pc:sldMasterMk cId="240078074" sldId="2147483891"/>
+              <pc:sldLayoutMk cId="1589881995" sldId="2147483916"/>
+              <ac:spMk id="3" creationId="{00000000-0000-0000-0000-000000000000}"/>
+            </ac:spMkLst>
+          </pc:spChg>
+        </pc:sldLayoutChg>
+        <pc:sldLayoutChg chg="modSp mod">
+          <pc:chgData name="Nigel L Jones" userId="1512a2c5-99cf-401f-90da-0968559aa4c1" providerId="ADAL" clId="{52167A17-4B3C-0C4B-A355-FED5F0DA7317}" dt="2022-08-24T14:09:53.509" v="3337"/>
+          <pc:sldLayoutMkLst>
+            <pc:docMk/>
+            <pc:sldMasterMk cId="240078074" sldId="2147483891"/>
+            <pc:sldLayoutMk cId="66452788" sldId="2147483917"/>
+          </pc:sldLayoutMkLst>
+          <pc:spChg chg="mod">
+            <ac:chgData name="Nigel L Jones" userId="1512a2c5-99cf-401f-90da-0968559aa4c1" providerId="ADAL" clId="{52167A17-4B3C-0C4B-A355-FED5F0DA7317}" dt="2022-08-24T14:09:53.509" v="3337"/>
+            <ac:spMkLst>
+              <pc:docMk/>
+              <pc:sldMasterMk cId="240078074" sldId="2147483891"/>
+              <pc:sldLayoutMk cId="66452788" sldId="2147483917"/>
+              <ac:spMk id="3" creationId="{00000000-0000-0000-0000-000000000000}"/>
+            </ac:spMkLst>
+          </pc:spChg>
+        </pc:sldLayoutChg>
+        <pc:sldLayoutChg chg="modSp mod">
+          <pc:chgData name="Nigel L Jones" userId="1512a2c5-99cf-401f-90da-0968559aa4c1" providerId="ADAL" clId="{52167A17-4B3C-0C4B-A355-FED5F0DA7317}" dt="2022-08-24T14:09:56.774" v="3338"/>
+          <pc:sldLayoutMkLst>
+            <pc:docMk/>
+            <pc:sldMasterMk cId="240078074" sldId="2147483891"/>
+            <pc:sldLayoutMk cId="1609467568" sldId="2147483918"/>
+          </pc:sldLayoutMkLst>
+          <pc:spChg chg="mod">
+            <ac:chgData name="Nigel L Jones" userId="1512a2c5-99cf-401f-90da-0968559aa4c1" providerId="ADAL" clId="{52167A17-4B3C-0C4B-A355-FED5F0DA7317}" dt="2022-08-24T14:09:56.774" v="3338"/>
+            <ac:spMkLst>
+              <pc:docMk/>
+              <pc:sldMasterMk cId="240078074" sldId="2147483891"/>
+              <pc:sldLayoutMk cId="1609467568" sldId="2147483918"/>
+              <ac:spMk id="3" creationId="{00000000-0000-0000-0000-000000000000}"/>
+            </ac:spMkLst>
+          </pc:spChg>
+        </pc:sldLayoutChg>
+        <pc:sldLayoutChg chg="modSp mod">
+          <pc:chgData name="Nigel L Jones" userId="1512a2c5-99cf-401f-90da-0968559aa4c1" providerId="ADAL" clId="{52167A17-4B3C-0C4B-A355-FED5F0DA7317}" dt="2022-08-24T14:09:59.268" v="3339"/>
+          <pc:sldLayoutMkLst>
+            <pc:docMk/>
+            <pc:sldMasterMk cId="240078074" sldId="2147483891"/>
+            <pc:sldLayoutMk cId="2110720891" sldId="2147483919"/>
+          </pc:sldLayoutMkLst>
+          <pc:spChg chg="mod">
+            <ac:chgData name="Nigel L Jones" userId="1512a2c5-99cf-401f-90da-0968559aa4c1" providerId="ADAL" clId="{52167A17-4B3C-0C4B-A355-FED5F0DA7317}" dt="2022-08-24T14:09:59.268" v="3339"/>
+            <ac:spMkLst>
+              <pc:docMk/>
+              <pc:sldMasterMk cId="240078074" sldId="2147483891"/>
+              <pc:sldLayoutMk cId="2110720891" sldId="2147483919"/>
+              <ac:spMk id="3" creationId="{00000000-0000-0000-0000-000000000000}"/>
+            </ac:spMkLst>
+          </pc:spChg>
+        </pc:sldLayoutChg>
+        <pc:sldLayoutChg chg="modSp mod">
+          <pc:chgData name="Nigel L Jones" userId="1512a2c5-99cf-401f-90da-0968559aa4c1" providerId="ADAL" clId="{52167A17-4B3C-0C4B-A355-FED5F0DA7317}" dt="2022-08-24T14:10:01.129" v="3340"/>
+          <pc:sldLayoutMkLst>
+            <pc:docMk/>
+            <pc:sldMasterMk cId="240078074" sldId="2147483891"/>
+            <pc:sldLayoutMk cId="836902480" sldId="2147483920"/>
+          </pc:sldLayoutMkLst>
+          <pc:spChg chg="mod">
+            <ac:chgData name="Nigel L Jones" userId="1512a2c5-99cf-401f-90da-0968559aa4c1" providerId="ADAL" clId="{52167A17-4B3C-0C4B-A355-FED5F0DA7317}" dt="2022-08-24T14:10:01.129" v="3340"/>
+            <ac:spMkLst>
+              <pc:docMk/>
+              <pc:sldMasterMk cId="240078074" sldId="2147483891"/>
+              <pc:sldLayoutMk cId="836902480" sldId="2147483920"/>
+              <ac:spMk id="3" creationId="{00000000-0000-0000-0000-000000000000}"/>
+            </ac:spMkLst>
+          </pc:spChg>
+        </pc:sldLayoutChg>
+        <pc:sldLayoutChg chg="modSp mod">
+          <pc:chgData name="Nigel L Jones" userId="1512a2c5-99cf-401f-90da-0968559aa4c1" providerId="ADAL" clId="{52167A17-4B3C-0C4B-A355-FED5F0DA7317}" dt="2022-08-24T14:10:06.442" v="3341"/>
+          <pc:sldLayoutMkLst>
+            <pc:docMk/>
+            <pc:sldMasterMk cId="240078074" sldId="2147483891"/>
+            <pc:sldLayoutMk cId="1844821336" sldId="2147483922"/>
+          </pc:sldLayoutMkLst>
+          <pc:spChg chg="mod">
+            <ac:chgData name="Nigel L Jones" userId="1512a2c5-99cf-401f-90da-0968559aa4c1" providerId="ADAL" clId="{52167A17-4B3C-0C4B-A355-FED5F0DA7317}" dt="2022-08-24T14:10:06.442" v="3341"/>
+            <ac:spMkLst>
+              <pc:docMk/>
+              <pc:sldMasterMk cId="240078074" sldId="2147483891"/>
+              <pc:sldLayoutMk cId="1844821336" sldId="2147483922"/>
+              <ac:spMk id="3" creationId="{00000000-0000-0000-0000-000000000000}"/>
+            </ac:spMkLst>
+          </pc:spChg>
+        </pc:sldLayoutChg>
+        <pc:sldLayoutChg chg="modSp mod">
+          <pc:chgData name="Nigel L Jones" userId="1512a2c5-99cf-401f-90da-0968559aa4c1" providerId="ADAL" clId="{52167A17-4B3C-0C4B-A355-FED5F0DA7317}" dt="2022-08-24T14:08:45.386" v="3311"/>
+          <pc:sldLayoutMkLst>
+            <pc:docMk/>
+            <pc:sldMasterMk cId="240078074" sldId="2147483891"/>
+            <pc:sldLayoutMk cId="2685407276" sldId="2147483924"/>
+          </pc:sldLayoutMkLst>
+          <pc:spChg chg="mod">
+            <ac:chgData name="Nigel L Jones" userId="1512a2c5-99cf-401f-90da-0968559aa4c1" providerId="ADAL" clId="{52167A17-4B3C-0C4B-A355-FED5F0DA7317}" dt="2022-08-24T14:08:45.386" v="3311"/>
+            <ac:spMkLst>
+              <pc:docMk/>
+              <pc:sldMasterMk cId="240078074" sldId="2147483891"/>
+              <pc:sldLayoutMk cId="2685407276" sldId="2147483924"/>
+              <ac:spMk id="3" creationId="{00000000-0000-0000-0000-000000000000}"/>
+            </ac:spMkLst>
+          </pc:spChg>
+        </pc:sldLayoutChg>
+        <pc:sldLayoutChg chg="modSp mod">
+          <pc:chgData name="Nigel L Jones" userId="1512a2c5-99cf-401f-90da-0968559aa4c1" providerId="ADAL" clId="{52167A17-4B3C-0C4B-A355-FED5F0DA7317}" dt="2022-08-24T14:08:43.138" v="3310"/>
+          <pc:sldLayoutMkLst>
+            <pc:docMk/>
+            <pc:sldMasterMk cId="240078074" sldId="2147483891"/>
+            <pc:sldLayoutMk cId="2034687758" sldId="2147483925"/>
+          </pc:sldLayoutMkLst>
+          <pc:spChg chg="mod">
+            <ac:chgData name="Nigel L Jones" userId="1512a2c5-99cf-401f-90da-0968559aa4c1" providerId="ADAL" clId="{52167A17-4B3C-0C4B-A355-FED5F0DA7317}" dt="2022-08-24T14:08:43.138" v="3310"/>
+            <ac:spMkLst>
+              <pc:docMk/>
+              <pc:sldMasterMk cId="240078074" sldId="2147483891"/>
+              <pc:sldLayoutMk cId="2034687758" sldId="2147483925"/>
+              <ac:spMk id="3" creationId="{00000000-0000-0000-0000-000000000000}"/>
+            </ac:spMkLst>
+          </pc:spChg>
+        </pc:sldLayoutChg>
+        <pc:sldLayoutChg chg="modSp mod">
+          <pc:chgData name="Nigel L Jones" userId="1512a2c5-99cf-401f-90da-0968559aa4c1" providerId="ADAL" clId="{52167A17-4B3C-0C4B-A355-FED5F0DA7317}" dt="2022-08-24T14:08:33.670" v="3307"/>
+          <pc:sldLayoutMkLst>
+            <pc:docMk/>
+            <pc:sldMasterMk cId="240078074" sldId="2147483891"/>
+            <pc:sldLayoutMk cId="1548977448" sldId="2147483926"/>
+          </pc:sldLayoutMkLst>
+          <pc:spChg chg="mod">
+            <ac:chgData name="Nigel L Jones" userId="1512a2c5-99cf-401f-90da-0968559aa4c1" providerId="ADAL" clId="{52167A17-4B3C-0C4B-A355-FED5F0DA7317}" dt="2022-08-24T14:08:33.670" v="3307"/>
+            <ac:spMkLst>
+              <pc:docMk/>
+              <pc:sldMasterMk cId="240078074" sldId="2147483891"/>
+              <pc:sldLayoutMk cId="1548977448" sldId="2147483926"/>
+              <ac:spMk id="3" creationId="{00000000-0000-0000-0000-000000000000}"/>
+            </ac:spMkLst>
+          </pc:spChg>
+        </pc:sldLayoutChg>
+        <pc:sldLayoutChg chg="modSp mod">
+          <pc:chgData name="Nigel L Jones" userId="1512a2c5-99cf-401f-90da-0968559aa4c1" providerId="ADAL" clId="{52167A17-4B3C-0C4B-A355-FED5F0DA7317}" dt="2022-08-24T14:07:31.229" v="3304" actId="6549"/>
+          <pc:sldLayoutMkLst>
+            <pc:docMk/>
+            <pc:sldMasterMk cId="240078074" sldId="2147483891"/>
+            <pc:sldLayoutMk cId="3739273133" sldId="2147483935"/>
+          </pc:sldLayoutMkLst>
+          <pc:spChg chg="mod">
+            <ac:chgData name="Nigel L Jones" userId="1512a2c5-99cf-401f-90da-0968559aa4c1" providerId="ADAL" clId="{52167A17-4B3C-0C4B-A355-FED5F0DA7317}" dt="2022-08-24T14:07:31.229" v="3304" actId="6549"/>
+            <ac:spMkLst>
+              <pc:docMk/>
+              <pc:sldMasterMk cId="240078074" sldId="2147483891"/>
+              <pc:sldLayoutMk cId="3739273133" sldId="2147483935"/>
+              <ac:spMk id="3" creationId="{00000000-0000-0000-0000-000000000000}"/>
+            </ac:spMkLst>
+          </pc:spChg>
+        </pc:sldLayoutChg>
+        <pc:sldLayoutChg chg="modSp mod">
+          <pc:chgData name="Nigel L Jones" userId="1512a2c5-99cf-401f-90da-0968559aa4c1" providerId="ADAL" clId="{52167A17-4B3C-0C4B-A355-FED5F0DA7317}" dt="2022-08-24T14:08:38.228" v="3308"/>
+          <pc:sldLayoutMkLst>
+            <pc:docMk/>
+            <pc:sldMasterMk cId="240078074" sldId="2147483891"/>
+            <pc:sldLayoutMk cId="459289567" sldId="2147483936"/>
+          </pc:sldLayoutMkLst>
+          <pc:spChg chg="mod">
+            <ac:chgData name="Nigel L Jones" userId="1512a2c5-99cf-401f-90da-0968559aa4c1" providerId="ADAL" clId="{52167A17-4B3C-0C4B-A355-FED5F0DA7317}" dt="2022-08-24T14:08:38.228" v="3308"/>
+            <ac:spMkLst>
+              <pc:docMk/>
+              <pc:sldMasterMk cId="240078074" sldId="2147483891"/>
+              <pc:sldLayoutMk cId="459289567" sldId="2147483936"/>
+              <ac:spMk id="3" creationId="{00000000-0000-0000-0000-000000000000}"/>
+            </ac:spMkLst>
+          </pc:spChg>
+        </pc:sldLayoutChg>
+        <pc:sldLayoutChg chg="modSp mod">
+          <pc:chgData name="Nigel L Jones" userId="1512a2c5-99cf-401f-90da-0968559aa4c1" providerId="ADAL" clId="{52167A17-4B3C-0C4B-A355-FED5F0DA7317}" dt="2022-08-24T14:08:40.658" v="3309"/>
+          <pc:sldLayoutMkLst>
+            <pc:docMk/>
+            <pc:sldMasterMk cId="240078074" sldId="2147483891"/>
+            <pc:sldLayoutMk cId="293308763" sldId="2147483937"/>
+          </pc:sldLayoutMkLst>
+          <pc:spChg chg="mod">
+            <ac:chgData name="Nigel L Jones" userId="1512a2c5-99cf-401f-90da-0968559aa4c1" providerId="ADAL" clId="{52167A17-4B3C-0C4B-A355-FED5F0DA7317}" dt="2022-08-24T14:08:40.658" v="3309"/>
+            <ac:spMkLst>
+              <pc:docMk/>
+              <pc:sldMasterMk cId="240078074" sldId="2147483891"/>
+              <pc:sldLayoutMk cId="293308763" sldId="2147483937"/>
+              <ac:spMk id="3" creationId="{00000000-0000-0000-0000-000000000000}"/>
+            </ac:spMkLst>
+          </pc:spChg>
+        </pc:sldLayoutChg>
+        <pc:sldLayoutChg chg="modSp mod">
+          <pc:chgData name="Nigel L Jones" userId="1512a2c5-99cf-401f-90da-0968559aa4c1" providerId="ADAL" clId="{52167A17-4B3C-0C4B-A355-FED5F0DA7317}" dt="2022-08-24T14:08:47.209" v="3312"/>
+          <pc:sldLayoutMkLst>
+            <pc:docMk/>
+            <pc:sldMasterMk cId="240078074" sldId="2147483891"/>
+            <pc:sldLayoutMk cId="3247010197" sldId="2147483938"/>
+          </pc:sldLayoutMkLst>
+          <pc:spChg chg="mod">
+            <ac:chgData name="Nigel L Jones" userId="1512a2c5-99cf-401f-90da-0968559aa4c1" providerId="ADAL" clId="{52167A17-4B3C-0C4B-A355-FED5F0DA7317}" dt="2022-08-24T14:08:47.209" v="3312"/>
+            <ac:spMkLst>
+              <pc:docMk/>
+              <pc:sldMasterMk cId="240078074" sldId="2147483891"/>
+              <pc:sldLayoutMk cId="3247010197" sldId="2147483938"/>
+              <ac:spMk id="3" creationId="{00000000-0000-0000-0000-000000000000}"/>
+            </ac:spMkLst>
+          </pc:spChg>
+        </pc:sldLayoutChg>
+        <pc:sldLayoutChg chg="modSp mod">
+          <pc:chgData name="Nigel L Jones" userId="1512a2c5-99cf-401f-90da-0968559aa4c1" providerId="ADAL" clId="{52167A17-4B3C-0C4B-A355-FED5F0DA7317}" dt="2022-08-24T14:08:49.827" v="3313"/>
+          <pc:sldLayoutMkLst>
+            <pc:docMk/>
+            <pc:sldMasterMk cId="240078074" sldId="2147483891"/>
+            <pc:sldLayoutMk cId="1531125302" sldId="2147483939"/>
+          </pc:sldLayoutMkLst>
+          <pc:spChg chg="mod">
+            <ac:chgData name="Nigel L Jones" userId="1512a2c5-99cf-401f-90da-0968559aa4c1" providerId="ADAL" clId="{52167A17-4B3C-0C4B-A355-FED5F0DA7317}" dt="2022-08-24T14:08:49.827" v="3313"/>
+            <ac:spMkLst>
+              <pc:docMk/>
+              <pc:sldMasterMk cId="240078074" sldId="2147483891"/>
+              <pc:sldLayoutMk cId="1531125302" sldId="2147483939"/>
+              <ac:spMk id="3" creationId="{00000000-0000-0000-0000-000000000000}"/>
+            </ac:spMkLst>
+          </pc:spChg>
+        </pc:sldLayoutChg>
+      </pc:sldMasterChg>
     </pc:docChg>
   </pc:docChgLst>
 </pc:chgInfo>
@@ -1642,10 +2416,9 @@
           </a:lstStyle>
           <a:p>
             <a:r>
-              <a:rPr lang="en-US"/>
-              <a:t>Group Name / DOC ID / Month XX, 2022 / © 2022 IBM Corporation</a:t>
-            </a:r>
-            <a:endParaRPr lang="en-US" dirty="0"/>
+              <a:rPr lang="en-US" dirty="0"/>
+              <a:t>© 2022 IBM Corporation</a:t>
+            </a:r>
           </a:p>
         </p:txBody>
       </p:sp>
@@ -1757,10 +2530,9 @@
           </a:lstStyle>
           <a:p>
             <a:r>
-              <a:rPr lang="en-US"/>
-              <a:t>Group Name / DOC ID / Month XX, 2022 / © 2022 IBM Corporation</a:t>
-            </a:r>
-            <a:endParaRPr lang="en-US" dirty="0"/>
+              <a:rPr lang="en-US" dirty="0"/>
+              <a:t>© 2022 IBM Corporation</a:t>
+            </a:r>
           </a:p>
         </p:txBody>
       </p:sp>
@@ -2068,10 +2840,9 @@
           </a:lstStyle>
           <a:p>
             <a:r>
-              <a:rPr lang="en-US"/>
-              <a:t>Group Name / DOC ID / Month XX, 2022 / © 2022 IBM Corporation</a:t>
-            </a:r>
-            <a:endParaRPr lang="en-US" dirty="0"/>
+              <a:rPr lang="en-US" dirty="0"/>
+              <a:t>© 2022 IBM Corporation</a:t>
+            </a:r>
           </a:p>
         </p:txBody>
       </p:sp>
@@ -2237,10 +3008,9 @@
           </a:lstStyle>
           <a:p>
             <a:r>
-              <a:rPr lang="en-US"/>
-              <a:t>Group Name / DOC ID / Month XX, 2022 / © 2022 IBM Corporation</a:t>
-            </a:r>
-            <a:endParaRPr lang="en-US" dirty="0"/>
+              <a:rPr lang="en-US" dirty="0"/>
+              <a:t>© 2022 IBM Corporation</a:t>
+            </a:r>
           </a:p>
         </p:txBody>
       </p:sp>
@@ -2444,10 +3214,9 @@
           </a:lstStyle>
           <a:p>
             <a:r>
-              <a:rPr lang="en-US"/>
-              <a:t>Group Name / DOC ID / Month XX, 2022 / © 2022 IBM Corporation</a:t>
-            </a:r>
-            <a:endParaRPr lang="en-US" dirty="0"/>
+              <a:rPr lang="en-US" dirty="0"/>
+              <a:t>© 2022 IBM Corporation</a:t>
+            </a:r>
           </a:p>
         </p:txBody>
       </p:sp>
@@ -2574,10 +3343,9 @@
           </a:lstStyle>
           <a:p>
             <a:r>
-              <a:rPr lang="en-US"/>
-              <a:t>Group Name / DOC ID / Month XX, 2022 / © 2022 IBM Corporation</a:t>
-            </a:r>
-            <a:endParaRPr lang="en-US" dirty="0"/>
+              <a:rPr lang="en-US" dirty="0"/>
+              <a:t>© 2022 IBM Corporation</a:t>
+            </a:r>
           </a:p>
         </p:txBody>
       </p:sp>
@@ -2703,10 +3471,9 @@
           </a:lstStyle>
           <a:p>
             <a:r>
-              <a:rPr lang="en-US"/>
-              <a:t>Group Name / DOC ID / Month XX, 2022 / © 2022 IBM Corporation</a:t>
-            </a:r>
-            <a:endParaRPr lang="en-US" dirty="0"/>
+              <a:rPr lang="en-US" dirty="0"/>
+              <a:t>© 2022 IBM Corporation</a:t>
+            </a:r>
           </a:p>
         </p:txBody>
       </p:sp>
@@ -2925,10 +3692,9 @@
           </a:lstStyle>
           <a:p>
             <a:r>
-              <a:rPr lang="en-US"/>
-              <a:t>Group Name / DOC ID / Month XX, 2022 / © 2022 IBM Corporation</a:t>
-            </a:r>
-            <a:endParaRPr lang="en-US" dirty="0"/>
+              <a:rPr lang="en-US" dirty="0"/>
+              <a:t>© 2022 IBM Corporation</a:t>
+            </a:r>
           </a:p>
         </p:txBody>
       </p:sp>
@@ -3240,10 +4006,9 @@
           </a:lstStyle>
           <a:p>
             <a:r>
-              <a:rPr lang="en-US"/>
-              <a:t>Group Name / DOC ID / Month XX, 2022 / © 2022 IBM Corporation</a:t>
-            </a:r>
-            <a:endParaRPr lang="en-US" dirty="0"/>
+              <a:rPr lang="en-US" dirty="0"/>
+              <a:t>© 2022 IBM Corporation</a:t>
+            </a:r>
           </a:p>
         </p:txBody>
       </p:sp>
@@ -3498,10 +4263,9 @@
           </a:lstStyle>
           <a:p>
             <a:r>
-              <a:rPr lang="en-US"/>
-              <a:t>Group Name / DOC ID / Month XX, 2022 / © 2022 IBM Corporation</a:t>
-            </a:r>
-            <a:endParaRPr lang="en-US" dirty="0"/>
+              <a:rPr lang="en-US" dirty="0"/>
+              <a:t>© 2022 IBM Corporation</a:t>
+            </a:r>
           </a:p>
         </p:txBody>
       </p:sp>
@@ -3999,10 +4763,9 @@
           </a:lstStyle>
           <a:p>
             <a:r>
-              <a:rPr lang="en-US"/>
-              <a:t>Group Name / DOC ID / Month XX, 2022 / © 2022 IBM Corporation</a:t>
-            </a:r>
-            <a:endParaRPr lang="en-US" dirty="0"/>
+              <a:rPr lang="en-US" dirty="0"/>
+              <a:t>© 2022 IBM Corporation</a:t>
+            </a:r>
           </a:p>
         </p:txBody>
       </p:sp>
@@ -4152,10 +4915,9 @@
           </a:lstStyle>
           <a:p>
             <a:r>
-              <a:rPr lang="en-US"/>
-              <a:t>Group Name / DOC ID / Month XX, 2022 / © 2022 IBM Corporation</a:t>
-            </a:r>
-            <a:endParaRPr lang="en-US" dirty="0"/>
+              <a:rPr lang="en-US" dirty="0"/>
+              <a:t>© 2022 IBM Corporation</a:t>
+            </a:r>
           </a:p>
         </p:txBody>
       </p:sp>
@@ -4407,10 +5169,9 @@
           </a:lstStyle>
           <a:p>
             <a:r>
-              <a:rPr lang="en-US"/>
-              <a:t>Group Name / DOC ID / Month XX, 2022 / © 2022 IBM Corporation</a:t>
-            </a:r>
-            <a:endParaRPr lang="en-US" dirty="0"/>
+              <a:rPr lang="en-US" dirty="0"/>
+              <a:t>© 2022 IBM Corporation</a:t>
+            </a:r>
           </a:p>
         </p:txBody>
       </p:sp>
@@ -4722,10 +5483,9 @@
           </a:lstStyle>
           <a:p>
             <a:r>
-              <a:rPr lang="en-US"/>
-              <a:t>Group Name / DOC ID / Month XX, 2022 / © 2022 IBM Corporation</a:t>
-            </a:r>
-            <a:endParaRPr lang="en-US" dirty="0"/>
+              <a:rPr lang="en-US" dirty="0"/>
+              <a:t>© 2022 IBM Corporation</a:t>
+            </a:r>
           </a:p>
         </p:txBody>
       </p:sp>
@@ -5003,10 +5763,9 @@
           </a:lstStyle>
           <a:p>
             <a:r>
-              <a:rPr lang="en-US"/>
-              <a:t>Group Name / DOC ID / Month XX, 2022 / © 2022 IBM Corporation</a:t>
-            </a:r>
-            <a:endParaRPr lang="en-US" dirty="0"/>
+              <a:rPr lang="en-US" dirty="0"/>
+              <a:t>© 2022 IBM Corporation</a:t>
+            </a:r>
           </a:p>
         </p:txBody>
       </p:sp>
@@ -5168,10 +5927,9 @@
           </a:lstStyle>
           <a:p>
             <a:r>
-              <a:rPr lang="en-US"/>
-              <a:t>Group Name / DOC ID / Month XX, 2022 / © 2022 IBM Corporation</a:t>
-            </a:r>
-            <a:endParaRPr lang="en-US" dirty="0"/>
+              <a:rPr lang="en-US" dirty="0"/>
+              <a:t>© 2022 IBM Corporation</a:t>
+            </a:r>
           </a:p>
         </p:txBody>
       </p:sp>
@@ -5297,10 +6055,9 @@
           </a:lstStyle>
           <a:p>
             <a:r>
-              <a:rPr lang="en-US"/>
-              <a:t>Group Name / DOC ID / Month XX, 2022 / © 2022 IBM Corporation</a:t>
-            </a:r>
-            <a:endParaRPr lang="en-US" dirty="0"/>
+              <a:rPr lang="en-US" dirty="0"/>
+              <a:t>© 2022 IBM Corporation</a:t>
+            </a:r>
           </a:p>
         </p:txBody>
       </p:sp>
@@ -5426,10 +6183,9 @@
           </a:lstStyle>
           <a:p>
             <a:r>
-              <a:rPr lang="en-US"/>
-              <a:t>Group Name / DOC ID / Month XX, 2022 / © 2022 IBM Corporation</a:t>
-            </a:r>
-            <a:endParaRPr lang="en-US" dirty="0"/>
+              <a:rPr lang="en-US" dirty="0"/>
+              <a:t>© 2022 IBM Corporation</a:t>
+            </a:r>
           </a:p>
         </p:txBody>
       </p:sp>
@@ -5771,10 +6527,9 @@
           </a:lstStyle>
           <a:p>
             <a:r>
-              <a:rPr lang="en-US"/>
-              <a:t>Group Name / DOC ID / Month XX, 2022 / © 2022 IBM Corporation</a:t>
-            </a:r>
-            <a:endParaRPr lang="en-US" dirty="0"/>
+              <a:rPr lang="en-US" dirty="0"/>
+              <a:t>© 2022 IBM Corporation</a:t>
+            </a:r>
           </a:p>
         </p:txBody>
       </p:sp>
@@ -6196,10 +6951,9 @@
           </a:lstStyle>
           <a:p>
             <a:r>
-              <a:rPr lang="en-US"/>
-              <a:t>Group Name / DOC ID / Month XX, 2022 / © 2022 IBM Corporation</a:t>
-            </a:r>
-            <a:endParaRPr lang="en-US" dirty="0"/>
+              <a:rPr lang="en-US" dirty="0"/>
+              <a:t>© 2022 IBM Corporation</a:t>
+            </a:r>
           </a:p>
         </p:txBody>
       </p:sp>
@@ -6669,10 +7423,9 @@
           </a:lstStyle>
           <a:p>
             <a:r>
-              <a:rPr lang="en-US"/>
-              <a:t>Group Name / DOC ID / Month XX, 2022 / © 2022 IBM Corporation</a:t>
-            </a:r>
-            <a:endParaRPr lang="en-US" dirty="0"/>
+              <a:rPr lang="en-US" dirty="0"/>
+              <a:t>© 2022 IBM Corporation</a:t>
+            </a:r>
           </a:p>
         </p:txBody>
       </p:sp>
@@ -7021,10 +7774,9 @@
           </a:lstStyle>
           <a:p>
             <a:r>
-              <a:rPr lang="en-US"/>
-              <a:t>Group Name / DOC ID / Month XX, 2022 / © 2022 IBM Corporation</a:t>
-            </a:r>
-            <a:endParaRPr lang="en-US" dirty="0"/>
+              <a:rPr lang="en-US" dirty="0"/>
+              <a:t>© 2022 IBM Corporation</a:t>
+            </a:r>
           </a:p>
         </p:txBody>
       </p:sp>
@@ -7174,10 +7926,9 @@
           </a:lstStyle>
           <a:p>
             <a:r>
-              <a:rPr lang="en-US"/>
-              <a:t>Group Name / DOC ID / Month XX, 2022 / © 2022 IBM Corporation</a:t>
-            </a:r>
-            <a:endParaRPr lang="en-US" dirty="0"/>
+              <a:rPr lang="en-US" dirty="0"/>
+              <a:t>© 2022 IBM Corporation</a:t>
+            </a:r>
           </a:p>
         </p:txBody>
       </p:sp>
@@ -7411,10 +8162,9 @@
           </a:lstStyle>
           <a:p>
             <a:r>
-              <a:rPr lang="en-US"/>
-              <a:t>Group Name / DOC ID / Month XX, 2022 / © 2022 IBM Corporation</a:t>
-            </a:r>
-            <a:endParaRPr lang="en-US" dirty="0"/>
+              <a:rPr lang="en-US" dirty="0"/>
+              <a:t>© 2022 IBM Corporation</a:t>
+            </a:r>
           </a:p>
         </p:txBody>
       </p:sp>
@@ -7940,10 +8690,9 @@
           </a:lstStyle>
           <a:p>
             <a:r>
-              <a:rPr lang="en-US"/>
-              <a:t>Group Name / DOC ID / Month XX, 2022 / © 2022 IBM Corporation</a:t>
-            </a:r>
-            <a:endParaRPr lang="en-US" dirty="0"/>
+              <a:rPr lang="en-US" dirty="0"/>
+              <a:t>© 2022 IBM Corporation</a:t>
+            </a:r>
           </a:p>
         </p:txBody>
       </p:sp>
@@ -8387,10 +9136,9 @@
           </a:lstStyle>
           <a:p>
             <a:r>
-              <a:rPr lang="en-US"/>
-              <a:t>Group Name / DOC ID / Month XX, 2022 / © 2022 IBM Corporation</a:t>
-            </a:r>
-            <a:endParaRPr lang="en-US" dirty="0"/>
+              <a:rPr lang="en-US" dirty="0"/>
+              <a:t>© 2022 IBM Corporation</a:t>
+            </a:r>
           </a:p>
         </p:txBody>
       </p:sp>
@@ -8609,10 +9357,9 @@
           </a:lstStyle>
           <a:p>
             <a:r>
-              <a:rPr lang="en-US"/>
-              <a:t>Group Name / DOC ID / Month XX, 2022 / © 2022 IBM Corporation</a:t>
-            </a:r>
-            <a:endParaRPr lang="en-US" dirty="0"/>
+              <a:rPr lang="en-US" dirty="0"/>
+              <a:t>© 2022 IBM Corporation</a:t>
+            </a:r>
           </a:p>
         </p:txBody>
       </p:sp>
@@ -8975,10 +9722,9 @@
           </a:lstStyle>
           <a:p>
             <a:r>
-              <a:rPr lang="en-US"/>
-              <a:t>Group Name / DOC ID / Month XX, 2022 / © 2022 IBM Corporation</a:t>
-            </a:r>
-            <a:endParaRPr lang="en-US" dirty="0"/>
+              <a:rPr lang="en-US" dirty="0"/>
+              <a:t>© 2022 IBM Corporation</a:t>
+            </a:r>
           </a:p>
         </p:txBody>
       </p:sp>
@@ -9398,10 +10144,9 @@
           </a:lstStyle>
           <a:p>
             <a:r>
-              <a:rPr lang="en-US"/>
-              <a:t>Group Name / DOC ID / Month XX, 2022 / © 2022 IBM Corporation</a:t>
-            </a:r>
-            <a:endParaRPr lang="en-US" dirty="0"/>
+              <a:rPr lang="en-US" dirty="0"/>
+              <a:t>© 2022 IBM Corporation</a:t>
+            </a:r>
           </a:p>
         </p:txBody>
       </p:sp>
@@ -9620,10 +10365,9 @@
           </a:lstStyle>
           <a:p>
             <a:r>
-              <a:rPr lang="en-US"/>
-              <a:t>Group Name / DOC ID / Month XX, 2022 / © 2022 IBM Corporation</a:t>
-            </a:r>
-            <a:endParaRPr lang="en-US" dirty="0"/>
+              <a:rPr lang="en-US" dirty="0"/>
+              <a:t>© 2022 IBM Corporation</a:t>
+            </a:r>
           </a:p>
         </p:txBody>
       </p:sp>
@@ -9713,10 +10457,9 @@
           </a:lstStyle>
           <a:p>
             <a:r>
-              <a:rPr lang="en-US"/>
-              <a:t>Group Name / DOC ID / Month XX, 2022 / © 2022 IBM Corporation</a:t>
-            </a:r>
-            <a:endParaRPr lang="en-US" dirty="0"/>
+              <a:rPr lang="en-US" dirty="0"/>
+              <a:t>© 2022 IBM Corporation</a:t>
+            </a:r>
           </a:p>
         </p:txBody>
       </p:sp>
@@ -9987,10 +10730,9 @@
           </a:lstStyle>
           <a:p>
             <a:r>
-              <a:rPr lang="en-US"/>
-              <a:t>Group Name / DOC ID / Month XX, 2022 / © 2022 IBM Corporation</a:t>
-            </a:r>
-            <a:endParaRPr lang="en-US" dirty="0"/>
+              <a:rPr lang="en-US" dirty="0"/>
+              <a:t>© 2022 IBM Corporation</a:t>
+            </a:r>
           </a:p>
         </p:txBody>
       </p:sp>
@@ -10140,10 +10882,9 @@
           </a:lstStyle>
           <a:p>
             <a:r>
-              <a:rPr lang="en-US"/>
-              <a:t>Group Name / DOC ID / Month XX, 2022 / © 2022 IBM Corporation</a:t>
-            </a:r>
-            <a:endParaRPr lang="en-US" dirty="0"/>
+              <a:rPr lang="en-US" dirty="0"/>
+              <a:t>© 2022 IBM Corporation</a:t>
+            </a:r>
           </a:p>
         </p:txBody>
       </p:sp>
@@ -10449,10 +11190,9 @@
           </a:lstStyle>
           <a:p>
             <a:r>
-              <a:rPr lang="en-US"/>
-              <a:t>Group Name / DOC ID / Month XX, 2022 / © 2022 IBM Corporation</a:t>
-            </a:r>
-            <a:endParaRPr lang="en-US" dirty="0"/>
+              <a:rPr lang="en-US" dirty="0"/>
+              <a:t>© 2022 IBM Corporation</a:t>
+            </a:r>
           </a:p>
         </p:txBody>
       </p:sp>
@@ -10593,7 +11333,7 @@
           <a:p>
             <a:r>
               <a:rPr lang="en-US" dirty="0"/>
-              <a:t>Group Name / DOC ID / Month XX, 2022 / © 2022 IBM Corporation</a:t>
+              <a:t>© 2022 IBM Corporation</a:t>
             </a:r>
           </a:p>
         </p:txBody>
@@ -10735,10 +11475,9 @@
           </a:lstStyle>
           <a:p>
             <a:r>
-              <a:rPr lang="en-US"/>
-              <a:t>Group Name / DOC ID / Month XX, 2022 / © 2022 IBM Corporation</a:t>
-            </a:r>
-            <a:endParaRPr lang="en-US" dirty="0"/>
+              <a:rPr lang="en-US" dirty="0"/>
+              <a:t>© 2022 IBM Corporation</a:t>
+            </a:r>
           </a:p>
         </p:txBody>
       </p:sp>
@@ -10885,10 +11624,9 @@
           </a:lstStyle>
           <a:p>
             <a:r>
-              <a:rPr lang="en-US"/>
-              <a:t>Group Name / DOC ID / Month XX, 2022 / © 2022 IBM Corporation</a:t>
-            </a:r>
-            <a:endParaRPr lang="en-US" dirty="0"/>
+              <a:rPr lang="en-US" dirty="0"/>
+              <a:t>© 2022 IBM Corporation</a:t>
+            </a:r>
           </a:p>
         </p:txBody>
       </p:sp>
@@ -11035,10 +11773,9 @@
           </a:lstStyle>
           <a:p>
             <a:r>
-              <a:rPr lang="en-US"/>
-              <a:t>Group Name / DOC ID / Month XX, 2022 / © 2022 IBM Corporation</a:t>
-            </a:r>
-            <a:endParaRPr lang="en-US" dirty="0"/>
+              <a:rPr lang="en-US" dirty="0"/>
+              <a:t>© 2022 IBM Corporation</a:t>
+            </a:r>
           </a:p>
         </p:txBody>
       </p:sp>
@@ -14024,7 +14761,7 @@
           <a:p>
             <a:r>
               <a:rPr lang="en-US" dirty="0"/>
-              <a:t>Enriched data can now be published to a catalog so that others users including data scientists and analysts can use the trusted data</a:t>
+              <a:t>Enriched data can now be published to a catalog so that others users including data scientists and analysts can use the trusted data.</a:t>
             </a:r>
           </a:p>
         </p:txBody>
@@ -14051,10 +14788,9 @@
           <a:lstStyle/>
           <a:p>
             <a:r>
-              <a:rPr lang="en-US"/>
-              <a:t>Group Name / DOC ID / Month XX, 2022 / © 2022 IBM Corporation</a:t>
-            </a:r>
-            <a:endParaRPr lang="en-US" dirty="0"/>
+              <a:rPr lang="en-US" dirty="0"/>
+              <a:t>© 2022 IBM Corporation</a:t>
+            </a:r>
           </a:p>
         </p:txBody>
       </p:sp>
@@ -14207,8 +14943,13 @@
             </a:br>
             <a:r>
               <a:rPr lang="en-US" dirty="0"/>
-              <a:t>The next section walks through how to apply data protection rules to the assets to control what users can see – perhaps being denied access, or being subject to data masking</a:t>
-            </a:r>
+              <a:t>The next section walks through how to apply data protection rules to the assets to control what users can see – perhaps being denied access, or being subject to </a:t>
+            </a:r>
+            <a:r>
+              <a:rPr lang="en-US"/>
+              <a:t>data masking.</a:t>
+            </a:r>
+            <a:endParaRPr lang="en-US" dirty="0"/>
           </a:p>
           <a:p>
             <a:r>
@@ -14240,10 +14981,9 @@
           <a:lstStyle/>
           <a:p>
             <a:r>
-              <a:rPr lang="en-US"/>
-              <a:t>Group Name / DOC ID / Month XX, 2022 / © 2022 IBM Corporation</a:t>
-            </a:r>
-            <a:endParaRPr lang="en-US" dirty="0"/>
+              <a:rPr lang="en-US" dirty="0"/>
+              <a:t>© 2022 IBM Corporation</a:t>
+            </a:r>
           </a:p>
         </p:txBody>
       </p:sp>
@@ -14281,6 +15021,105 @@
     <p:extLst>
       <p:ext uri="{BB962C8B-B14F-4D97-AF65-F5344CB8AC3E}">
         <p14:creationId xmlns:p14="http://schemas.microsoft.com/office/powerpoint/2010/main" val="1807981701"/>
+      </p:ext>
+    </p:extLst>
+  </p:cSld>
+  <p:clrMapOvr>
+    <a:masterClrMapping/>
+  </p:clrMapOvr>
+</p:sld>
+</file>
+
+<file path=ppt/slides/slide12.xml><?xml version="1.0" encoding="utf-8"?>
+<p:sld xmlns:a="http://schemas.openxmlformats.org/drawingml/2006/main" xmlns:r="http://schemas.openxmlformats.org/officeDocument/2006/relationships" xmlns:p="http://schemas.openxmlformats.org/presentationml/2006/main">
+  <p:cSld>
+    <p:spTree>
+      <p:nvGrpSpPr>
+        <p:cNvPr id="1" name=""/>
+        <p:cNvGrpSpPr/>
+        <p:nvPr/>
+      </p:nvGrpSpPr>
+      <p:grpSpPr>
+        <a:xfrm>
+          <a:off x="0" y="0"/>
+          <a:ext cx="0" cy="0"/>
+          <a:chOff x="0" y="0"/>
+          <a:chExt cx="0" cy="0"/>
+        </a:xfrm>
+      </p:grpSpPr>
+      <p:sp>
+        <p:nvSpPr>
+          <p:cNvPr id="5" name="Footer Placeholder 4">
+            <a:extLst>
+              <a:ext uri="{FF2B5EF4-FFF2-40B4-BE49-F238E27FC236}">
+                <a16:creationId xmlns:a16="http://schemas.microsoft.com/office/drawing/2014/main" id="{AA3C5B66-CADC-97B8-0849-C3B13837072A}"/>
+              </a:ext>
+            </a:extLst>
+          </p:cNvPr>
+          <p:cNvSpPr>
+            <a:spLocks noGrp="1"/>
+          </p:cNvSpPr>
+          <p:nvPr>
+            <p:ph type="ftr" sz="quarter" idx="4294967295"/>
+          </p:nvPr>
+        </p:nvSpPr>
+        <p:spPr>
+          <a:xfrm>
+            <a:off x="0" y="4800600"/>
+            <a:ext cx="4114800" cy="166688"/>
+          </a:xfrm>
+        </p:spPr>
+        <p:txBody>
+          <a:bodyPr/>
+          <a:lstStyle/>
+          <a:p>
+            <a:r>
+              <a:rPr lang="en-US"/>
+              <a:t>© 2022 IBM Corporation</a:t>
+            </a:r>
+            <a:endParaRPr lang="en-US" dirty="0"/>
+          </a:p>
+        </p:txBody>
+      </p:sp>
+      <p:sp>
+        <p:nvSpPr>
+          <p:cNvPr id="6" name="Slide Number Placeholder 5">
+            <a:extLst>
+              <a:ext uri="{FF2B5EF4-FFF2-40B4-BE49-F238E27FC236}">
+                <a16:creationId xmlns:a16="http://schemas.microsoft.com/office/drawing/2014/main" id="{0F080193-E359-3B1B-2E4B-983807F744AC}"/>
+              </a:ext>
+            </a:extLst>
+          </p:cNvPr>
+          <p:cNvSpPr>
+            <a:spLocks noGrp="1"/>
+          </p:cNvSpPr>
+          <p:nvPr>
+            <p:ph type="sldNum" sz="quarter" idx="4294967295"/>
+          </p:nvPr>
+        </p:nvSpPr>
+        <p:spPr>
+          <a:xfrm>
+            <a:off x="7315200" y="4800600"/>
+            <a:ext cx="1828800" cy="166688"/>
+          </a:xfrm>
+        </p:spPr>
+        <p:txBody>
+          <a:bodyPr/>
+          <a:lstStyle/>
+          <a:p>
+            <a:fld id="{59395FB3-9C97-154F-86B2-7E381B951268}" type="slidenum">
+              <a:rPr lang="en-US" smtClean="0"/>
+              <a:pPr/>
+              <a:t>12</a:t>
+            </a:fld>
+            <a:endParaRPr lang="en-US" dirty="0"/>
+          </a:p>
+        </p:txBody>
+      </p:sp>
+    </p:spTree>
+    <p:extLst>
+      <p:ext uri="{BB962C8B-B14F-4D97-AF65-F5344CB8AC3E}">
+        <p14:creationId xmlns:p14="http://schemas.microsoft.com/office/powerpoint/2010/main" val="1848827190"/>
       </p:ext>
     </p:extLst>
   </p:cSld>
@@ -14414,31 +15253,7 @@
           <a:p>
             <a:r>
               <a:rPr lang="en-US" dirty="0"/>
-              <a:t>You should already have an IBM cloud account – information </a:t>
-            </a:r>
-            <a:r>
-              <a:rPr lang="en-US"/>
-              <a:t>was sent in a prior email (ask if you need help)</a:t>
-            </a:r>
-            <a:br>
-              <a:rPr lang="en-US"/>
-            </a:br>
-            <a:br>
-              <a:rPr lang="en-US"/>
-            </a:br>
-            <a:r>
-              <a:rPr lang="en-US"/>
-              <a:t>The </a:t>
-            </a:r>
-            <a:r>
-              <a:rPr lang="en-US" dirty="0"/>
-              <a:t>lab demonstrates how Watson Knowledge Catalog can be used to catalog assets, create business times, establish relationships between the assets and terms, and finally publish the content in a catalog available to users.</a:t>
-            </a:r>
-          </a:p>
-          <a:p>
-            <a:r>
-              <a:rPr lang="en-US" dirty="0"/>
-              <a:t>The instructions include explanatory text &amp; video.</a:t>
+              <a:t>You should already have an IBM cloud account – information was sent in a prior email (ask if you need help).</a:t>
             </a:r>
             <a:br>
               <a:rPr lang="en-US" dirty="0"/>
@@ -14448,7 +15263,23 @@
             </a:br>
             <a:r>
               <a:rPr lang="en-US" dirty="0"/>
-              <a:t>If you get stuck ask questions on the web conference, or in the chat</a:t>
+              <a:t>The lab demonstrates how Watson Knowledge Catalog can be used to catalog assets, create business times, establish relationships between the assets and terms, and finally publish the content in a catalog available to users.</a:t>
+            </a:r>
+          </a:p>
+          <a:p>
+            <a:r>
+              <a:rPr lang="en-US" dirty="0"/>
+              <a:t>The instructions include explanatory text &amp; video.</a:t>
+            </a:r>
+            <a:br>
+              <a:rPr lang="en-US" dirty="0"/>
+            </a:br>
+            <a:br>
+              <a:rPr lang="en-US" dirty="0"/>
+            </a:br>
+            <a:r>
+              <a:rPr lang="en-US" dirty="0"/>
+              <a:t>If you get stuck ask questions on the web conference, or in the chat.</a:t>
             </a:r>
           </a:p>
         </p:txBody>
@@ -14475,10 +15306,9 @@
           <a:lstStyle/>
           <a:p>
             <a:r>
-              <a:rPr lang="en-US"/>
-              <a:t>Group Name / DOC ID / Month XX, 2022 / © 2022 IBM Corporation</a:t>
-            </a:r>
-            <a:endParaRPr lang="en-US" dirty="0"/>
+              <a:rPr lang="en-US" dirty="0"/>
+              <a:t>© 2022 IBM Corporation</a:t>
+            </a:r>
           </a:p>
         </p:txBody>
       </p:sp>
@@ -14695,7 +15525,7 @@
             </a:pPr>
             <a:r>
               <a:rPr lang="en-US" dirty="0"/>
-              <a:t>Ensure you are signed up for Cloud Pak for Data as a Service &amp; logged in</a:t>
+              <a:t>Ensure you are signed up for Cloud Pak for Data as a Service &amp; logged in.</a:t>
             </a:r>
           </a:p>
           <a:p>
@@ -14705,7 +15535,7 @@
             </a:pPr>
             <a:r>
               <a:rPr lang="en-US" dirty="0"/>
-              <a:t>Provision the services needed for the lab</a:t>
+              <a:t>Provision the services needed for the lab.</a:t>
             </a:r>
           </a:p>
           <a:p>
@@ -14715,7 +15545,7 @@
             </a:pPr>
             <a:r>
               <a:rPr lang="en-US" dirty="0"/>
-              <a:t>Create a project from a tutorial template</a:t>
+              <a:t>Create a project from a tutorial template.</a:t>
             </a:r>
           </a:p>
           <a:p>
@@ -14725,13 +15555,8 @@
             </a:pPr>
             <a:r>
               <a:rPr lang="en-US" dirty="0"/>
-              <a:t>Import </a:t>
-            </a:r>
-            <a:r>
-              <a:rPr lang="en-US"/>
-              <a:t>Banking terms </a:t>
-            </a:r>
-            <a:endParaRPr lang="en-US" dirty="0"/>
+              <a:t>Import Banking terms.</a:t>
+            </a:r>
           </a:p>
         </p:txBody>
       </p:sp>
@@ -14757,10 +15582,9 @@
           <a:lstStyle/>
           <a:p>
             <a:r>
-              <a:rPr lang="en-US"/>
-              <a:t>Group Name / DOC ID / Month XX, 2022 / © 2022 IBM Corporation</a:t>
-            </a:r>
-            <a:endParaRPr lang="en-US" dirty="0"/>
+              <a:rPr lang="en-US" dirty="0"/>
+              <a:t>© 2022 IBM Corporation</a:t>
+            </a:r>
           </a:p>
         </p:txBody>
       </p:sp>
@@ -14997,7 +15821,7 @@
           <a:p>
             <a:r>
               <a:rPr lang="en-US" dirty="0"/>
-              <a:t>This step creates a catalog in Watson Knowledge Catalog where data will be published to</a:t>
+              <a:t>This step creates a catalog in Watson Knowledge Catalog where data will be published to.</a:t>
             </a:r>
           </a:p>
         </p:txBody>
@@ -15024,10 +15848,9 @@
           <a:lstStyle/>
           <a:p>
             <a:r>
-              <a:rPr lang="en-US"/>
-              <a:t>Group Name / DOC ID / Month XX, 2022 / © 2022 IBM Corporation</a:t>
-            </a:r>
-            <a:endParaRPr lang="en-US" dirty="0"/>
+              <a:rPr lang="en-US" dirty="0"/>
+              <a:t>© 2022 IBM Corporation</a:t>
+            </a:r>
           </a:p>
         </p:txBody>
       </p:sp>
@@ -15261,13 +16084,13 @@
           <a:p>
             <a:r>
               <a:rPr lang="en-US" dirty="0"/>
-              <a:t>We create a category to contain business terms associated with Banking</a:t>
+              <a:t>We create a category to contain business terms associated with Banking.</a:t>
             </a:r>
           </a:p>
           <a:p>
             <a:r>
               <a:rPr lang="en-US" dirty="0"/>
-              <a:t>In a real environment a banking environment will use many categories which act as folders to organize the terms</a:t>
+              <a:t>In a real environment a banking environment will use many categories which act as folders to organize the terms.</a:t>
             </a:r>
           </a:p>
         </p:txBody>
@@ -15294,10 +16117,9 @@
           <a:lstStyle/>
           <a:p>
             <a:r>
-              <a:rPr lang="en-US"/>
-              <a:t>Group Name / DOC ID / Month XX, 2022 / © 2022 IBM Corporation</a:t>
-            </a:r>
-            <a:endParaRPr lang="en-US" dirty="0"/>
+              <a:rPr lang="en-US" dirty="0"/>
+              <a:t>© 2022 IBM Corporation</a:t>
+            </a:r>
           </a:p>
         </p:txBody>
       </p:sp>
@@ -15554,7 +16376,7 @@
             </a:br>
             <a:r>
               <a:rPr lang="en-US" dirty="0"/>
-              <a:t>We then publish the business terms to make them available to users</a:t>
+              <a:t>We then publish the business terms to make them available to users.</a:t>
             </a:r>
           </a:p>
         </p:txBody>
@@ -15581,10 +16403,9 @@
           <a:lstStyle/>
           <a:p>
             <a:r>
-              <a:rPr lang="en-US"/>
-              <a:t>Group Name / DOC ID / Month XX, 2022 / © 2022 IBM Corporation</a:t>
-            </a:r>
-            <a:endParaRPr lang="en-US" dirty="0"/>
+              <a:rPr lang="en-US" dirty="0"/>
+              <a:t>© 2022 IBM Corporation</a:t>
+            </a:r>
           </a:p>
         </p:txBody>
       </p:sp>
@@ -15834,7 +16655,7 @@
             </a:r>
             <a:r>
               <a:rPr lang="en-US" dirty="0"/>
-              <a:t>) relating to mortgage data into a new project</a:t>
+              <a:t>) relating to mortgage data into a new project.</a:t>
             </a:r>
             <a:br>
               <a:rPr lang="en-US" dirty="0"/>
@@ -15844,7 +16665,7 @@
             </a:br>
             <a:r>
               <a:rPr lang="en-US" dirty="0"/>
-              <a:t>Assets are then created in a project </a:t>
+              <a:t>Assets are then created in this project .</a:t>
             </a:r>
           </a:p>
         </p:txBody>
@@ -15871,10 +16692,9 @@
           <a:lstStyle/>
           <a:p>
             <a:r>
-              <a:rPr lang="en-US"/>
-              <a:t>Group Name / DOC ID / Month XX, 2022 / © 2022 IBM Corporation</a:t>
-            </a:r>
-            <a:endParaRPr lang="en-US" dirty="0"/>
+              <a:rPr lang="en-US" dirty="0"/>
+              <a:t>© 2022 IBM Corporation</a:t>
+            </a:r>
           </a:p>
         </p:txBody>
       </p:sp>
@@ -16122,19 +16942,19 @@
             </a:r>
             <a:r>
               <a:rPr lang="en-US" dirty="0"/>
-              <a:t> data distribution</a:t>
+              <a:t> data distribution.</a:t>
             </a:r>
           </a:p>
           <a:p>
             <a:r>
               <a:rPr lang="en-US" dirty="0"/>
-              <a:t> - Quality assessment</a:t>
+              <a:t> - Quality assessment.</a:t>
             </a:r>
           </a:p>
           <a:p>
             <a:r>
               <a:rPr lang="en-US" dirty="0"/>
-              <a:t> - Linking business terms to the assets</a:t>
+              <a:t> - Linking business terms to the assets.</a:t>
             </a:r>
           </a:p>
         </p:txBody>
@@ -16161,10 +16981,9 @@
           <a:lstStyle/>
           <a:p>
             <a:r>
-              <a:rPr lang="en-US"/>
-              <a:t>Group Name / DOC ID / Month XX, 2022 / © 2022 IBM Corporation</a:t>
-            </a:r>
-            <a:endParaRPr lang="en-US" dirty="0"/>
+              <a:rPr lang="en-US" dirty="0"/>
+              <a:t>© 2022 IBM Corporation</a:t>
+            </a:r>
           </a:p>
         </p:txBody>
       </p:sp>
@@ -16408,7 +17227,7 @@
             </a:br>
             <a:r>
               <a:rPr lang="en-US" dirty="0"/>
-              <a:t>It also shows how some suggestions may be recommended, but must be accepted – depending on confidence</a:t>
+              <a:t>It also shows how some suggestions may be recommended, but must be accepted – depending on confidence.</a:t>
             </a:r>
           </a:p>
         </p:txBody>
@@ -16435,10 +17254,9 @@
           <a:lstStyle/>
           <a:p>
             <a:r>
-              <a:rPr lang="en-US"/>
-              <a:t>Group Name / DOC ID / Month XX, 2022 / © 2022 IBM Corporation</a:t>
-            </a:r>
-            <a:endParaRPr lang="en-US" dirty="0"/>
+              <a:rPr lang="en-US" dirty="0"/>
+              <a:t>© 2022 IBM Corporation</a:t>
+            </a:r>
           </a:p>
         </p:txBody>
       </p:sp>

</xml_diff>